<commit_message>
Update in result file again
</commit_message>
<xml_diff>
--- a/frontend/build/Pipeline_deck.pptx
+++ b/frontend/build/Pipeline_deck.pptx
@@ -192,7 +192,7 @@
 <file path=ppt/authors.xml><?xml version="1.0" encoding="utf-8"?>
 <p188:authorLst xmlns:p="http://schemas.openxmlformats.org/presentationml/2006/main" xmlns:p188="http://schemas.microsoft.com/office/powerpoint/2018/8/main">
   <p188:author id="{1AE1E804-414D-BD6D-F72A-BB6F163E1C9E}" name="CACTUS-MM" initials="MM" userId="CACTUS-MM" providerId="None"/>
-  <p188:author id="{07CD90FA-E915-4AD6-992C-830F90B9A2E9}" name="Cactus_MLR" initials="MF" userId="" providerId=""/>
+  <p188:author id="{0AFD991A-DE7F-4F83-AF8C-13D7C566DFAB}" name="Cactus_MLR" initials="MLR" userId="" providerId=""/>
 </p188:authorLst>
 </file>
 
@@ -468,134 +468,13 @@
   <p:cmAuthor id="45" name="Duong, Celine" initials="DC" lastIdx="0" clrIdx="45"/>
   <p:cmAuthor id="46" name="CACTUS_MP" initials="MP" lastIdx="0" clrIdx="46"/>
   <p:cmAuthor id="47" name="Editor(R)" initials="CACTUS-" lastIdx="0" clrIdx="47"/>
-  <p:cmAuthor id="48" name="Cactus_MLR" initials="MF" lastIdx="103" clrIdx="48"/>
+  <p:cmAuthor id="48" name="Cactus_MLR" initials="MLR" lastIdx="39" clrIdx="48"/>
 </p:cmAuthorLst>
-</file>
-
-<file path=ppt/revisionInfo.xml><?xml version="1.0" encoding="utf-8"?>
-<p1510:revInfo xmlns:a="http://schemas.openxmlformats.org/drawingml/2006/main" xmlns:r="http://schemas.openxmlformats.org/officeDocument/2006/relationships" xmlns:p1510="http://schemas.microsoft.com/office/powerpoint/2015/10/main">
-  <p1510:revLst>
-    <p1510:client id="{750CFA2E-1F33-4007-9F18-320ACDEB8DE5}" v="2" dt="2023-01-23T07:32:20.100"/>
-  </p1510:revLst>
-</p1510:revInfo>
-</file>
-
-<file path=ppt/changesInfos/changesInfo1.xml><?xml version="1.0" encoding="utf-8"?>
-<pc:chgInfo xmlns:a="http://schemas.openxmlformats.org/drawingml/2006/main" xmlns:r="http://schemas.openxmlformats.org/officeDocument/2006/relationships" xmlns:ac="http://schemas.microsoft.com/office/drawing/2013/main/command" xmlns:pc="http://schemas.microsoft.com/office/powerpoint/2013/main/command">
-  <pc:docChgLst>
-    <pc:chgData name="Meera Mehta" userId="7a4746cb-0892-4122-98b5-a053ac542d1e" providerId="ADAL" clId="{750CFA2E-1F33-4007-9F18-320ACDEB8DE5}"/>
-    <pc:docChg chg="custSel addSld delSld modSld modMainMaster modSection">
-      <pc:chgData name="Meera Mehta" userId="7a4746cb-0892-4122-98b5-a053ac542d1e" providerId="ADAL" clId="{750CFA2E-1F33-4007-9F18-320ACDEB8DE5}" dt="2023-01-24T05:52:26.688" v="17"/>
-      <pc:docMkLst>
-        <pc:docMk/>
-      </pc:docMkLst>
-      <pc:sldChg chg="modSp mod addCm modNotes">
-        <pc:chgData name="Meera Mehta" userId="7a4746cb-0892-4122-98b5-a053ac542d1e" providerId="ADAL" clId="{750CFA2E-1F33-4007-9F18-320ACDEB8DE5}" dt="2023-01-24T05:52:26.688" v="17"/>
-        <pc:sldMkLst>
-          <pc:docMk/>
-          <pc:sldMk cId="3485802384" sldId="5220"/>
-        </pc:sldMkLst>
-        <pc:spChg chg="mod">
-          <ac:chgData name="Meera Mehta" userId="7a4746cb-0892-4122-98b5-a053ac542d1e" providerId="ADAL" clId="{750CFA2E-1F33-4007-9F18-320ACDEB8DE5}" dt="2023-01-24T05:50:10.613" v="14" actId="14100"/>
-          <ac:spMkLst>
-            <pc:docMk/>
-            <pc:sldMk cId="3485802384" sldId="5220"/>
-            <ac:spMk id="24" creationId="{0FA2F8FE-3443-44C1-8FCE-B926CD284A3D}"/>
-          </ac:spMkLst>
-        </pc:spChg>
-        <pc:spChg chg="mod">
-          <ac:chgData name="Meera Mehta" userId="7a4746cb-0892-4122-98b5-a053ac542d1e" providerId="ADAL" clId="{750CFA2E-1F33-4007-9F18-320ACDEB8DE5}" dt="2023-01-24T05:49:33.614" v="11" actId="20577"/>
-          <ac:spMkLst>
-            <pc:docMk/>
-            <pc:sldMk cId="3485802384" sldId="5220"/>
-            <ac:spMk id="25" creationId="{BFC3910A-221E-4508-9FC0-8F76E3E1B569}"/>
-          </ac:spMkLst>
-        </pc:spChg>
-        <pc:graphicFrameChg chg="modGraphic">
-          <ac:chgData name="Meera Mehta" userId="7a4746cb-0892-4122-98b5-a053ac542d1e" providerId="ADAL" clId="{750CFA2E-1F33-4007-9F18-320ACDEB8DE5}" dt="2023-01-24T05:49:23.991" v="10" actId="20577"/>
-          <ac:graphicFrameMkLst>
-            <pc:docMk/>
-            <pc:sldMk cId="3485802384" sldId="5220"/>
-            <ac:graphicFrameMk id="26" creationId="{64FD2022-30FD-820F-C1B8-FC332EE2F8A0}"/>
-          </ac:graphicFrameMkLst>
-        </pc:graphicFrameChg>
-        <pc:extLst>
-          <p:ext xmlns:p="http://schemas.openxmlformats.org/presentationml/2006/main" uri="{D6D511B9-2390-475A-947B-AFAB55BFBCF1}">
-            <pc226:cmChg xmlns:pc226="http://schemas.microsoft.com/office/powerpoint/2022/06/main/command" chg="add">
-              <pc226:chgData name="Meera Mehta" userId="7a4746cb-0892-4122-98b5-a053ac542d1e" providerId="ADAL" clId="{750CFA2E-1F33-4007-9F18-320ACDEB8DE5}" dt="2023-01-24T05:52:26.688" v="17"/>
-              <pc2:cmMkLst xmlns:pc2="http://schemas.microsoft.com/office/powerpoint/2019/9/main/command">
-                <pc:docMk/>
-                <pc:sldMk cId="3485802384" sldId="5220"/>
-                <pc2:cmMk id="{CE46C0BF-B7E1-44C7-8787-7E44E7C2B6CA}"/>
-              </pc2:cmMkLst>
-            </pc226:cmChg>
-          </p:ext>
-        </pc:extLst>
-      </pc:sldChg>
-      <pc:sldChg chg="add delCm">
-        <pc:chgData name="Meera Mehta" userId="7a4746cb-0892-4122-98b5-a053ac542d1e" providerId="ADAL" clId="{750CFA2E-1F33-4007-9F18-320ACDEB8DE5}" dt="2023-01-23T07:32:26.664" v="6"/>
-        <pc:sldMkLst>
-          <pc:docMk/>
-          <pc:sldMk cId="3935555865" sldId="5224"/>
-        </pc:sldMkLst>
-        <pc:extLst>
-          <p:ext xmlns:p="http://schemas.openxmlformats.org/presentationml/2006/main" uri="{D6D511B9-2390-475A-947B-AFAB55BFBCF1}">
-            <pc226:cmChg xmlns:pc226="http://schemas.microsoft.com/office/powerpoint/2022/06/main/command" chg="del">
-              <pc226:chgData name="Meera Mehta" userId="7a4746cb-0892-4122-98b5-a053ac542d1e" providerId="ADAL" clId="{750CFA2E-1F33-4007-9F18-320ACDEB8DE5}" dt="2023-01-23T07:32:26.664" v="6"/>
-              <pc2:cmMkLst xmlns:pc2="http://schemas.microsoft.com/office/powerpoint/2019/9/main/command">
-                <pc:docMk/>
-                <pc:sldMk cId="3935555865" sldId="5224"/>
-                <pc2:cmMk id="{8579D255-D03E-403B-A349-0EC5B9E45F86}"/>
-              </pc2:cmMkLst>
-            </pc226:cmChg>
-          </p:ext>
-        </pc:extLst>
-      </pc:sldChg>
-      <pc:sldChg chg="add del mod modClrScheme chgLayout">
-        <pc:chgData name="Meera Mehta" userId="7a4746cb-0892-4122-98b5-a053ac542d1e" providerId="ADAL" clId="{750CFA2E-1F33-4007-9F18-320ACDEB8DE5}" dt="2023-01-23T07:32:34.491" v="7" actId="2696"/>
-        <pc:sldMkLst>
-          <pc:docMk/>
-          <pc:sldMk cId="714919459" sldId="5229"/>
-        </pc:sldMkLst>
-      </pc:sldChg>
-      <pc:sldChg chg="new del">
-        <pc:chgData name="Meera Mehta" userId="7a4746cb-0892-4122-98b5-a053ac542d1e" providerId="ADAL" clId="{750CFA2E-1F33-4007-9F18-320ACDEB8DE5}" dt="2023-01-23T07:05:34.386" v="1" actId="47"/>
-        <pc:sldMkLst>
-          <pc:docMk/>
-          <pc:sldMk cId="3853244192" sldId="5229"/>
-        </pc:sldMkLst>
-      </pc:sldChg>
-      <pc:sldMasterChg chg="delSp mod delSldLayout">
-        <pc:chgData name="Meera Mehta" userId="7a4746cb-0892-4122-98b5-a053ac542d1e" providerId="ADAL" clId="{750CFA2E-1F33-4007-9F18-320ACDEB8DE5}" dt="2023-01-23T07:32:34.491" v="7" actId="2696"/>
-        <pc:sldMasterMkLst>
-          <pc:docMk/>
-          <pc:sldMasterMk cId="432213675" sldId="2147483883"/>
-        </pc:sldMasterMkLst>
-        <pc:spChg chg="del">
-          <ac:chgData name="Meera Mehta" userId="7a4746cb-0892-4122-98b5-a053ac542d1e" providerId="ADAL" clId="{750CFA2E-1F33-4007-9F18-320ACDEB8DE5}" dt="2023-01-23T07:07:07.283" v="4" actId="478"/>
-          <ac:spMkLst>
-            <pc:docMk/>
-            <pc:sldMasterMk cId="432213675" sldId="2147483883"/>
-            <ac:spMk id="8" creationId="{00000000-0000-0000-0000-000000000000}"/>
-          </ac:spMkLst>
-        </pc:spChg>
-        <pc:sldLayoutChg chg="del">
-          <pc:chgData name="Meera Mehta" userId="7a4746cb-0892-4122-98b5-a053ac542d1e" providerId="ADAL" clId="{750CFA2E-1F33-4007-9F18-320ACDEB8DE5}" dt="2023-01-23T07:32:34.491" v="7" actId="2696"/>
-          <pc:sldLayoutMkLst>
-            <pc:docMk/>
-            <pc:sldMasterMk cId="432213675" sldId="2147483883"/>
-            <pc:sldLayoutMk cId="1154568548" sldId="2147483895"/>
-          </pc:sldLayoutMkLst>
-        </pc:sldLayoutChg>
-      </pc:sldMasterChg>
-    </pc:docChg>
-  </pc:docChgLst>
-</pc:chgInfo>
 </file>
 
 <file path=ppt/comments/moderncomment1.xml><?xml version="1.0" encoding="utf-8"?>
 <p188:cmLst xmlns:pc="http://schemas.microsoft.com/office/powerpoint/2013/main/command" xmlns:ac="http://schemas.microsoft.com/office/drawing/2013/main/command" xmlns:a="http://schemas.openxmlformats.org/drawingml/2006/main" xmlns:r="http://schemas.openxmlformats.org/officeDocument/2006/relationships" xmlns:m="http://schemas.openxmlformats.org/officeDocument/2006/math" xmlns:w="http://schemas.openxmlformats.org/wordprocessingml/2006/main" xmlns:wp="http://schemas.openxmlformats.org/drawingml/2006/wordprocessingDrawing" xmlns:a14="http://schemas.microsoft.com/office/drawing/2010/main" xmlns:p="http://schemas.openxmlformats.org/presentationml/2006/main" xmlns:p188="http://schemas.microsoft.com/office/powerpoint/2018/8/main">
-  <p188:cm id="{211B9E52-A413-43C4-900B-D99FF02ABEA3}" authorId="{07CD90FA-E915-4AD6-992C-830F90B9A2E9}" created="2023-10-09T18:52:11.5770000">
+  <p188:cm id="{F00DF31D-C020-422E-B164-B695B2A58F39}" authorId="{0AFD991A-DE7F-4F83-AF8C-13D7C566DFAB}" created="2023-10-09T20:22:13.2770000">
     <pc:sldMkLst>
       <pc:docMk/>
       <pc:sldMk cId="1336223982" sldId="5226"/>
@@ -609,13 +488,14 @@
           <a:rPr/>
           <a:t>Pdf name: Pipeline deck _Reference binder.pdf
 Pdf page number: 65
+Slide text:Cardiometabolic diseases
 Pdf matched content: It is being investigated for the treatment of ulcerative colitis. OLPASIRAN (formerly AMG 890) Cardiometabolic Cardiovascular Disease siRNA DESCRIPTION Olpasiran (formerly AMG 890) is a small interfering RNA (siRNA) that lowers lipoprotein(a), also known as Lp(a).
 </a:t>
         </a:r>
       </a:p>
     </p188:txBody>
   </p188:cm>
-  <p188:cm id="{338089A7-6D56-4776-9CAD-E123B239D207}" authorId="{07CD90FA-E915-4AD6-992C-830F90B9A2E9}" created="2023-10-09T18:52:11.5770000">
+  <p188:cm id="{C6F20E00-A4AF-4D33-84AC-149A71C12A09}" authorId="{0AFD991A-DE7F-4F83-AF8C-13D7C566DFAB}" created="2023-10-09T20:22:13.2770000">
     <pc:sldMkLst>
       <pc:docMk/>
       <pc:sldMk cId="1336223982" sldId="5226"/>
@@ -629,567 +509,8 @@
           <a:rPr/>
           <a:t>Pdf name: Pipeline deck _Reference binder.pdf
 Pdf page number: 61
+Slide text:Modalities in use across the pipeline and marketed products Modality refers to the structural template of a therapeutic agent
 Pdf matched content: MOLECULE NAME THERAPEUTIC AREA INVESTIGATIONAL INDICATION MODALITY PHASE *Modalities in use across pipeline and marketed products. Modality refers to the structural template of a therapeutic agent.
-</a:t>
-        </a:r>
-      </a:p>
-    </p188:txBody>
-  </p188:cm>
-  <p188:cm id="{2A7A87E5-7134-4F36-A6F2-D010D251D1F5}" authorId="{07CD90FA-E915-4AD6-992C-830F90B9A2E9}" created="2023-10-09T18:52:11.5770000">
-    <pc:sldMkLst>
-      <pc:docMk/>
-      <pc:sldMk cId="1336223982" sldId="5226"/>
-    </pc:sldMkLst>
-    <p188:pos x="8020050" y="7139"/>
-    <p188:txBody>
-      <a:bodyPr/>
-      <a:lstStyle/>
-      <a:p>
-        <a:r>
-          <a:rPr/>
-          <a:t>Pdf name: Pipeline deck _Reference binder.pdf
-Pdf page number: 58
-Pdf matched content: Terms of Use (https://www.amgen.com/terms-of-use/)Privacy Statement (https://www.amgen.com/privacy-statement/) Amgen.com (https://www.amgen.com/)
-</a:t>
-        </a:r>
-      </a:p>
-    </p188:txBody>
-  </p188:cm>
-  <p188:cm id="{EBBD2769-2F5E-489A-AC46-775B448A5016}" authorId="{07CD90FA-E915-4AD6-992C-830F90B9A2E9}" created="2023-10-09T18:52:11.5770000">
-    <pc:sldMkLst>
-      <pc:docMk/>
-      <pc:sldMk cId="1336223982" sldId="5226"/>
-    </pc:sldMkLst>
-    <p188:pos x="692493" y="137441"/>
-    <p188:txBody>
-      <a:bodyPr/>
-      <a:lstStyle/>
-      <a:p>
-        <a:r>
-          <a:rPr/>
-          <a:t>Pdf name: Pipeline deck _Reference binder.pdf
-Pdf page number: 53
-Pdf matched content: 1/16/23, 1:19 PM Amgen Medical Products | Prescribing Information | Amgen MedInfo US https://www.amgenmedinfo.com/s/us/explore-our-medical-products?language=en_US 3/8 Approved Labeling Enbrel® - Prescribing Information (http://pi.amgen.com/united_states/enbrel/derm/enbrel_pi.pdf) Enbrel® - Prescribing Information (http://pi.amgen.com/united_states/enbrel/derm/enbrel_pi.pdf) Enbrel® - Medication Guide (https://www.pi.amgen.com/~/media/amgen/repositorysites/pi-amgen-com/enbrel/enbre… Enbrel® - Patient Instructions for Use (https://www.pi.amgen.com/~/media/amgen/repositorysites/pi-amgen-com/en… EPOGEN (Epoetin alfa) Therapeutic Area(s) Nephrology Approved Labeling EPOGEN® - Prescribing Information (http://pi.amgen.com/united_states/epogen/epogen_pi_hcp_english.pdf) EPOGEN® - Patient Instructions for Use (https://www.pi.amgen.com/~/media/amgen/repositorysites/pi-amgen-com/… EPOGEN® - Medication Guide (https://www.pi.amgen.com/~/media/amgen/repositorysites/pi-amgen-com/epogen/e… EVENITY (romosozumab-aqqg) Therapeutic Area(s) Bone Health Approved Labeling EVENITY® - Prescribing Information (https://www.pi.amgen.com/united_states/evenity/evenity_pi_hcp_english.pdf) EVENITY® - Medication Guide (https://www.pi.amgen.com/~/media/amgen/repositorysites/pi-amgen-com/evenity/e… IMLYGIC (talimogene laherparepvec) Therapeutic Area(s) Hematology / Oncology Approved Labeling IMLYGIC® - Prescribing Information (http://pi.amgen.com/united_states/imlygic/imlygic_pi.pdf) IMLYGIC® - Medication Guide (https://www.pi.amgen.com/~/media/amgen/repositorysites/pi-amgen-com/imlygic/im… KANJINTI (trastuzumab-anns) ® ® ® ™
-</a:t>
-        </a:r>
-      </a:p>
-    </p188:txBody>
-  </p188:cm>
-  <p188:cm id="{D2B5F3A6-1AB0-42B5-9551-8FB33A17CF17}" authorId="{07CD90FA-E915-4AD6-992C-830F90B9A2E9}" created="2023-10-09T18:52:11.5770000">
-    <pc:sldMkLst>
-      <pc:docMk/>
-      <pc:sldMk cId="1336223982" sldId="5226"/>
-    </pc:sldMkLst>
-    <p188:pos x="3967506" y="137441"/>
-    <p188:txBody>
-      <a:bodyPr/>
-      <a:lstStyle/>
-      <a:p>
-        <a:r>
-          <a:rPr/>
-          <a:t>Pdf name: Pipeline deck _Reference binder.pdf
-Pdf page number: 56
-Pdf matched content: 1/16/23, 1:19 PM Amgen Medical Products | Prescribing Information | Amgen MedInfo US https://www.amgenmedinfo.com/s/us/explore-our-medical-products?language=en_US 6/8 Approved Labeling Parsabiv® - Prescribing Information (http://pi.amgen.com/united_states/parsabiv/parsabiv_pi.pdf) Prolia (denosumab) Therapeutic Area(s) Bone Health Approved Labeling Prolia® - Prescribing Information (http://pi.amgen.com/united_states/prolia/prolia_pi.pdf) Prolia® - Medication Guide (https://www.pi.amgen.com/~/media/amgen/repositorysites/pi-amgen-com/prolia/prolia_… Repatha (evolocumab) Therapeutic Area(s) Cardiovascular Disease Approved Labeling Repatha® - Prescribing Information (http://pi.amgen.com/united_states/repatha/repatha_pi_hcp_english.pdf) RIABNI (rituximab-arrx) Therapeutic Area(s) Hematology / Oncology Approved Labeling RIABNI™ - Prescribing Information (https://www.pi.amgen.com/united_states/riabni/riabni_pi_english.pdf) RIABNI™ - Medication Guide (https://www.pi.amgen.com/united_states/riabni/riabni_mg_hcp_english.pdf) Sensipar (cinacalcet) Therapeutic Area(s) Nephrology Approved Labeling Sensipar® - Prescribing Information (http://pi.amgen.com/united_states/sensipar/sensipar_pi_hcp_english.pdf) ® ® ™ ®
-</a:t>
-        </a:r>
-      </a:p>
-    </p188:txBody>
-  </p188:cm>
-  <p188:cm id="{28EA829C-5F33-4AE8-9263-C00A0BFE19D8}" authorId="{07CD90FA-E915-4AD6-992C-830F90B9A2E9}" created="2023-10-09T18:52:11.5780000">
-    <pc:sldMkLst>
-      <pc:docMk/>
-      <pc:sldMk cId="1336223982" sldId="5226"/>
-    </pc:sldMkLst>
-    <p188:pos x="1530350" y="267743"/>
-    <p188:txBody>
-      <a:bodyPr/>
-      <a:lstStyle/>
-      <a:p>
-        <a:r>
-          <a:rPr/>
-          <a:t>Pdf name: Pipeline deck _Reference binder.pdf
-Pdf page number: 51
-Pdf matched content: 1/16/23, 1:19 PM Amgen Medical Products | Prescribing Information | Amgen MedInfo US https://www.amgenmedinfo.com/s/us/explore-our-medical-products?language=en_US 1/8 Home (/s/us/home)Amgen.com (https://www.amgen.com/)Contact Us (https://www.amgenmedinfo.com/s/us/contact-us?language=en_US)LoginRegister (https://www.amgenmedinfo.com/s/us/create-account?language=en_US) (/s/us/home) Our Product Information Search by product name ALL ABCDEFGHIJKLMNOPQRSTU VWXYZ Aimovig (erenumab-aooe) Therapeutic Area(s) Neuroscience Approved Labeling Aimovig® - Prescribing Information (https://pi.amgen.com/united_states/Aimovig/Aimovig_pi_hcp_english.pdf) Aimovig® - Patient Information (https://www.pi.amgen.com/~/media/amgen/repositorysites/pi-amgen-com/aimovig/a… AMJEVITA (adalimumab-atto) Therapeutic Area(s) Inflammation Approved Labeling AMJEVITA™ - Prescribing Information (http://pi.amgen.com/united_states/AMJEVITA/AMJEVITA_pi_hcp_english.pdf) Aranesp (darbepoetin alfa) Therapeutic Area(s) Nephrology Hematology / Oncology Submit InquiryStability CalculatorOur ProductsFind Your MSLSearch Medical Information Home &amp;gt; Our Products ® ™ ® Medinfo Chatbot.
-</a:t>
-        </a:r>
-      </a:p>
-    </p188:txBody>
-  </p188:cm>
-  <p188:cm id="{F9CE960F-65FD-4B7E-B82B-DF2E7CE1D98B}" authorId="{07CD90FA-E915-4AD6-992C-830F90B9A2E9}" created="2023-10-09T18:52:11.5780000">
-    <pc:sldMkLst>
-      <pc:docMk/>
-      <pc:sldMk cId="1336223982" sldId="5226"/>
-    </pc:sldMkLst>
-    <p188:pos x="5864225" y="267743"/>
-    <p188:txBody>
-      <a:bodyPr/>
-      <a:lstStyle/>
-      <a:p>
-        <a:r>
-          <a:rPr/>
-          <a:t>Pdf name: Pipeline deck _Reference binder.pdf
-Pdf page number: 58
-Pdf matched content: Terms of Use (https://www.amgen.com/terms-of-use/)Privacy Statement (https://www.amgen.com/privacy-statement/) Amgen.com (https://www.amgen.com/)
-</a:t>
-        </a:r>
-      </a:p>
-    </p188:txBody>
-  </p188:cm>
-  <p188:cm id="{9231B850-576D-4445-BEC6-D08DC039EC5F}" authorId="{07CD90FA-E915-4AD6-992C-830F90B9A2E9}" created="2023-10-09T18:52:11.5780000">
-    <pc:sldMkLst>
-      <pc:docMk/>
-      <pc:sldMk cId="1336223982" sldId="5226"/>
-    </pc:sldMkLst>
-    <p188:pos x="614362" y="398045"/>
-    <p188:txBody>
-      <a:bodyPr/>
-      <a:lstStyle/>
-      <a:p>
-        <a:r>
-          <a:rPr/>
-          <a:t>Pdf name: Pipeline deck _Reference binder.pdf
-Pdf page number: 56
-Pdf matched content: 1/16/23, 1:19 PM Amgen Medical Products | Prescribing Information | Amgen MedInfo US https://www.amgenmedinfo.com/s/us/explore-our-medical-products?language=en_US 6/8 Approved Labeling Parsabiv® - Prescribing Information (http://pi.amgen.com/united_states/parsabiv/parsabiv_pi.pdf) Prolia (denosumab) Therapeutic Area(s) Bone Health Approved Labeling Prolia® - Prescribing Information (http://pi.amgen.com/united_states/prolia/prolia_pi.pdf) Prolia® - Medication Guide (https://www.pi.amgen.com/~/media/amgen/repositorysites/pi-amgen-com/prolia/prolia_… Repatha (evolocumab) Therapeutic Area(s) Cardiovascular Disease Approved Labeling Repatha® - Prescribing Information (http://pi.amgen.com/united_states/repatha/repatha_pi_hcp_english.pdf) RIABNI (rituximab-arrx) Therapeutic Area(s) Hematology / Oncology Approved Labeling RIABNI™ - Prescribing Information (https://www.pi.amgen.com/united_states/riabni/riabni_pi_english.pdf) RIABNI™ - Medication Guide (https://www.pi.amgen.com/united_states/riabni/riabni_mg_hcp_english.pdf) Sensipar (cinacalcet) Therapeutic Area(s) Nephrology Approved Labeling Sensipar® - Prescribing Information (http://pi.amgen.com/united_states/sensipar/sensipar_pi_hcp_english.pdf) ® ® ™ ®
-</a:t>
-        </a:r>
-      </a:p>
-    </p188:txBody>
-  </p188:cm>
-  <p188:cm id="{BA9A00AA-7452-4947-9B92-93EE3930F3B2}" authorId="{07CD90FA-E915-4AD6-992C-830F90B9A2E9}" created="2023-10-09T18:52:11.5780000">
-    <pc:sldMkLst>
-      <pc:docMk/>
-      <pc:sldMk cId="1336223982" sldId="5226"/>
-    </pc:sldMkLst>
-    <p188:pos x="3109912" y="398045"/>
-    <p188:txBody>
-      <a:bodyPr/>
-      <a:lstStyle/>
-      <a:p>
-        <a:r>
-          <a:rPr/>
-          <a:t>Pdf name: Pipeline deck _Reference binder.pdf
-Pdf page number: 54
-Pdf matched content: 1/16/23, 1:19 PM Amgen Medical Products | Prescribing Information | Amgen MedInfo US https://www.amgenmedinfo.com/s/us/explore-our-medical-products?language=en_US 4/8 Therapeutic Area(s) Hematology / Oncology Approved Labeling KANJINTI™ - Prescribing Information (https://www.pi.amgen.com/~/media/amgen/repositorysites/pi-amgen-com/ka… Kyprolis (carfilzomib) Therapeutic Area(s) Hematology / Oncology Approved Labeling Kyprolis® - Prescribing Information (http://pi.amgen.com/united_states/kyprolis/kyprolis_pi.pdf) LUMAKRAS (sotorasib) Therapeutic Area(s) Oncology Approved Labeling LUMAKRAS® - Prescribing Information (https://www.pi.amgen.com/~/media/amgen/repositorysites/pi-amgen-com/l… LUMAKRAS® - Patient Information (https://www.pi.amgen.com/~/media/amgen/repositorysites/pi-amgen-com/luma… MVASI (bevacizumab-awwb) Therapeutic Area(s) Hematology / Oncology Approved Labeling MVASI™ - Prescribing Information (https://www.pi.amgen.com/~/media/amgen/repositorysites/pi-amgen-com/mvasi… Neulasta (pegfilgrastim) Therapeutic Area(s) Hematology / Oncology ® ® ™ ®
-</a:t>
-        </a:r>
-      </a:p>
-    </p188:txBody>
-  </p188:cm>
-  <p188:cm id="{E53E7194-1C88-4B2A-BBA3-FE98FE3E2146}" authorId="{07CD90FA-E915-4AD6-992C-830F90B9A2E9}" created="2023-10-09T18:52:11.5780000">
-    <pc:sldMkLst>
-      <pc:docMk/>
-      <pc:sldMk cId="1336223982" sldId="5226"/>
-    </pc:sldMkLst>
-    <p188:pos x="6740525" y="398045"/>
-    <p188:txBody>
-      <a:bodyPr/>
-      <a:lstStyle/>
-      <a:p>
-        <a:r>
-          <a:rPr/>
-          <a:t>Pdf name: Pipeline deck _Reference binder.pdf
-Pdf page number: 140
-Pdf matched content: ARANESP® (darbepoetin alfa) injection, for intravenous or subcutaneous use Initial US Approval: 2001 WARNING: ESAs INCREASE THE RISK OF DEATH, MYOCARDIAL INFARCTION, STROKE, VENOUS THROMBOEMBOLISM, THROMBOSIS OF VASCULAR ACCESS AND TUMOR PROGRESSION OR RECURRENCE See full prescribing information for complete boxed warning.
-</a:t>
-        </a:r>
-      </a:p>
-    </p188:txBody>
-  </p188:cm>
-  <p188:cm id="{7FFC1174-21C2-4F43-AB9A-8733ABDD0BDB}" authorId="{07CD90FA-E915-4AD6-992C-830F90B9A2E9}" created="2023-10-09T18:52:11.5780000">
-    <pc:sldMkLst>
-      <pc:docMk/>
-      <pc:sldMk cId="1336223982" sldId="5226"/>
-    </pc:sldMkLst>
-    <p188:pos x="754062" y="528347"/>
-    <p188:txBody>
-      <a:bodyPr/>
-      <a:lstStyle/>
-      <a:p>
-        <a:r>
-          <a:rPr/>
-          <a:t>Pdf name: Pipeline deck _Reference binder.pdf
-Pdf page number: 242
-Pdf matched content: BLINCYTO® (blinatumomab) for injection, for intravenous use Initial US Approval: 2014 WARNING: CYTOKINE RELEASE SYNDROME and NEUROLOGICAL TOXICITIES See full prescribing information for complete boxed warning.
-</a:t>
-        </a:r>
-      </a:p>
-    </p188:txBody>
-  </p188:cm>
-  <p188:cm id="{7E394233-90F2-40C8-9B68-1C35BF3BA3F3}" authorId="{07CD90FA-E915-4AD6-992C-830F90B9A2E9}" created="2023-10-09T18:52:11.5780000">
-    <pc:sldMkLst>
-      <pc:docMk/>
-      <pc:sldMk cId="1336223982" sldId="5226"/>
-    </pc:sldMkLst>
-    <p188:pos x="3990975" y="528347"/>
-    <p188:txBody>
-      <a:bodyPr/>
-      <a:lstStyle/>
-      <a:p>
-        <a:r>
-          <a:rPr/>
-          <a:t>Pdf name: Pipeline deck _Reference binder.pdf
-Pdf page number: 53
-Pdf matched content: 1/16/23, 1:19 PM Amgen Medical Products | Prescribing Information | Amgen MedInfo US https://www.amgenmedinfo.com/s/us/explore-our-medical-products?language=en_US 3/8 Approved Labeling Enbrel® - Prescribing Information (http://pi.amgen.com/united_states/enbrel/derm/enbrel_pi.pdf) Enbrel® - Prescribing Information (http://pi.amgen.com/united_states/enbrel/derm/enbrel_pi.pdf) Enbrel® - Medication Guide (https://www.pi.amgen.com/~/media/amgen/repositorysites/pi-amgen-com/enbrel/enbre… Enbrel® - Patient Instructions for Use (https://www.pi.amgen.com/~/media/amgen/repositorysites/pi-amgen-com/en… EPOGEN (Epoetin alfa) Therapeutic Area(s) Nephrology Approved Labeling EPOGEN® - Prescribing Information (http://pi.amgen.com/united_states/epogen/epogen_pi_hcp_english.pdf) EPOGEN® - Patient Instructions for Use (https://www.pi.amgen.com/~/media/amgen/repositorysites/pi-amgen-com/… EPOGEN® - Medication Guide (https://www.pi.amgen.com/~/media/amgen/repositorysites/pi-amgen-com/epogen/e… EVENITY (romosozumab-aqqg) Therapeutic Area(s) Bone Health Approved Labeling EVENITY® - Prescribing Information (https://www.pi.amgen.com/united_states/evenity/evenity_pi_hcp_english.pdf) EVENITY® - Medication Guide (https://www.pi.amgen.com/~/media/amgen/repositorysites/pi-amgen-com/evenity/e… IMLYGIC (talimogene laherparepvec) Therapeutic Area(s) Hematology / Oncology Approved Labeling IMLYGIC® - Prescribing Information (http://pi.amgen.com/united_states/imlygic/imlygic_pi.pdf) IMLYGIC® - Medication Guide (https://www.pi.amgen.com/~/media/amgen/repositorysites/pi-amgen-com/imlygic/im… KANJINTI (trastuzumab-anns) ® ® ® ™
-</a:t>
-        </a:r>
-      </a:p>
-    </p188:txBody>
-  </p188:cm>
-  <p188:cm id="{BFC099D5-D861-41DB-80CB-BEAF97C4007C}" authorId="{07CD90FA-E915-4AD6-992C-830F90B9A2E9}" created="2023-10-09T18:52:11.5780000">
-    <pc:sldMkLst>
-      <pc:docMk/>
-      <pc:sldMk cId="1336223982" sldId="5226"/>
-    </pc:sldMkLst>
-    <p188:pos x="7081838" y="528347"/>
-    <p188:txBody>
-      <a:bodyPr/>
-      <a:lstStyle/>
-      <a:p>
-        <a:r>
-          <a:rPr/>
-          <a:t>Pdf name: Pipeline deck _Reference binder.pdf
-Pdf page number: 53
-Pdf matched content: 1/16/23, 1:19 PM Amgen Medical Products | Prescribing Information | Amgen MedInfo US https://www.amgenmedinfo.com/s/us/explore-our-medical-products?language=en_US 3/8 Approved Labeling Enbrel® - Prescribing Information (http://pi.amgen.com/united_states/enbrel/derm/enbrel_pi.pdf) Enbrel® - Prescribing Information (http://pi.amgen.com/united_states/enbrel/derm/enbrel_pi.pdf) Enbrel® - Medication Guide (https://www.pi.amgen.com/~/media/amgen/repositorysites/pi-amgen-com/enbrel/enbre… Enbrel® - Patient Instructions for Use (https://www.pi.amgen.com/~/media/amgen/repositorysites/pi-amgen-com/en… EPOGEN (Epoetin alfa) Therapeutic Area(s) Nephrology Approved Labeling EPOGEN® - Prescribing Information (http://pi.amgen.com/united_states/epogen/epogen_pi_hcp_english.pdf) EPOGEN® - Patient Instructions for Use (https://www.pi.amgen.com/~/media/amgen/repositorysites/pi-amgen-com/… EPOGEN® - Medication Guide (https://www.pi.amgen.com/~/media/amgen/repositorysites/pi-amgen-com/epogen/e… EVENITY (romosozumab-aqqg) Therapeutic Area(s) Bone Health Approved Labeling EVENITY® - Prescribing Information (https://www.pi.amgen.com/united_states/evenity/evenity_pi_hcp_english.pdf) EVENITY® - Medication Guide (https://www.pi.amgen.com/~/media/amgen/repositorysites/pi-amgen-com/evenity/e… IMLYGIC (talimogene laherparepvec) Therapeutic Area(s) Hematology / Oncology Approved Labeling IMLYGIC® - Prescribing Information (http://pi.amgen.com/united_states/imlygic/imlygic_pi.pdf) IMLYGIC® - Medication Guide (https://www.pi.amgen.com/~/media/amgen/repositorysites/pi-amgen-com/imlygic/im… KANJINTI (trastuzumab-anns) ® ® ® ™
-</a:t>
-        </a:r>
-      </a:p>
-    </p188:txBody>
-  </p188:cm>
-  <p188:cm id="{B7B6E0D3-57B0-4C94-8C72-2CACEF4FDC65}" authorId="{07CD90FA-E915-4AD6-992C-830F90B9A2E9}" created="2023-10-09T18:52:11.5780000">
-    <pc:sldMkLst>
-      <pc:docMk/>
-      <pc:sldMk cId="1336223982" sldId="5226"/>
-    </pc:sldMkLst>
-    <p188:pos x="1536700" y="658649"/>
-    <p188:txBody>
-      <a:bodyPr/>
-      <a:lstStyle/>
-      <a:p>
-        <a:r>
-          <a:rPr/>
-          <a:t>Pdf name: Pipeline deck _Reference binder.pdf
-Pdf page number: 486
-Pdf matched content: One week after the last weekly dose of KANJINTI, administer 6 mg/kg as an IV infusion over 30−90 minutes every three weeks to complete a total of 52 weeks of therapy, or • Initial dose of 8 mg/kg over 90 minutes IV infusion, then 6 mg/kg over 30–90 minutes IV infusion every three weeks for 52 weeks.
-</a:t>
-        </a:r>
-      </a:p>
-    </p188:txBody>
-  </p188:cm>
-  <p188:cm id="{F8D02AD3-1902-47FA-87F7-21FBF5E2003D}" authorId="{07CD90FA-E915-4AD6-992C-830F90B9A2E9}" created="2023-10-09T18:52:11.5790000">
-    <pc:sldMkLst>
-      <pc:docMk/>
-      <pc:sldMk cId="1336223982" sldId="5226"/>
-    </pc:sldMkLst>
-    <p188:pos x="5707062" y="658649"/>
-    <p188:txBody>
-      <a:bodyPr/>
-      <a:lstStyle/>
-      <a:p>
-        <a:r>
-          <a:rPr/>
-          <a:t>Pdf name: Pipeline deck _Reference binder.pdf
-Pdf page number: 54
-Pdf matched content: 1/16/23, 1:19 PM Amgen Medical Products | Prescribing Information | Amgen MedInfo US https://www.amgenmedinfo.com/s/us/explore-our-medical-products?language=en_US 4/8 Therapeutic Area(s) Hematology / Oncology Approved Labeling KANJINTI™ - Prescribing Information (https://www.pi.amgen.com/~/media/amgen/repositorysites/pi-amgen-com/ka… Kyprolis (carfilzomib) Therapeutic Area(s) Hematology / Oncology Approved Labeling Kyprolis® - Prescribing Information (http://pi.amgen.com/united_states/kyprolis/kyprolis_pi.pdf) LUMAKRAS (sotorasib) Therapeutic Area(s) Oncology Approved Labeling LUMAKRAS® - Prescribing Information (https://www.pi.amgen.com/~/media/amgen/repositorysites/pi-amgen-com/l… LUMAKRAS® - Patient Information (https://www.pi.amgen.com/~/media/amgen/repositorysites/pi-amgen-com/luma… MVASI (bevacizumab-awwb) Therapeutic Area(s) Hematology / Oncology Approved Labeling MVASI™ - Prescribing Information (https://www.pi.amgen.com/~/media/amgen/repositorysites/pi-amgen-com/mvasi… Neulasta (pegfilgrastim) Therapeutic Area(s) Hematology / Oncology ® ® ™ ®
-</a:t>
-        </a:r>
-      </a:p>
-    </p188:txBody>
-  </p188:cm>
-  <p188:cm id="{8DBAC17F-7163-450C-B778-78232F00F182}" authorId="{07CD90FA-E915-4AD6-992C-830F90B9A2E9}" created="2023-10-09T18:52:11.5790000">
-    <pc:sldMkLst>
-      <pc:docMk/>
-      <pc:sldMk cId="1336223982" sldId="5226"/>
-    </pc:sldMkLst>
-    <p188:pos x="601662" y="788951"/>
-    <p188:txBody>
-      <a:bodyPr/>
-      <a:lstStyle/>
-      <a:p>
-        <a:r>
-          <a:rPr/>
-          <a:t>Pdf name: Pipeline deck _Reference binder.pdf
-Pdf page number: 54
-Pdf matched content: 1/16/23, 1:19 PM Amgen Medical Products | Prescribing Information | Amgen MedInfo US https://www.amgenmedinfo.com/s/us/explore-our-medical-products?language=en_US 4/8 Therapeutic Area(s) Hematology / Oncology Approved Labeling KANJINTI™ - Prescribing Information (https://www.pi.amgen.com/~/media/amgen/repositorysites/pi-amgen-com/ka… Kyprolis (carfilzomib) Therapeutic Area(s) Hematology / Oncology Approved Labeling Kyprolis® - Prescribing Information (http://pi.amgen.com/united_states/kyprolis/kyprolis_pi.pdf) LUMAKRAS (sotorasib) Therapeutic Area(s) Oncology Approved Labeling LUMAKRAS® - Prescribing Information (https://www.pi.amgen.com/~/media/amgen/repositorysites/pi-amgen-com/l… LUMAKRAS® - Patient Information (https://www.pi.amgen.com/~/media/amgen/repositorysites/pi-amgen-com/luma… MVASI (bevacizumab-awwb) Therapeutic Area(s) Hematology / Oncology Approved Labeling MVASI™ - Prescribing Information (https://www.pi.amgen.com/~/media/amgen/repositorysites/pi-amgen-com/mvasi… Neulasta (pegfilgrastim) Therapeutic Area(s) Hematology / Oncology ® ® ™ ®
-</a:t>
-        </a:r>
-      </a:p>
-    </p188:txBody>
-  </p188:cm>
-  <p188:cm id="{2508CB45-E346-43B2-8B42-9EF0D43737B9}" authorId="{07CD90FA-E915-4AD6-992C-830F90B9A2E9}" created="2023-10-09T18:52:11.5790000">
-    <pc:sldMkLst>
-      <pc:docMk/>
-      <pc:sldMk cId="1336223982" sldId="5226"/>
-    </pc:sldMkLst>
-    <p188:pos x="4086225" y="788951"/>
-    <p188:txBody>
-      <a:bodyPr/>
-      <a:lstStyle/>
-      <a:p>
-        <a:r>
-          <a:rPr/>
-          <a:t>Pdf name: Pipeline deck _Reference binder.pdf
-Pdf page number: 55
-Pdf matched content: 1/16/23, 1:19 PM Amgen Medical Products | Prescribing Information | Amgen MedInfo US https://www.amgenmedinfo.com/s/us/explore-our-medical-products?language=en_US 5/8 Approved Labeling Neulasta® - Prescribing Information (http://pi.amgen.com/united_states/neulasta/neulasta_pi_hcp_english.pdf) Neulasta® - Patient Instructions for Use (https://www.pi.amgen.com/~/media/amgen/repositorysites/pi-amgen-com/… NEUPOGEN (Filgrastim) Therapeutic Area(s) Hematology / Oncology Approved Labeling NEUPOGEN® - Prescribing Information (http://pi.amgen.com/united_states/neupogen/neupogen_pi_hcp_english.pdf) Nplate (romiplostim) Therapeutic Area(s) Hematology / Oncology Approved Labeling Nplate® - Prescribing Information (http://pi.amgen.com/united_states/nplate/nplate_pi_hcp_english.pdf) Otezla (apremilast) Therapeutic Area(s) Inflammation Approved Labeling Otezla® - Prescribing Information (https://www.pi.amgen.com/~/media/amgen/repositorysites/pi-amgen-com/otezla/… Otezla® - Prescribing Information (https://www.pi.amgen.com/~/media/amgen/repositorysites/pi-amgen-com/otezla/… Parsabiv (etelcalcetide) Therapeutic Area(s) Nephrology ® ® ® ®
-</a:t>
-        </a:r>
-      </a:p>
-    </p188:txBody>
-  </p188:cm>
-  <p188:cm id="{FB37DDE8-E51B-442E-A76C-93D257EC0866}" authorId="{07CD90FA-E915-4AD6-992C-830F90B9A2E9}" created="2023-10-09T18:52:11.5790000">
-    <pc:sldMkLst>
-      <pc:docMk/>
-      <pc:sldMk cId="1336223982" sldId="5226"/>
-    </pc:sldMkLst>
-    <p188:pos x="7418388" y="788951"/>
-    <p188:txBody>
-      <a:bodyPr/>
-      <a:lstStyle/>
-      <a:p>
-        <a:r>
-          <a:rPr/>
-          <a:t>Pdf name: Pipeline deck _Reference binder.pdf
-Pdf page number: 55
-Pdf matched content: 1/16/23, 1:19 PM Amgen Medical Products | Prescribing Information | Amgen MedInfo US https://www.amgenmedinfo.com/s/us/explore-our-medical-products?language=en_US 5/8 Approved Labeling Neulasta® - Prescribing Information (http://pi.amgen.com/united_states/neulasta/neulasta_pi_hcp_english.pdf) Neulasta® - Patient Instructions for Use (https://www.pi.amgen.com/~/media/amgen/repositorysites/pi-amgen-com/… NEUPOGEN (Filgrastim) Therapeutic Area(s) Hematology / Oncology Approved Labeling NEUPOGEN® - Prescribing Information (http://pi.amgen.com/united_states/neupogen/neupogen_pi_hcp_english.pdf) Nplate (romiplostim) Therapeutic Area(s) Hematology / Oncology Approved Labeling Nplate® - Prescribing Information (http://pi.amgen.com/united_states/nplate/nplate_pi_hcp_english.pdf) Otezla (apremilast) Therapeutic Area(s) Inflammation Approved Labeling Otezla® - Prescribing Information (https://www.pi.amgen.com/~/media/amgen/repositorysites/pi-amgen-com/otezla/… Otezla® - Prescribing Information (https://www.pi.amgen.com/~/media/amgen/repositorysites/pi-amgen-com/otezla/… Parsabiv (etelcalcetide) Therapeutic Area(s) Nephrology ® ® ® ®
-</a:t>
-        </a:r>
-      </a:p>
-    </p188:txBody>
-  </p188:cm>
-  <p188:cm id="{75B58E81-88C1-407D-9180-9CB88BB0091D}" authorId="{07CD90FA-E915-4AD6-992C-830F90B9A2E9}" created="2023-10-09T18:52:11.5790000">
-    <pc:sldMkLst>
-      <pc:docMk/>
-      <pc:sldMk cId="1336223982" sldId="5226"/>
-    </pc:sldMkLst>
-    <p188:pos x="0" y="919253"/>
-    <p188:txBody>
-      <a:bodyPr/>
-      <a:lstStyle/>
-      <a:p>
-        <a:r>
-          <a:rPr/>
-          <a:t>Pdf name: Pipeline deck _Reference binder.pdf
-Pdf page number: 55
-Pdf matched content: 1/16/23, 1:19 PM Amgen Medical Products | Prescribing Information | Amgen MedInfo US https://www.amgenmedinfo.com/s/us/explore-our-medical-products?language=en_US 5/8 Approved Labeling Neulasta® - Prescribing Information (http://pi.amgen.com/united_states/neulasta/neulasta_pi_hcp_english.pdf) Neulasta® - Patient Instructions for Use (https://www.pi.amgen.com/~/media/amgen/repositorysites/pi-amgen-com/… NEUPOGEN (Filgrastim) Therapeutic Area(s) Hematology / Oncology Approved Labeling NEUPOGEN® - Prescribing Information (http://pi.amgen.com/united_states/neupogen/neupogen_pi_hcp_english.pdf) Nplate (romiplostim) Therapeutic Area(s) Hematology / Oncology Approved Labeling Nplate® - Prescribing Information (http://pi.amgen.com/united_states/nplate/nplate_pi_hcp_english.pdf) Otezla (apremilast) Therapeutic Area(s) Inflammation Approved Labeling Otezla® - Prescribing Information (https://www.pi.amgen.com/~/media/amgen/repositorysites/pi-amgen-com/otezla/… Otezla® - Prescribing Information (https://www.pi.amgen.com/~/media/amgen/repositorysites/pi-amgen-com/otezla/… Parsabiv (etelcalcetide) Therapeutic Area(s) Nephrology ® ® ® ®
-</a:t>
-        </a:r>
-      </a:p>
-    </p188:txBody>
-  </p188:cm>
-  <p188:cm id="{B711A7BF-4A07-47DF-BD1A-81847F098516}" authorId="{07CD90FA-E915-4AD6-992C-830F90B9A2E9}" created="2023-10-09T18:52:11.5790000">
-    <pc:sldMkLst>
-      <pc:docMk/>
-      <pc:sldMk cId="1336223982" sldId="5226"/>
-    </pc:sldMkLst>
-    <p188:pos x="2982912" y="919253"/>
-    <p188:txBody>
-      <a:bodyPr/>
-      <a:lstStyle/>
-      <a:p>
-        <a:r>
-          <a:rPr/>
-          <a:t>Pdf name: Pipeline deck _Reference binder.pdf
-Pdf page number: 57
-Pdf matched content: 1/16/23, 1:19 PM Amgen Medical Products | Prescribing Information | Amgen MedInfo US https://www.amgenmedinfo.com/s/us/explore-our-medical-products?language=en_US 7/8 TEZSPIRE (tezepelumab-ekko) Therapeutic Area(s) Inflammation Approved Labeling TEZSPIRE® - Patient Information (https://www.pi.amgen.com/united_states/tezspire/tezspire_ppi_pt_english.pdf) TEZSPIRE® - Prescribing Information (https://www.pi.amgen.com/united_states/tezspire/tezspire_pi_hcp_english.p… Vectibix (panitumumab) Therapeutic Area(s) Hematology / Oncology Approved Labeling Vectibix® - Prescribing Information (http://pi.amgen.com/united_states/vectibix/vectibix_pi.pdf) XGEVA (denosumab) Therapeutic Area(s) Hematology / Oncology Approved Labeling XGEVA® - Prescribing Information (http://pi.amgen.com/united_states/xgeva/xgeva_pi.pdf) XGEVA® - Prescribing Information (http://pi.amgen.com/united_states/xgeva/xgeva_pi.pdf) Submit a Medical Inquiry Submit your question to the Amgen Medical Information team (https://www.amgenmedinfo.com/s/us/submit-medical-inquiry?language=en_US) ® ® ®
-</a:t>
-        </a:r>
-      </a:p>
-    </p188:txBody>
-  </p188:cm>
-  <p188:cm id="{5CC1C3EF-7DD8-4196-8A8A-4F89CA409A92}" authorId="{07CD90FA-E915-4AD6-992C-830F90B9A2E9}" created="2023-10-09T18:52:11.5790000">
-    <pc:sldMkLst>
-      <pc:docMk/>
-      <pc:sldMk cId="1336223982" sldId="5226"/>
-    </pc:sldMkLst>
-    <p188:pos x="6099175" y="919253"/>
-    <p188:txBody>
-      <a:bodyPr/>
-      <a:lstStyle/>
-      <a:p>
-        <a:r>
-          <a:rPr/>
-          <a:t>Pdf name: Pipeline deck _Reference binder.pdf
-Pdf page number: 56
-Pdf matched content: 1/16/23, 1:19 PM Amgen Medical Products | Prescribing Information | Amgen MedInfo US https://www.amgenmedinfo.com/s/us/explore-our-medical-products?language=en_US 6/8 Approved Labeling Parsabiv® - Prescribing Information (http://pi.amgen.com/united_states/parsabiv/parsabiv_pi.pdf) Prolia (denosumab) Therapeutic Area(s) Bone Health Approved Labeling Prolia® - Prescribing Information (http://pi.amgen.com/united_states/prolia/prolia_pi.pdf) Prolia® - Medication Guide (https://www.pi.amgen.com/~/media/amgen/repositorysites/pi-amgen-com/prolia/prolia_… Repatha (evolocumab) Therapeutic Area(s) Cardiovascular Disease Approved Labeling Repatha® - Prescribing Information (http://pi.amgen.com/united_states/repatha/repatha_pi_hcp_english.pdf) RIABNI (rituximab-arrx) Therapeutic Area(s) Hematology / Oncology Approved Labeling RIABNI™ - Prescribing Information (https://www.pi.amgen.com/united_states/riabni/riabni_pi_english.pdf) RIABNI™ - Medication Guide (https://www.pi.amgen.com/united_states/riabni/riabni_mg_hcp_english.pdf) Sensipar (cinacalcet) Therapeutic Area(s) Nephrology Approved Labeling Sensipar® - Prescribing Information (http://pi.amgen.com/united_states/sensipar/sensipar_pi_hcp_english.pdf) ® ® ™ ®
-</a:t>
-        </a:r>
-      </a:p>
-    </p188:txBody>
-  </p188:cm>
-  <p188:cm id="{8BAD1D25-8AD9-423F-9FEF-7CF850DD63E4}" authorId="{07CD90FA-E915-4AD6-992C-830F90B9A2E9}" created="2023-10-09T18:52:11.5790000">
-    <pc:sldMkLst>
-      <pc:docMk/>
-      <pc:sldMk cId="1336223982" sldId="5226"/>
-    </pc:sldMkLst>
-    <p188:pos x="8639175" y="919253"/>
-    <p188:txBody>
-      <a:bodyPr/>
-      <a:lstStyle/>
-      <a:p>
-        <a:r>
-          <a:rPr/>
-          <a:t>Pdf name: Pipeline deck _Reference binder.pdf
-Pdf page number: 56
-Pdf matched content: 1/16/23, 1:19 PM Amgen Medical Products | Prescribing Information | Amgen MedInfo US https://www.amgenmedinfo.com/s/us/explore-our-medical-products?language=en_US 6/8 Approved Labeling Parsabiv® - Prescribing Information (http://pi.amgen.com/united_states/parsabiv/parsabiv_pi.pdf) Prolia (denosumab) Therapeutic Area(s) Bone Health Approved Labeling Prolia® - Prescribing Information (http://pi.amgen.com/united_states/prolia/prolia_pi.pdf) Prolia® - Medication Guide (https://www.pi.amgen.com/~/media/amgen/repositorysites/pi-amgen-com/prolia/prolia_… Repatha (evolocumab) Therapeutic Area(s) Cardiovascular Disease Approved Labeling Repatha® - Prescribing Information (http://pi.amgen.com/united_states/repatha/repatha_pi_hcp_english.pdf) RIABNI (rituximab-arrx) Therapeutic Area(s) Hematology / Oncology Approved Labeling RIABNI™ - Prescribing Information (https://www.pi.amgen.com/united_states/riabni/riabni_pi_english.pdf) RIABNI™ - Medication Guide (https://www.pi.amgen.com/united_states/riabni/riabni_mg_hcp_english.pdf) Sensipar (cinacalcet) Therapeutic Area(s) Nephrology Approved Labeling Sensipar® - Prescribing Information (http://pi.amgen.com/united_states/sensipar/sensipar_pi_hcp_english.pdf) ® ® ™ ®
-</a:t>
-        </a:r>
-      </a:p>
-    </p188:txBody>
-  </p188:cm>
-  <p188:cm id="{DC10C5BE-99BE-4386-BE76-DE9B4DC476AE}" authorId="{07CD90FA-E915-4AD6-992C-830F90B9A2E9}" created="2023-10-09T18:52:11.5790000">
-    <pc:sldMkLst>
-      <pc:docMk/>
-      <pc:sldMk cId="1336223982" sldId="5226"/>
-    </pc:sldMkLst>
-    <p188:pos x="1803400" y="1049555"/>
-    <p188:txBody>
-      <a:bodyPr/>
-      <a:lstStyle/>
-      <a:p>
-        <a:r>
-          <a:rPr/>
-          <a:t>Pdf name: Pipeline deck _Reference binder.pdf
-Pdf page number: 70
-Pdf matched content: Discontinue in patients without evidence of clinical remission by eight weeks (Day 57). Plaque Psoriasis (2.5): • Adults: 80 mg initial dose, followed by 40 mg every other week starting one week after initial dose.
-</a:t>
-        </a:r>
-      </a:p>
-    </p188:txBody>
-  </p188:cm>
-  <p188:cm id="{82CD5ED8-DA28-4891-BC1F-EB9411CD86D0}" authorId="{07CD90FA-E915-4AD6-992C-830F90B9A2E9}" created="2023-10-09T18:52:11.5790000">
-    <pc:sldMkLst>
-      <pc:docMk/>
-      <pc:sldMk cId="1336223982" sldId="5226"/>
-    </pc:sldMkLst>
-    <p188:pos x="5181600" y="1049555"/>
-    <p188:txBody>
-      <a:bodyPr/>
-      <a:lstStyle/>
-      <a:p>
-        <a:r>
-          <a:rPr/>
-          <a:t>Pdf name: Pipeline deck _Reference binder.pdf
-Pdf page number: 52
-Pdf matched content: 1/16/23, 1:19 PM Amgen Medical Products | Prescribing Information | Amgen MedInfo US https://www.amgenmedinfo.com/s/us/explore-our-medical-products?language=en_US 2/8 Approved Labeling Aranesp® - Prescribing Information (http://pi.amgen.com/united_states/aranesp/ckd/aranesp_pi_hcp_english.pdf) Aranesp® - Medication Guide (https://www.pi.amgen.com/~/media/amgen/repositorysites/pi-amgen-com/aranesp/c… Aranesp® - Patient Instructions for Use (https://www.pi.amgen.com/~/media/amgen/repositorysites/pi-amgen-com/a… AVSOLA (infliximab-axxq) Therapeutic Area(s) Inflammation Approved Labeling AVSOLA™ - Prescribing Information (https://www.pi.amgen.com/~/media/amgen/repositorysites/pi-amgen-com/avs… AVSOLA™ - Medication Guide (https://www.pi.amgen.com/~/media/amgen/repositorysites/pi-amgen-com/avsola/av… BLINCYTO (blinatumomab) Therapeutic Area(s) Hematology / Oncology Approved Labeling BLINCYTO® - Prescribing Information (http://pi.amgen.com/united_states/blincyto/blincyto_pi_hcp_english.pdf) BLINCYTO® - Medication Guide (https://www.pi.amgen.com/~/media/amgen/repositorysites/pi-amgen-com/blincyto… Corlanor (ivabradine) Therapeutic Area(s) Cardiovascular Disease Approved Labeling Corlanor® - Prescribing Information (http://pi.amgen.com/united_states/corlanor/corlanor_pi.pdf) Corlanor® - Medication Guide (https://www.pi.amgen.com/~/media/amgen/repositorysites/pi-amgen-com/corlanor/c… Enbrel (etanercept) Therapeutic Area(s) Inflammation ® ® ® ®
-</a:t>
-        </a:r>
-      </a:p>
-    </p188:txBody>
-  </p188:cm>
-  <p188:cm id="{D7646712-32B0-4992-B822-147C99813A02}" authorId="{07CD90FA-E915-4AD6-992C-830F90B9A2E9}" created="2023-10-09T18:52:11.5800000">
-    <pc:sldMkLst>
-      <pc:docMk/>
-      <pc:sldMk cId="1336223982" sldId="5226"/>
-    </pc:sldMkLst>
-    <p188:pos x="8901112" y="1049555"/>
-    <p188:txBody>
-      <a:bodyPr/>
-      <a:lstStyle/>
-      <a:p>
-        <a:r>
-          <a:rPr/>
-          <a:t>Pdf name: Pipeline deck _Reference binder.pdf
-Pdf page number: 53
-Pdf matched content: 1/16/23, 1:19 PM Amgen Medical Products | Prescribing Information | Amgen MedInfo US https://www.amgenmedinfo.com/s/us/explore-our-medical-products?language=en_US 3/8 Approved Labeling Enbrel® - Prescribing Information (http://pi.amgen.com/united_states/enbrel/derm/enbrel_pi.pdf) Enbrel® - Prescribing Information (http://pi.amgen.com/united_states/enbrel/derm/enbrel_pi.pdf) Enbrel® - Medication Guide (https://www.pi.amgen.com/~/media/amgen/repositorysites/pi-amgen-com/enbrel/enbre… Enbrel® - Patient Instructions for Use (https://www.pi.amgen.com/~/media/amgen/repositorysites/pi-amgen-com/en… EPOGEN (Epoetin alfa) Therapeutic Area(s) Nephrology Approved Labeling EPOGEN® - Prescribing Information (http://pi.amgen.com/united_states/epogen/epogen_pi_hcp_english.pdf) EPOGEN® - Patient Instructions for Use (https://www.pi.amgen.com/~/media/amgen/repositorysites/pi-amgen-com/… EPOGEN® - Medication Guide (https://www.pi.amgen.com/~/media/amgen/repositorysites/pi-amgen-com/epogen/e… EVENITY (romosozumab-aqqg) Therapeutic Area(s) Bone Health Approved Labeling EVENITY® - Prescribing Information (https://www.pi.amgen.com/united_states/evenity/evenity_pi_hcp_english.pdf) EVENITY® - Medication Guide (https://www.pi.amgen.com/~/media/amgen/repositorysites/pi-amgen-com/evenity/e… IMLYGIC (talimogene laherparepvec) Therapeutic Area(s) Hematology / Oncology Approved Labeling IMLYGIC® - Prescribing Information (http://pi.amgen.com/united_states/imlygic/imlygic_pi.pdf) IMLYGIC® - Medication Guide (https://www.pi.amgen.com/~/media/amgen/repositorysites/pi-amgen-com/imlygic/im… KANJINTI (trastuzumab-anns) ® ® ® ™
-</a:t>
-        </a:r>
-      </a:p>
-    </p188:txBody>
-  </p188:cm>
-  <p188:cm id="{CF22B97F-3185-40C1-AB52-81832DE9A752}" authorId="{07CD90FA-E915-4AD6-992C-830F90B9A2E9}" created="2023-10-09T18:52:11.5800000">
-    <pc:sldMkLst>
-      <pc:docMk/>
-      <pc:sldMk cId="1336223982" sldId="5226"/>
-    </pc:sldMkLst>
-    <p188:pos x="1744662" y="1179857"/>
-    <p188:txBody>
-      <a:bodyPr/>
-      <a:lstStyle/>
-      <a:p>
-        <a:r>
-          <a:rPr/>
-          <a:t>Pdf name: Pipeline deck _Reference binder.pdf
-Pdf page number: 55
-Pdf matched content: 1/16/23, 1:19 PM Amgen Medical Products | Prescribing Information | Amgen MedInfo US https://www.amgenmedinfo.com/s/us/explore-our-medical-products?language=en_US 5/8 Approved Labeling Neulasta® - Prescribing Information (http://pi.amgen.com/united_states/neulasta/neulasta_pi_hcp_english.pdf) Neulasta® - Patient Instructions for Use (https://www.pi.amgen.com/~/media/amgen/repositorysites/pi-amgen-com/… NEUPOGEN (Filgrastim) Therapeutic Area(s) Hematology / Oncology Approved Labeling NEUPOGEN® - Prescribing Information (http://pi.amgen.com/united_states/neupogen/neupogen_pi_hcp_english.pdf) Nplate (romiplostim) Therapeutic Area(s) Hematology / Oncology Approved Labeling Nplate® - Prescribing Information (http://pi.amgen.com/united_states/nplate/nplate_pi_hcp_english.pdf) Otezla (apremilast) Therapeutic Area(s) Inflammation Approved Labeling Otezla® - Prescribing Information (https://www.pi.amgen.com/~/media/amgen/repositorysites/pi-amgen-com/otezla/… Otezla® - Prescribing Information (https://www.pi.amgen.com/~/media/amgen/repositorysites/pi-amgen-com/otezla/… Parsabiv (etelcalcetide) Therapeutic Area(s) Nephrology ® ® ® ®
-</a:t>
-        </a:r>
-      </a:p>
-    </p188:txBody>
-  </p188:cm>
-  <p188:cm id="{921B9AFF-863F-4B63-9024-B683BCBC7D7E}" authorId="{07CD90FA-E915-4AD6-992C-830F90B9A2E9}" created="2023-10-09T18:52:11.5800000">
-    <pc:sldMkLst>
-      <pc:docMk/>
-      <pc:sldMk cId="1336223982" sldId="5226"/>
-    </pc:sldMkLst>
-    <p188:pos x="4860925" y="1179857"/>
-    <p188:txBody>
-      <a:bodyPr/>
-      <a:lstStyle/>
-      <a:p>
-        <a:r>
-          <a:rPr/>
-          <a:t>Pdf name: Pipeline deck _Reference binder.pdf
-Pdf page number: 57
-Pdf matched content: 1/16/23, 1:19 PM Amgen Medical Products | Prescribing Information | Amgen MedInfo US https://www.amgenmedinfo.com/s/us/explore-our-medical-products?language=en_US 7/8 TEZSPIRE (tezepelumab-ekko) Therapeutic Area(s) Inflammation Approved Labeling TEZSPIRE® - Patient Information (https://www.pi.amgen.com/united_states/tezspire/tezspire_ppi_pt_english.pdf) TEZSPIRE® - Prescribing Information (https://www.pi.amgen.com/united_states/tezspire/tezspire_pi_hcp_english.p… Vectibix (panitumumab) Therapeutic Area(s) Hematology / Oncology Approved Labeling Vectibix® - Prescribing Information (http://pi.amgen.com/united_states/vectibix/vectibix_pi.pdf) XGEVA (denosumab) Therapeutic Area(s) Hematology / Oncology Approved Labeling XGEVA® - Prescribing Information (http://pi.amgen.com/united_states/xgeva/xgeva_pi.pdf) XGEVA® - Prescribing Information (http://pi.amgen.com/united_states/xgeva/xgeva_pi.pdf) Submit a Medical Inquiry Submit your question to the Amgen Medical Information team (https://www.amgenmedinfo.com/s/us/submit-medical-inquiry?language=en_US) ® ® ®
-</a:t>
-        </a:r>
-      </a:p>
-    </p188:txBody>
-  </p188:cm>
-  <p188:cm id="{0EA63BA8-EC91-494F-A1F8-BA6E6656BB45}" authorId="{07CD90FA-E915-4AD6-992C-830F90B9A2E9}" created="2023-10-09T18:52:11.5800000">
-    <pc:sldMkLst>
-      <pc:docMk/>
-      <pc:sldMk cId="1336223982" sldId="5226"/>
-    </pc:sldMkLst>
-    <p188:pos x="8269288" y="1179857"/>
-    <p188:txBody>
-      <a:bodyPr/>
-      <a:lstStyle/>
-      <a:p>
-        <a:r>
-          <a:rPr/>
-          <a:t>Pdf name: Pipeline deck _Reference binder.pdf
-Pdf page number: 55
-Pdf matched content: 1/16/23, 1:19 PM Amgen Medical Products | Prescribing Information | Amgen MedInfo US https://www.amgenmedinfo.com/s/us/explore-our-medical-products?language=en_US 5/8 Approved Labeling Neulasta® - Prescribing Information (http://pi.amgen.com/united_states/neulasta/neulasta_pi_hcp_english.pdf) Neulasta® - Patient Instructions for Use (https://www.pi.amgen.com/~/media/amgen/repositorysites/pi-amgen-com/… NEUPOGEN (Filgrastim) Therapeutic Area(s) Hematology / Oncology Approved Labeling NEUPOGEN® - Prescribing Information (http://pi.amgen.com/united_states/neupogen/neupogen_pi_hcp_english.pdf) Nplate (romiplostim) Therapeutic Area(s) Hematology / Oncology Approved Labeling Nplate® - Prescribing Information (http://pi.amgen.com/united_states/nplate/nplate_pi_hcp_english.pdf) Otezla (apremilast) Therapeutic Area(s) Inflammation Approved Labeling Otezla® - Prescribing Information (https://www.pi.amgen.com/~/media/amgen/repositorysites/pi-amgen-com/otezla/… Otezla® - Prescribing Information (https://www.pi.amgen.com/~/media/amgen/repositorysites/pi-amgen-com/otezla/… Parsabiv (etelcalcetide) Therapeutic Area(s) Nephrology ® ® ® ®
-</a:t>
-        </a:r>
-      </a:p>
-    </p188:txBody>
-  </p188:cm>
-  <p188:cm id="{7E351B63-EB26-4CD5-9107-3D8C62366F11}" authorId="{07CD90FA-E915-4AD6-992C-830F90B9A2E9}" created="2023-10-09T18:52:11.5800000">
-    <pc:sldMkLst>
-      <pc:docMk/>
-      <pc:sldMk cId="1336223982" sldId="5226"/>
-    </pc:sldMkLst>
-    <p188:pos x="1122362" y="1310159"/>
-    <p188:txBody>
-      <a:bodyPr/>
-      <a:lstStyle/>
-      <a:p>
-        <a:r>
-          <a:rPr/>
-          <a:t>Pdf name: Pipeline deck _Reference binder.pdf
-Pdf page number: 56
-Pdf matched content: 1/16/23, 1:19 PM Amgen Medical Products | Prescribing Information | Amgen MedInfo US https://www.amgenmedinfo.com/s/us/explore-our-medical-products?language=en_US 6/8 Approved Labeling Parsabiv® - Prescribing Information (http://pi.amgen.com/united_states/parsabiv/parsabiv_pi.pdf) Prolia (denosumab) Therapeutic Area(s) Bone Health Approved Labeling Prolia® - Prescribing Information (http://pi.amgen.com/united_states/prolia/prolia_pi.pdf) Prolia® - Medication Guide (https://www.pi.amgen.com/~/media/amgen/repositorysites/pi-amgen-com/prolia/prolia_… Repatha (evolocumab) Therapeutic Area(s) Cardiovascular Disease Approved Labeling Repatha® - Prescribing Information (http://pi.amgen.com/united_states/repatha/repatha_pi_hcp_english.pdf) RIABNI (rituximab-arrx) Therapeutic Area(s) Hematology / Oncology Approved Labeling RIABNI™ - Prescribing Information (https://www.pi.amgen.com/united_states/riabni/riabni_pi_english.pdf) RIABNI™ - Medication Guide (https://www.pi.amgen.com/united_states/riabni/riabni_mg_hcp_english.pdf) Sensipar (cinacalcet) Therapeutic Area(s) Nephrology Approved Labeling Sensipar® - Prescribing Information (http://pi.amgen.com/united_states/sensipar/sensipar_pi_hcp_english.pdf) ® ® ™ ®
-</a:t>
-        </a:r>
-      </a:p>
-    </p188:txBody>
-  </p188:cm>
-  <p188:cm id="{9AFF5C10-8213-4783-A409-63B2D9543703}" authorId="{07CD90FA-E915-4AD6-992C-830F90B9A2E9}" created="2023-10-09T18:52:11.5800000">
-    <pc:sldMkLst>
-      <pc:docMk/>
-      <pc:sldMk cId="1336223982" sldId="5226"/>
-    </pc:sldMkLst>
-    <p188:pos x="4067175" y="1310159"/>
-    <p188:txBody>
-      <a:bodyPr/>
-      <a:lstStyle/>
-      <a:p>
-        <a:r>
-          <a:rPr/>
-          <a:t>Pdf name: Pipeline deck _Reference binder.pdf
-Pdf page number: 1
-Pdf matched content: (1) ---------------------------DOSAGE AND ADMINISTRATION------------------- • For subcutaneous use only (2.1, 2.2) • Recommended dosage is 70 mg once monthly; some patients may benefit from a dosage of 140 mg once monthly (2.1) • Administer in the abdomen, thigh, or upper arm subcutaneously (2.2) • See Dosage and Administration for important administration instructions (2.2) -----------------------DOSAGE FORMS AND STRENGTHS------------------- • Injection: 70 mg/mL solution in a single-dose prefilled SureClick® autoinjector (3) • Injection: 140 mg/mL solution in a single-dose prefilled SureClick® autoinjector (3) • Injection: 70 mg/mL solution in a single-dose prefilled syringe (3) • Injection: 140 mg/mL solution in a single-dose prefilled syringe (3) ------------------------------CONTRAINDICATIONS----------------------------- AIMOVIG is contraindicated in patients with serious hypersensitivity to erenumab-aooe or to any of the excipients.
 </a:t>
         </a:r>
       </a:p>
@@ -1200,227 +521,7 @@
 
 <file path=ppt/comments/moderncomment2.xml><?xml version="1.0" encoding="utf-8"?>
 <p188:cmLst xmlns:pc="http://schemas.microsoft.com/office/powerpoint/2013/main/command" xmlns:ac="http://schemas.microsoft.com/office/drawing/2013/main/command" xmlns:a="http://schemas.openxmlformats.org/drawingml/2006/main" xmlns:r="http://schemas.openxmlformats.org/officeDocument/2006/relationships" xmlns:m="http://schemas.openxmlformats.org/officeDocument/2006/math" xmlns:w="http://schemas.openxmlformats.org/wordprocessingml/2006/main" xmlns:wp="http://schemas.openxmlformats.org/drawingml/2006/wordprocessingDrawing" xmlns:a14="http://schemas.microsoft.com/office/drawing/2010/main" xmlns:p="http://schemas.openxmlformats.org/presentationml/2006/main" xmlns:p188="http://schemas.microsoft.com/office/powerpoint/2018/8/main">
-  <p188:cm id="{35AC1BDA-24A4-4F47-B4B4-8FB14B378D62}" authorId="{07CD90FA-E915-4AD6-992C-830F90B9A2E9}" created="2023-10-09T18:52:11.5800000">
-    <pc:sldMkLst>
-      <pc:docMk/>
-      <pc:sldMk cId="3429609880" sldId="5227"/>
-    </pc:sldMkLst>
-    <p188:pos x="8020050" y="-1768"/>
-    <p188:txBody>
-      <a:bodyPr/>
-      <a:lstStyle/>
-      <a:p>
-        <a:r>
-          <a:rPr/>
-          <a:t>Pdf name: Pipeline deck _Reference binder.pdf
-Pdf page number: 58
-Pdf matched content: Terms of Use (https://www.amgen.com/terms-of-use/)Privacy Statement (https://www.amgen.com/privacy-statement/) Amgen.com (https://www.amgen.com/)
-</a:t>
-        </a:r>
-      </a:p>
-    </p188:txBody>
-  </p188:cm>
-  <p188:cm id="{193E6D53-DFBF-44B1-85E3-DD5D299D4BAD}" authorId="{07CD90FA-E915-4AD6-992C-830F90B9A2E9}" created="2023-10-09T18:52:11.5810000">
-    <pc:sldMkLst>
-      <pc:docMk/>
-      <pc:sldMk cId="3429609880" sldId="5227"/>
-    </pc:sldMkLst>
-    <p188:pos x="1054100" y="128534"/>
-    <p188:txBody>
-      <a:bodyPr/>
-      <a:lstStyle/>
-      <a:p>
-        <a:r>
-          <a:rPr/>
-          <a:t>Pdf name: Pipeline deck _Reference binder.pdf
-Pdf page number: 78
-Pdf matched content: Patients with RA and other chronic inflammatory diseases, particularly those with highly active disease and/or chronic exposure to immunosuppressant therapies, may be at a higher risk (up to several fold) than the general population for the development of lymphoma, even in the absence of TNF-blockers.
-</a:t>
-        </a:r>
-      </a:p>
-    </p188:txBody>
-  </p188:cm>
-  <p188:cm id="{641C0D4C-86E1-4FD4-9706-C839B0A60D22}" authorId="{07CD90FA-E915-4AD6-992C-830F90B9A2E9}" created="2023-10-09T18:52:11.5810000">
-    <pc:sldMkLst>
-      <pc:docMk/>
-      <pc:sldMk cId="3429609880" sldId="5227"/>
-    </pc:sldMkLst>
-    <p188:pos x="3454400" y="128534"/>
-    <p188:txBody>
-      <a:bodyPr/>
-      <a:lstStyle/>
-      <a:p>
-        <a:r>
-          <a:rPr/>
-          <a:t>Pdf name: Pipeline deck _Reference binder.pdf
-Pdf page number: 58
-Pdf matched content: Terms of Use (https://www.amgen.com/terms-of-use/)Privacy Statement (https://www.amgen.com/privacy-statement/) Amgen.com (https://www.amgen.com/)
-</a:t>
-        </a:r>
-      </a:p>
-    </p188:txBody>
-  </p188:cm>
-  <p188:cm id="{EC84F8D8-33F8-421E-B420-20442711951A}" authorId="{07CD90FA-E915-4AD6-992C-830F90B9A2E9}" created="2023-10-09T18:52:11.5810000">
-    <pc:sldMkLst>
-      <pc:docMk/>
-      <pc:sldMk cId="3429609880" sldId="5227"/>
-    </pc:sldMkLst>
-    <p188:pos x="6045200" y="128534"/>
-    <p188:txBody>
-      <a:bodyPr/>
-      <a:lstStyle/>
-      <a:p>
-        <a:r>
-          <a:rPr/>
-          <a:t>Pdf name: Pipeline deck _Reference binder.pdf
-Pdf page number: 78
-Pdf matched content: Patients with RA and other chronic inflammatory diseases, particularly those with highly active disease and/or chronic exposure to immunosuppressant therapies, may be at a higher risk (up to several fold) than the general population for the development of lymphoma, even in the absence of TNF-blockers.
-</a:t>
-        </a:r>
-      </a:p>
-    </p188:txBody>
-  </p188:cm>
-  <p188:cm id="{D2CC9487-2EB3-41FC-93D3-0C2E41230A49}" authorId="{07CD90FA-E915-4AD6-992C-830F90B9A2E9}" created="2023-10-09T18:52:11.5810000">
-    <pc:sldMkLst>
-      <pc:docMk/>
-      <pc:sldMk cId="3429609880" sldId="5227"/>
-    </pc:sldMkLst>
-    <p188:pos x="8445500" y="128534"/>
-    <p188:txBody>
-      <a:bodyPr/>
-      <a:lstStyle/>
-      <a:p>
-        <a:r>
-          <a:rPr/>
-          <a:t>Pdf name: Pipeline deck _Reference binder.pdf
-Pdf page number: 58
-Pdf matched content: Terms of Use (https://www.amgen.com/terms-of-use/)Privacy Statement (https://www.amgen.com/privacy-statement/) Amgen.com (https://www.amgen.com/)
-</a:t>
-        </a:r>
-      </a:p>
-    </p188:txBody>
-  </p188:cm>
-  <p188:cm id="{FF2F10AF-0012-4DAA-8551-6BBA5C7887A4}" authorId="{07CD90FA-E915-4AD6-992C-830F90B9A2E9}" created="2023-10-09T18:52:11.5810000">
-    <pc:sldMkLst>
-      <pc:docMk/>
-      <pc:sldMk cId="3429609880" sldId="5227"/>
-    </pc:sldMkLst>
-    <p188:pos x="1054100" y="258836"/>
-    <p188:txBody>
-      <a:bodyPr/>
-      <a:lstStyle/>
-      <a:p>
-        <a:r>
-          <a:rPr/>
-          <a:t>Pdf name: Pipeline deck _Reference binder.pdf
-Pdf page number: 318
-Pdf matched content: Whether treatment with Enbrel might influence the development and course of malignancies in adults is unknown. Melanoma and Non-Melanoma Skin Cancer (NMSC) Melanoma and non-melanoma skin cancer has been reported in patients treated with TNF antagonists including etanercept.
-</a:t>
-        </a:r>
-      </a:p>
-    </p188:txBody>
-  </p188:cm>
-  <p188:cm id="{B0CCBAF2-291E-43BD-8D75-D0865CAB923E}" authorId="{07CD90FA-E915-4AD6-992C-830F90B9A2E9}" created="2023-10-09T18:52:11.5810000">
-    <pc:sldMkLst>
-      <pc:docMk/>
-      <pc:sldMk cId="3429609880" sldId="5227"/>
-    </pc:sldMkLst>
-    <p188:pos x="3454400" y="258836"/>
-    <p188:txBody>
-      <a:bodyPr/>
-      <a:lstStyle/>
-      <a:p>
-        <a:r>
-          <a:rPr/>
-          <a:t>Pdf name: Pipeline deck _Reference binder.pdf
-Pdf page number: 58
-Pdf matched content: Terms of Use (https://www.amgen.com/terms-of-use/)Privacy Statement (https://www.amgen.com/privacy-statement/) Amgen.com (https://www.amgen.com/)
-</a:t>
-        </a:r>
-      </a:p>
-    </p188:txBody>
-  </p188:cm>
-  <p188:cm id="{02CDBD6E-784A-44A3-B77E-464244DF6547}" authorId="{07CD90FA-E915-4AD6-992C-830F90B9A2E9}" created="2023-10-09T18:52:11.5810000">
-    <pc:sldMkLst>
-      <pc:docMk/>
-      <pc:sldMk cId="3429609880" sldId="5227"/>
-    </pc:sldMkLst>
-    <p188:pos x="6045200" y="258836"/>
-    <p188:txBody>
-      <a:bodyPr/>
-      <a:lstStyle/>
-      <a:p>
-        <a:r>
-          <a:rPr/>
-          <a:t>Pdf name: Pipeline deck _Reference binder.pdf
-Pdf page number: 318
-Pdf matched content: Among 1245 adult PsO patients treated with Enbrel in controlled clinical trials, representing approximately 283.
-</a:t>
-        </a:r>
-      </a:p>
-    </p188:txBody>
-  </p188:cm>
-  <p188:cm id="{AE936DF8-ADE2-43C6-8F11-391407B577A3}" authorId="{07CD90FA-E915-4AD6-992C-830F90B9A2E9}" created="2023-10-09T18:52:11.5810000">
-    <pc:sldMkLst>
-      <pc:docMk/>
-      <pc:sldMk cId="3429609880" sldId="5227"/>
-    </pc:sldMkLst>
-    <p188:pos x="8445500" y="258836"/>
-    <p188:txBody>
-      <a:bodyPr/>
-      <a:lstStyle/>
-      <a:p>
-        <a:r>
-          <a:rPr/>
-          <a:t>Pdf name: Pipeline deck _Reference binder.pdf
-Pdf page number: 58
-Pdf matched content: Terms of Use (https://www.amgen.com/terms-of-use/)Privacy Statement (https://www.amgen.com/privacy-statement/) Amgen.com (https://www.amgen.com/)
-</a:t>
-        </a:r>
-      </a:p>
-    </p188:txBody>
-  </p188:cm>
-  <p188:cm id="{6A58C5B8-AB71-4D44-8456-28755F9ABE0A}" authorId="{07CD90FA-E915-4AD6-992C-830F90B9A2E9}" created="2023-10-09T18:52:11.5810000">
-    <pc:sldMkLst>
-      <pc:docMk/>
-      <pc:sldMk cId="3429609880" sldId="5227"/>
-    </pc:sldMkLst>
-    <p188:pos x="95250" y="389138"/>
-    <p188:txBody>
-      <a:bodyPr/>
-      <a:lstStyle/>
-      <a:p>
-        <a:r>
-          <a:rPr/>
-          <a:t>Pdf name: Pipeline deck _Reference binder.pdf
-Pdf page number: 47
-Pdf matched content: Biosimilars will help to maintain Amgen&amp;#39;s commitment to connect patients with vital medicines, and Amgen is well positioned to leverage its more than 35 years of experience in biotechnology to create high quality biosimilars and reliably supply them to patients worldwide.
-</a:t>
-        </a:r>
-      </a:p>
-    </p188:txBody>
-  </p188:cm>
-  <p188:cm id="{93FE5C37-B854-4A6F-9F64-D614583C081C}" authorId="{07CD90FA-E915-4AD6-992C-830F90B9A2E9}" created="2023-10-09T18:52:11.5810000">
-    <pc:sldMkLst>
-      <pc:docMk/>
-      <pc:sldMk cId="3429609880" sldId="5227"/>
-    </pc:sldMkLst>
-    <p188:pos x="7842250" y="389138"/>
-    <p188:txBody>
-      <a:bodyPr/>
-      <a:lstStyle/>
-      <a:p>
-        <a:r>
-          <a:rPr/>
-          <a:t>Pdf name: Pipeline deck _Reference binder.pdf
-Pdf page number: 58
-Pdf matched content: Terms of Use (https://www.amgen.com/terms-of-use/)Privacy Statement (https://www.amgen.com/privacy-statement/) Amgen.com (https://www.amgen.com/)
-</a:t>
-        </a:r>
-      </a:p>
-    </p188:txBody>
-  </p188:cm>
-  <p188:cm id="{25278F58-B83F-460E-879E-4CCAA672C367}" authorId="{07CD90FA-E915-4AD6-992C-830F90B9A2E9}" created="2023-10-09T18:52:11.5810000">
+  <p188:cm id="{0F91FCA0-C004-44A2-AB2C-2F5AD498CA93}" authorId="{0AFD991A-DE7F-4F83-AF8C-13D7C566DFAB}" created="2023-10-09T20:22:13.2780000">
     <pc:sldMkLst>
       <pc:docMk/>
       <pc:sldMk cId="3429609880" sldId="5227"/>
@@ -1434,13 +535,14 @@
           <a:rPr/>
           <a:t>Pdf name: Pipeline deck _Reference binder.pdf
 Pdf page number: 464
+Slide text:FDA approval received after priority review
 Pdf matched content: The FDA approved this application approximately 10 weeks ahead of the FDA goal date. This application was granted priority review, fast-track, breakthrough therapy and orphan drug designation.
 </a:t>
         </a:r>
       </a:p>
     </p188:txBody>
   </p188:cm>
-  <p188:cm id="{DE9BEAED-8D70-4EBC-A22B-73EC12E9EB85}" authorId="{07CD90FA-E915-4AD6-992C-830F90B9A2E9}" created="2023-10-09T18:52:11.5810000">
+  <p188:cm id="{5DADC6C5-0DD2-4D6C-A8E4-A06D5997352B}" authorId="{0AFD991A-DE7F-4F83-AF8C-13D7C566DFAB}" created="2023-10-09T20:22:13.2780000">
     <pc:sldMkLst>
       <pc:docMk/>
       <pc:sldMk cId="3429609880" sldId="5227"/>
@@ -1454,13 +556,14 @@
           <a:rPr/>
           <a:t>Pdf name: Pipeline deck _Reference binder.pdf
 Pdf page number: 64
+Slide text:Investigational Indication 
 Pdf matched content: MOLECULE NAME THERAPEUTIC AREA INVESTIGATIONAL INDICATION MODALITY PHASE *Modalities in use across pipeline and marketed products. Modality refers to the structural template of a therapeutic agent.
 </a:t>
         </a:r>
       </a:p>
     </p188:txBody>
   </p188:cm>
-  <p188:cm id="{B8211D1F-B6B1-4812-BD4C-D25065373FFF}" authorId="{07CD90FA-E915-4AD6-992C-830F90B9A2E9}" created="2023-10-09T18:52:11.5810000">
+  <p188:cm id="{FF6B58C2-DFC3-438D-ADC0-0EF85CE8B95D}" authorId="{0AFD991A-DE7F-4F83-AF8C-13D7C566DFAB}" created="2023-10-09T20:22:13.2780000">
     <pc:sldMkLst>
       <pc:docMk/>
       <pc:sldMk cId="3429609880" sldId="5227"/>
@@ -1474,13 +577,14 @@
           <a:rPr/>
           <a:t>Pdf name: Pipeline deck _Reference binder.pdf
 Pdf page number: 62
+Slide text: Genital psoriasis DISCREET
 Pdf matched content: It is being investigated for the treatment of moderate to severe plaque psoriasis in pediatric patients. Inflammation Genital Psoriasis Small Molecule DESCRIPTION Otezla is a small molecule that inhibits phosphodiesterase 4 (PDE4). It is being investigated for the treatment of moderate to severe genital psoriasis.
 </a:t>
         </a:r>
       </a:p>
     </p188:txBody>
   </p188:cm>
-  <p188:cm id="{A5245205-AC8E-4750-8EEF-0044812B0A0E}" authorId="{07CD90FA-E915-4AD6-992C-830F90B9A2E9}" created="2023-10-09T18:52:11.5810000">
+  <p188:cm id="{971B7D45-1CF7-485C-81B9-6405B4966B7B}" authorId="{0AFD991A-DE7F-4F83-AF8C-13D7C566DFAB}" created="2023-10-09T20:22:13.2780000">
     <pc:sldMkLst>
       <pc:docMk/>
       <pc:sldMk cId="3429609880" sldId="5227"/>
@@ -1494,13 +598,14 @@
           <a:rPr/>
           <a:t>Pdf name: Pipeline deck _Reference binder.pdf
 Pdf page number: 64
+Slide text:Severe chronic rhinosinusitis with nasal polyposis WAYPOINT
 Pdf matched content: It is being investigated for the treatment of chronic rhinosinusitis with nasal polyps (CRSwNP). ADDITIONAL INFORMATION TEZSPIRE is being developed in collaboration with AstraZeneca plc.
 </a:t>
         </a:r>
       </a:p>
     </p188:txBody>
   </p188:cm>
-  <p188:cm id="{E6ED681D-DE52-4F84-A058-8CAF61961CC9}" authorId="{07CD90FA-E915-4AD6-992C-830F90B9A2E9}" created="2023-10-09T18:52:11.5810000">
+  <p188:cm id="{F6F89E08-DF67-4C45-97BB-383226871FCC}" authorId="{0AFD991A-DE7F-4F83-AF8C-13D7C566DFAB}" created="2023-10-09T20:22:13.2780000">
     <pc:sldMkLst>
       <pc:docMk/>
       <pc:sldMk cId="3429609880" sldId="5227"/>
@@ -1514,6 +619,7 @@
           <a:rPr/>
           <a:t>Pdf name: Pipeline deck _Reference binder.pdf
 Pdf page number: 63
+Slide text:Moderate to severe atopic dermatitis ROCKETIGNITE
 Pdf matched content: ROCATINLIMAB (formerly AMG 451 / KHK4083) Inflammation Atopic Dermatitis Monoclonal Antibody DESCRIPTION Rocatinlimab (formerly AMG 451 / KHK4083) is an anti-OX40 monoclonal antibody that inhibits activated OX40 expressing T cells and reduces their number.
 </a:t>
         </a:r>
@@ -1525,287 +631,7 @@
 
 <file path=ppt/comments/moderncomment3.xml><?xml version="1.0" encoding="utf-8"?>
 <p188:cmLst xmlns:pc="http://schemas.microsoft.com/office/powerpoint/2013/main/command" xmlns:ac="http://schemas.microsoft.com/office/drawing/2013/main/command" xmlns:a="http://schemas.openxmlformats.org/drawingml/2006/main" xmlns:r="http://schemas.openxmlformats.org/officeDocument/2006/relationships" xmlns:m="http://schemas.openxmlformats.org/officeDocument/2006/math" xmlns:w="http://schemas.openxmlformats.org/wordprocessingml/2006/main" xmlns:wp="http://schemas.openxmlformats.org/drawingml/2006/wordprocessingDrawing" xmlns:a14="http://schemas.microsoft.com/office/drawing/2010/main" xmlns:p="http://schemas.openxmlformats.org/presentationml/2006/main" xmlns:p188="http://schemas.microsoft.com/office/powerpoint/2018/8/main">
-  <p188:cm id="{3573393C-AC3B-4116-8C0E-6D19BFE5CEB7}" authorId="{07CD90FA-E915-4AD6-992C-830F90B9A2E9}" created="2023-10-09T18:52:11.5810000">
-    <pc:sldMkLst>
-      <pc:docMk/>
-      <pc:sldMk cId="3935555865" sldId="5224"/>
-    </pc:sldMkLst>
-    <p188:pos x="8020050" y="777"/>
-    <p188:txBody>
-      <a:bodyPr/>
-      <a:lstStyle/>
-      <a:p>
-        <a:r>
-          <a:rPr/>
-          <a:t>Pdf name: Pipeline deck _Reference binder.pdf
-Pdf page number: 58
-Pdf matched content: Terms of Use (https://www.amgen.com/terms-of-use/)Privacy Statement (https://www.amgen.com/privacy-statement/) Amgen.com (https://www.amgen.com/)
-</a:t>
-        </a:r>
-      </a:p>
-    </p188:txBody>
-  </p188:cm>
-  <p188:cm id="{89744920-05B4-46BD-9851-6AFFAFE73ACC}" authorId="{07CD90FA-E915-4AD6-992C-830F90B9A2E9}" created="2023-10-09T18:52:11.5810000">
-    <pc:sldMkLst>
-      <pc:docMk/>
-      <pc:sldMk cId="3935555865" sldId="5224"/>
-    </pc:sldMkLst>
-    <p188:pos x="95250" y="131079"/>
-    <p188:txBody>
-      <a:bodyPr/>
-      <a:lstStyle/>
-      <a:p>
-        <a:r>
-          <a:rPr/>
-          <a:t>Pdf name: Pipeline deck _Reference binder.pdf
-Pdf page number: 47
-Pdf matched content: Biosimilars will help to maintain Amgen&amp;#39;s commitment to connect patients with vital medicines, and Amgen is well positioned to leverage its more than 35 years of experience in biotechnology to create high quality biosimilars and reliably supply them to patients worldwide.
-</a:t>
-        </a:r>
-      </a:p>
-    </p188:txBody>
-  </p188:cm>
-  <p188:cm id="{51509599-3B1F-4828-87C0-1D8D0B9DDA61}" authorId="{07CD90FA-E915-4AD6-992C-830F90B9A2E9}" created="2023-10-09T18:52:11.5810000">
-    <pc:sldMkLst>
-      <pc:docMk/>
-      <pc:sldMk cId="3935555865" sldId="5224"/>
-    </pc:sldMkLst>
-    <p188:pos x="1320800" y="131079"/>
-    <p188:txBody>
-      <a:bodyPr/>
-      <a:lstStyle/>
-      <a:p>
-        <a:r>
-          <a:rPr/>
-          <a:t>Pdf name: Pipeline deck _Reference binder.pdf
-Pdf page number: 46
-Pdf matched content: Amgen And AbbVie Agree To Settlement Allowing Commercialization Of AMGEVITA™ Amgen to Begin Launching Biosimilar Adalimumab in Europe in 2018 NEWS PROVIDED BY Amgen Sep 28, 2017, 08:00 ET  THOUSAND OAKS, Calif., Sept. 28, 2017 /PRNewswire/ -- Amgen (NASDAQ:AMGN) today announced that it has reached a global settlement with AbbVie to resolve all pending litigation regarding AMGEVITA™/AMJEVITA™, a biosimilar to AbbVie&amp;#39;s Humira (adalimumab).
-</a:t>
-        </a:r>
-      </a:p>
-    </p188:txBody>
-  </p188:cm>
-  <p188:cm id="{39823C81-BF6A-46D3-8745-C9AF7FC7707D}" authorId="{07CD90FA-E915-4AD6-992C-830F90B9A2E9}" created="2023-10-09T18:52:11.5820000">
-    <pc:sldMkLst>
-      <pc:docMk/>
-      <pc:sldMk cId="3935555865" sldId="5224"/>
-    </pc:sldMkLst>
-    <p188:pos x="8445500" y="131079"/>
-    <p188:txBody>
-      <a:bodyPr/>
-      <a:lstStyle/>
-      <a:p>
-        <a:r>
-          <a:rPr/>
-          <a:t>Pdf name: Pipeline deck _Reference binder.pdf
-Pdf page number: 58
-Pdf matched content: Terms of Use (https://www.amgen.com/terms-of-use/)Privacy Statement (https://www.amgen.com/privacy-statement/) Amgen.com (https://www.amgen.com/)
-</a:t>
-        </a:r>
-      </a:p>
-    </p188:txBody>
-  </p188:cm>
-  <p188:cm id="{988512B0-BCAF-4467-99DC-18A1C7275519}" authorId="{07CD90FA-E915-4AD6-992C-830F90B9A2E9}" created="2023-10-09T18:52:11.5820000">
-    <pc:sldMkLst>
-      <pc:docMk/>
-      <pc:sldMk cId="3935555865" sldId="5224"/>
-    </pc:sldMkLst>
-    <p188:pos x="603250" y="261381"/>
-    <p188:txBody>
-      <a:bodyPr/>
-      <a:lstStyle/>
-      <a:p>
-        <a:r>
-          <a:rPr/>
-          <a:t>Pdf name: Pipeline deck _Reference binder.pdf
-Pdf page number: 70
-Pdf matched content: Discontinue in patients without evidence of clinical remission by eight weeks (Day 57). Plaque Psoriasis (2.5): • Adults: 80 mg initial dose, followed by 40 mg every other week starting one week after initial dose.
-</a:t>
-        </a:r>
-      </a:p>
-    </p188:txBody>
-  </p188:cm>
-  <p188:cm id="{C2873746-B15C-4A47-978A-864EA52786A1}" authorId="{07CD90FA-E915-4AD6-992C-830F90B9A2E9}" created="2023-10-09T18:52:11.5820000">
-    <pc:sldMkLst>
-      <pc:docMk/>
-      <pc:sldMk cId="3935555865" sldId="5224"/>
-    </pc:sldMkLst>
-    <p188:pos x="4876800" y="261381"/>
-    <p188:txBody>
-      <a:bodyPr/>
-      <a:lstStyle/>
-      <a:p>
-        <a:r>
-          <a:rPr/>
-          <a:t>Pdf name: Pipeline deck _Reference binder.pdf
-Pdf page number: 78
-Pdf matched content: Patients with RA and other chronic inflammatory diseases, particularly those with highly active disease and/or chronic exposure to immunosuppressant therapies, may be at a higher risk (up to several fold) than the general population for the development of lymphoma, even in the absence of TNF-blockers.
-</a:t>
-        </a:r>
-      </a:p>
-    </p188:txBody>
-  </p188:cm>
-  <p188:cm id="{87F24C1B-1AD1-407F-B80F-524F560B0540}" authorId="{07CD90FA-E915-4AD6-992C-830F90B9A2E9}" created="2023-10-09T18:52:11.5820000">
-    <pc:sldMkLst>
-      <pc:docMk/>
-      <pc:sldMk cId="3935555865" sldId="5224"/>
-    </pc:sldMkLst>
-    <p188:pos x="7277100" y="261381"/>
-    <p188:txBody>
-      <a:bodyPr/>
-      <a:lstStyle/>
-      <a:p>
-        <a:r>
-          <a:rPr/>
-          <a:t>Pdf name: Pipeline deck _Reference binder.pdf
-Pdf page number: 58
-Pdf matched content: Terms of Use (https://www.amgen.com/terms-of-use/)Privacy Statement (https://www.amgen.com/privacy-statement/) Amgen.com (https://www.amgen.com/)
-</a:t>
-        </a:r>
-      </a:p>
-    </p188:txBody>
-  </p188:cm>
-  <p188:cm id="{6BD9EEC4-7B6D-40E0-BED2-E72B0B260158}" authorId="{07CD90FA-E915-4AD6-992C-830F90B9A2E9}" created="2023-10-09T18:52:11.5820000">
-    <pc:sldMkLst>
-      <pc:docMk/>
-      <pc:sldMk cId="3935555865" sldId="5224"/>
-    </pc:sldMkLst>
-    <p188:pos x="927100" y="391683"/>
-    <p188:txBody>
-      <a:bodyPr/>
-      <a:lstStyle/>
-      <a:p>
-        <a:r>
-          <a:rPr/>
-          <a:t>Pdf name: Pipeline deck _Reference binder.pdf
-Pdf page number: 78
-Pdf matched content: Patients with RA and other chronic inflammatory diseases, particularly those with highly active disease and/or chronic exposure to immunosuppressant therapies, may be at a higher risk (up to several fold) than the general population for the development of lymphoma, even in the absence of TNF-blockers.
-</a:t>
-        </a:r>
-      </a:p>
-    </p188:txBody>
-  </p188:cm>
-  <p188:cm id="{35DB0575-B32A-475A-8DA3-543FE4C8B6CB}" authorId="{07CD90FA-E915-4AD6-992C-830F90B9A2E9}" created="2023-10-09T18:52:11.5820000">
-    <pc:sldMkLst>
-      <pc:docMk/>
-      <pc:sldMk cId="3935555865" sldId="5224"/>
-    </pc:sldMkLst>
-    <p188:pos x="3327400" y="391683"/>
-    <p188:txBody>
-      <a:bodyPr/>
-      <a:lstStyle/>
-      <a:p>
-        <a:r>
-          <a:rPr/>
-          <a:t>Pdf name: Pipeline deck _Reference binder.pdf
-Pdf page number: 58
-Pdf matched content: Terms of Use (https://www.amgen.com/terms-of-use/)Privacy Statement (https://www.amgen.com/privacy-statement/) Amgen.com (https://www.amgen.com/)
-</a:t>
-        </a:r>
-      </a:p>
-    </p188:txBody>
-  </p188:cm>
-  <p188:cm id="{F8388BB4-1457-469C-8AAD-125FED2776F8}" authorId="{07CD90FA-E915-4AD6-992C-830F90B9A2E9}" created="2023-10-09T18:52:11.5820000">
-    <pc:sldMkLst>
-      <pc:docMk/>
-      <pc:sldMk cId="3935555865" sldId="5224"/>
-    </pc:sldMkLst>
-    <p188:pos x="5918200" y="391683"/>
-    <p188:txBody>
-      <a:bodyPr/>
-      <a:lstStyle/>
-      <a:p>
-        <a:r>
-          <a:rPr/>
-          <a:t>Pdf name: Pipeline deck _Reference binder.pdf
-Pdf page number: 78
-Pdf matched content: Patients with RA and other chronic inflammatory diseases, particularly those with highly active disease and/or chronic exposure to immunosuppressant therapies, may be at a higher risk (up to several fold) than the general population for the development of lymphoma, even in the absence of TNF-blockers.
-</a:t>
-        </a:r>
-      </a:p>
-    </p188:txBody>
-  </p188:cm>
-  <p188:cm id="{DBE63EB1-DB52-4C7B-9250-22890A858E7D}" authorId="{07CD90FA-E915-4AD6-992C-830F90B9A2E9}" created="2023-10-09T18:52:11.5820000">
-    <pc:sldMkLst>
-      <pc:docMk/>
-      <pc:sldMk cId="3935555865" sldId="5224"/>
-    </pc:sldMkLst>
-    <p188:pos x="8318500" y="391683"/>
-    <p188:txBody>
-      <a:bodyPr/>
-      <a:lstStyle/>
-      <a:p>
-        <a:r>
-          <a:rPr/>
-          <a:t>Pdf name: Pipeline deck _Reference binder.pdf
-Pdf page number: 58
-Pdf matched content: Terms of Use (https://www.amgen.com/terms-of-use/)Privacy Statement (https://www.amgen.com/privacy-statement/) Amgen.com (https://www.amgen.com/)
-</a:t>
-        </a:r>
-      </a:p>
-    </p188:txBody>
-  </p188:cm>
-  <p188:cm id="{FC67CB6E-E438-4C48-83F0-16F87B30F438}" authorId="{07CD90FA-E915-4AD6-992C-830F90B9A2E9}" created="2023-10-09T18:52:11.5820000">
-    <pc:sldMkLst>
-      <pc:docMk/>
-      <pc:sldMk cId="3935555865" sldId="5224"/>
-    </pc:sldMkLst>
-    <p188:pos x="1371600" y="521985"/>
-    <p188:txBody>
-      <a:bodyPr/>
-      <a:lstStyle/>
-      <a:p>
-        <a:r>
-          <a:rPr/>
-          <a:t>Pdf name: Pipeline deck _Reference binder.pdf
-Pdf page number: 78
-Pdf matched content: Patients with RA and other chronic inflammatory diseases, particularly those with highly active disease and/or chronic exposure to immunosuppressant therapies, may be at a higher risk (up to several fold) than the general population for the development of lymphoma, even in the absence of TNF-blockers.
-</a:t>
-        </a:r>
-      </a:p>
-    </p188:txBody>
-  </p188:cm>
-  <p188:cm id="{384A2F1D-D6A1-406A-9297-848EB4F06231}" authorId="{07CD90FA-E915-4AD6-992C-830F90B9A2E9}" created="2023-10-09T18:52:11.5820000">
-    <pc:sldMkLst>
-      <pc:docMk/>
-      <pc:sldMk cId="3935555865" sldId="5224"/>
-    </pc:sldMkLst>
-    <p188:pos x="3771900" y="521985"/>
-    <p188:txBody>
-      <a:bodyPr/>
-      <a:lstStyle/>
-      <a:p>
-        <a:r>
-          <a:rPr/>
-          <a:t>Pdf name: Pipeline deck _Reference binder.pdf
-Pdf page number: 58
-Pdf matched content: Terms of Use (https://www.amgen.com/terms-of-use/)Privacy Statement (https://www.amgen.com/privacy-statement/) Amgen.com (https://www.amgen.com/)
-</a:t>
-        </a:r>
-      </a:p>
-    </p188:txBody>
-  </p188:cm>
-  <p188:cm id="{67E6E7B6-EA8B-4193-BE2E-05518CC94CA0}" authorId="{07CD90FA-E915-4AD6-992C-830F90B9A2E9}" created="2023-10-09T18:52:11.5820000">
-    <pc:sldMkLst>
-      <pc:docMk/>
-      <pc:sldMk cId="3935555865" sldId="5224"/>
-    </pc:sldMkLst>
-    <p188:pos x="9137650" y="521985"/>
-    <p188:txBody>
-      <a:bodyPr/>
-      <a:lstStyle/>
-      <a:p>
-        <a:r>
-          <a:rPr/>
-          <a:t>Pdf name: Pipeline deck _Reference binder.pdf
-Pdf page number: 58
-Pdf matched content: Terms of Use (https://www.amgen.com/terms-of-use/)Privacy Statement (https://www.amgen.com/privacy-statement/) Amgen.com (https://www.amgen.com/)
-</a:t>
-        </a:r>
-      </a:p>
-    </p188:txBody>
-  </p188:cm>
-  <p188:cm id="{22EC47BA-4AFC-4EA4-BC71-74621DB544FB}" authorId="{07CD90FA-E915-4AD6-992C-830F90B9A2E9}" created="2023-10-09T18:52:11.5820000">
+  <p188:cm id="{0F98052D-3B76-4288-8D7C-BA8AEA72DC1D}" authorId="{0AFD991A-DE7F-4F83-AF8C-13D7C566DFAB}" created="2023-10-09T20:22:13.2780000">
     <pc:sldMkLst>
       <pc:docMk/>
       <pc:sldMk cId="3935555865" sldId="5224"/>
@@ -1819,13 +645,14 @@
           <a:rPr/>
           <a:t>Pdf name: Pipeline deck _Reference binder.pdf
 Pdf page number: 46
+Slide text:This is for informational purposes only This is not an offer for sale AMJEVITA is currently not available commercially and will not be commercially available in the United States until or after January 31 2023 AMGEVITA
 Pdf matched content: About Amgen Biosimilars ® 
 </a:t>
         </a:r>
       </a:p>
     </p188:txBody>
   </p188:cm>
-  <p188:cm id="{736EA63E-4C12-462D-9A2A-6571507FD8F5}" authorId="{07CD90FA-E915-4AD6-992C-830F90B9A2E9}" created="2023-10-09T18:52:11.5820000">
+  <p188:cm id="{6F5DF29B-6076-402E-B419-6A925F45D1E4}" authorId="{0AFD991A-DE7F-4F83-AF8C-13D7C566DFAB}" created="2023-10-09T20:22:13.2780000">
     <pc:sldMkLst>
       <pc:docMk/>
       <pc:sldMk cId="3935555865" sldId="5224"/>
@@ -1839,13 +666,14 @@
           <a:rPr/>
           <a:t>Pdf name: Pipeline deck _Reference binder.pdf
 Pdf page number: 46
+Slide text: has been launched in Europe
 Pdf matched content: About Amgen Biosimilars ® 
 </a:t>
         </a:r>
       </a:p>
     </p188:txBody>
   </p188:cm>
-  <p188:cm id="{F2C8F17E-1F27-447A-8155-DB1FFCA3B5C9}" authorId="{07CD90FA-E915-4AD6-992C-830F90B9A2E9}" created="2023-10-09T18:52:11.5820000">
+  <p188:cm id="{8708756B-9AD0-4BEC-B753-DC3BC22327A4}" authorId="{0AFD991A-DE7F-4F83-AF8C-13D7C566DFAB}" created="2023-10-09T20:22:13.2790000">
     <pc:sldMkLst>
       <pc:docMk/>
       <pc:sldMk cId="3935555865" sldId="5224"/>
@@ -1859,13 +687,14 @@
           <a:rPr/>
           <a:t>Pdf name: Pipeline deck _Reference binder.pdf
 Pdf page number: 213
+Slide text:interleukin mAb monoclonal antibody MOA mechanism of action PCD primary completion date TNF tumor necrosis factor VEGF vascular endothelial growth factor STELARA
 Pdf matched content: Biological activities attributed to TNFα include: induction of pro-inflammatory cytokines such as interleukins (IL) 1 and 6, enhancement of leukocyte migration by increasing endothelial layer permeability and expression of adhesion molecules by endothelial cells and leukocytes, activation of neutrophil and eosinophil functional activity, induction of acute phase reactants and other liver proteins, as well as tissue degrading enzymes.
 </a:t>
         </a:r>
       </a:p>
     </p188:txBody>
   </p188:cm>
-  <p188:cm id="{49673F5E-47C7-446E-9CF1-CE7E2CFD7F1B}" authorId="{07CD90FA-E915-4AD6-992C-830F90B9A2E9}" created="2023-10-09T18:52:11.5820000">
+  <p188:cm id="{28313E25-BC68-43D9-9AD1-449BA96F21DB}" authorId="{0AFD991A-DE7F-4F83-AF8C-13D7C566DFAB}" created="2023-10-09T20:22:13.2790000">
     <pc:sldMkLst>
       <pc:docMk/>
       <pc:sldMk cId="3935555865" sldId="5224"/>
@@ -1879,13 +708,14 @@
           <a:rPr/>
           <a:t>Pdf name: Pipeline deck _Reference binder.pdf
 Pdf page number: 64
+Slide text: is a registered trademark of Regeneron Pharmaceuticals Inc
 Pdf matched content: ADDITIONAL INFORMATION &lt;b&gt;EYLEA is a registered trademark of Regeneron Pharmaceuticals, Inc.&lt;/b&gt;
 </a:t>
         </a:r>
       </a:p>
     </p188:txBody>
   </p188:cm>
-  <p188:cm id="{89BEA2F4-004A-4DA5-A856-30567A88F5F1}" authorId="{07CD90FA-E915-4AD6-992C-830F90B9A2E9}" created="2023-10-09T18:52:11.5830000">
+  <p188:cm id="{E87FE424-5E40-46B6-8A12-BF51B6D771D7}" authorId="{0AFD991A-DE7F-4F83-AF8C-13D7C566DFAB}" created="2023-10-09T20:22:13.2790000">
     <pc:sldMkLst>
       <pc:docMk/>
       <pc:sldMk cId="3935555865" sldId="5224"/>
@@ -1899,13 +729,14 @@
           <a:rPr/>
           <a:t>Pdf name: Pipeline deck _Reference binder.pdf
 Pdf page number: 64
+Slide text:Investigational Indication 
 Pdf matched content: MOLECULE NAME THERAPEUTIC AREA INVESTIGATIONAL INDICATION MODALITY PHASE *Modalities in use across pipeline and marketed products. Modality refers to the structural template of a therapeutic agent.
 </a:t>
         </a:r>
       </a:p>
     </p188:txBody>
   </p188:cm>
-  <p188:cm id="{860AD3CB-DB82-4AA4-A6E4-32BC49ECBC0A}" authorId="{07CD90FA-E915-4AD6-992C-830F90B9A2E9}" created="2023-10-09T18:52:11.5830000">
+  <p188:cm id="{ECA9C09E-ED5D-4070-88C9-833201C76716}" authorId="{0AFD991A-DE7F-4F83-AF8C-13D7C566DFAB}" created="2023-10-09T20:22:13.2790000">
     <pc:sldMkLst>
       <pc:docMk/>
       <pc:sldMk cId="3935555865" sldId="5224"/>
@@ -1919,13 +750,14 @@
           <a:rPr/>
           <a:t>Pdf name: Pipeline deck _Reference binder.pdf
 Pdf page number: 340
+Slide text:Moderate to severe plaque psoriasis 
 Pdf matched content: 31 14.6 Pediatric Plaque Psoriasis A 48-week, randomized, double-blind, placebo-controlled study enrolled 211 pediatric subjects 4 to 17 years of age, with moderate to severe plaque psoriasis (PsO) (as defined by a sPGA score ≥ 3 [moderate, marked, or severe], involving ≥ 10% of the body surface area, and a PASI score ≥ 12) who were candidates for phototherapy or systemic therapy, or were inadequately controlled on topical therapy.
 </a:t>
         </a:r>
       </a:p>
     </p188:txBody>
   </p188:cm>
-  <p188:cm id="{205A1A7A-DB1E-48B9-BE1B-21D39AD654D3}" authorId="{07CD90FA-E915-4AD6-992C-830F90B9A2E9}" created="2023-10-09T18:52:11.5830000">
+  <p188:cm id="{7A4F5D55-4018-48A2-9877-25BC32A3567C}" authorId="{0AFD991A-DE7F-4F83-AF8C-13D7C566DFAB}" created="2023-10-09T20:22:13.2790000">
     <pc:sldMkLst>
       <pc:docMk/>
       <pc:sldMk cId="3935555865" sldId="5224"/>
@@ -1939,13 +771,14 @@
           <a:rPr/>
           <a:t>Pdf name: Pipeline deck _Reference binder.pdf
 Pdf page number: 196
+Slide text:interchangeability trial
 Pdf matched content: In a clinical trial exploring the use of infliximab in patients with moderate to severe chronic obstructive pulmonary disease (COPD), more malignancies, the majority of lung or head and neck origin, were reported in infliximab-treated patients compared with control patients.
 </a:t>
         </a:r>
       </a:p>
     </p188:txBody>
   </p188:cm>
-  <p188:cm id="{B469BC35-E5EF-43FA-A35C-71A74009C6AC}" authorId="{07CD90FA-E915-4AD6-992C-830F90B9A2E9}" created="2023-10-09T18:52:11.5830000">
+  <p188:cm id="{063D27EC-2C79-4031-B077-60A9D4FB4758}" authorId="{0AFD991A-DE7F-4F83-AF8C-13D7C566DFAB}" created="2023-10-09T20:22:13.2790000">
     <pc:sldMkLst>
       <pc:docMk/>
       <pc:sldMk cId="3935555865" sldId="5224"/>
@@ -1959,13 +792,14 @@
           <a:rPr/>
           <a:t>Pdf name: Pipeline deck _Reference binder.pdf
 Pdf page number: 64
+Slide text:IL12 and IL23 inhibitor
 Pdf matched content: ABP 654 (Investigational biosimilar to STELARA® (ustekinumab)) Inflammation Investigational Biosimilar Monoclonal Antibody DESCRIPTION ABP 654 is an investigational biosimilar to STELARA (ustekinumab), which is a monoclonal antibody that inhibits &lt;b&gt;IL&lt;/b&gt;-&lt;b&gt;12 and IL&lt;/b&gt;-&lt;b&gt;23&lt;/b&gt;.
 </a:t>
         </a:r>
       </a:p>
     </p188:txBody>
   </p188:cm>
-  <p188:cm id="{71E8D972-BD9E-45C3-AD49-0DD4EA0A07C4}" authorId="{07CD90FA-E915-4AD6-992C-830F90B9A2E9}" created="2023-10-09T18:52:11.5830000">
+  <p188:cm id="{412FDED3-FE6A-4261-A68A-911DED7CFDCD}" authorId="{0AFD991A-DE7F-4F83-AF8C-13D7C566DFAB}" created="2023-10-09T20:22:13.2790000">
     <pc:sldMkLst>
       <pc:docMk/>
       <pc:sldMk cId="3935555865" sldId="5224"/>
@@ -1979,13 +813,14 @@
           <a:rPr/>
           <a:t>Pdf name: Pipeline deck _Reference binder.pdf
 Pdf page number: 110
+Slide text: moderate to severe plaque psoriasis interchangeability trial
 Pdf matched content: Across all treatment groups the mean baseline PASI score was 19 and the baseline Physician&amp;#39;s Global Assessment score ranged from “moderate” (53%) to “severe” (41%) to “very severe” (6%).
 </a:t>
         </a:r>
       </a:p>
     </p188:txBody>
   </p188:cm>
-  <p188:cm id="{7F4C6117-0E75-45BB-9A77-591EF4A4C48E}" authorId="{07CD90FA-E915-4AD6-992C-830F90B9A2E9}" created="2023-10-09T18:52:11.5830000">
+  <p188:cm id="{E22E59A6-0423-4259-B34F-F25C8E07FF7E}" authorId="{0AFD991A-DE7F-4F83-AF8C-13D7C566DFAB}" created="2023-10-09T20:22:13.2800000">
     <pc:sldMkLst>
       <pc:docMk/>
       <pc:sldMk cId="3935555865" sldId="5224"/>
@@ -1999,6 +834,7 @@
           <a:rPr/>
           <a:t>Pdf name: Pipeline deck _Reference binder.pdf
 Pdf page number: 64
+Slide text: biosimilar currently under study for paroxysmal nocturnal hemoglobinuria DAHLIA
 Pdf matched content: ABP 654 (Investigational biosimilar to STELARA® (ustekinumab)) Inflammation Investigational Biosimilar Monoclonal Antibody DESCRIPTION ABP 654 is an investigational biosimilar to STELARA (ustekinumab), which is a monoclonal antibody that inhibits IL-12 and IL-23.
 </a:t>
         </a:r>
@@ -2010,7 +846,7 @@
 
 <file path=ppt/comments/moderncomment4.xml><?xml version="1.0" encoding="utf-8"?>
 <p188:cmLst xmlns:pc="http://schemas.microsoft.com/office/powerpoint/2013/main/command" xmlns:ac="http://schemas.microsoft.com/office/drawing/2013/main/command" xmlns:a="http://schemas.openxmlformats.org/drawingml/2006/main" xmlns:r="http://schemas.openxmlformats.org/officeDocument/2006/relationships" xmlns:m="http://schemas.openxmlformats.org/officeDocument/2006/math" xmlns:w="http://schemas.openxmlformats.org/wordprocessingml/2006/main" xmlns:wp="http://schemas.openxmlformats.org/drawingml/2006/wordprocessingDrawing" xmlns:a14="http://schemas.microsoft.com/office/drawing/2010/main" xmlns:p="http://schemas.openxmlformats.org/presentationml/2006/main" xmlns:p188="http://schemas.microsoft.com/office/powerpoint/2018/8/main">
-  <p188:cm id="{52198AE9-579C-4E15-8728-3FE3BE3DD855}" authorId="{07CD90FA-E915-4AD6-992C-830F90B9A2E9}" created="2023-10-09T18:52:11.5830000">
+  <p188:cm id="{8B8B3001-FF01-4888-AC73-EB281D7ACFBF}" authorId="{0AFD991A-DE7F-4F83-AF8C-13D7C566DFAB}" created="2023-10-09T20:22:13.2800000">
     <pc:sldMkLst>
       <pc:docMk/>
       <pc:sldMk cId="2149721198" sldId="5228"/>
@@ -2024,13 +860,14 @@
           <a:rPr/>
           <a:t>Pdf name: Pipeline deck _Reference binder.pdf
 Pdf page number: 64
+Slide text:Investigational Indication 
 Pdf matched content: MOLECULE NAME THERAPEUTIC AREA INVESTIGATIONAL INDICATION MODALITY PHASE *Modalities in use across pipeline and marketed products. Modality refers to the structural template of a therapeutic agent.
 </a:t>
         </a:r>
       </a:p>
     </p188:txBody>
   </p188:cm>
-  <p188:cm id="{5C1A421A-1318-44B6-A7CB-E90CDD1C9E09}" authorId="{07CD90FA-E915-4AD6-992C-830F90B9A2E9}" created="2023-10-09T18:52:11.5830000">
+  <p188:cm id="{4307B21B-407B-4B61-8BA6-DC4F6D261B56}" authorId="{0AFD991A-DE7F-4F83-AF8C-13D7C566DFAB}" created="2023-10-09T20:22:13.2800000">
     <pc:sldMkLst>
       <pc:docMk/>
       <pc:sldMk cId="2149721198" sldId="5228"/>
@@ -2044,13 +881,14 @@
           <a:rPr/>
           <a:t>Pdf name: Pipeline deck _Reference binder.pdf
 Pdf page number: 61
+Slide text:KRAS G12C inhibitor 
 Pdf matched content: Hematology/Oncology Other Tumors Small Molecule DESCRIPTION LUMAKRAS is a KRASG12C small molecule inhibitor under investigation for the treatment of advanced solid tumors other than non small cell lung cancer or advanced colorectal cancer.
 </a:t>
         </a:r>
       </a:p>
     </p188:txBody>
   </p188:cm>
-  <p188:cm id="{D82B32A0-CB3B-4F7B-A386-4C991457121B}" authorId="{07CD90FA-E915-4AD6-992C-830F90B9A2E9}" created="2023-10-09T18:52:11.5830000">
+  <p188:cm id="{FE7ECCB8-3BF5-4AEF-801F-EEF43A8F7D9F}" authorId="{0AFD991A-DE7F-4F83-AF8C-13D7C566DFAB}" created="2023-10-09T20:22:13.2800000">
     <pc:sldMkLst>
       <pc:docMk/>
       <pc:sldMk cId="2149721198" sldId="5228"/>
@@ -2064,13 +902,14 @@
           <a:rPr/>
           <a:t>Pdf name: Pipeline deck _Reference binder.pdf
 Pdf page number: 61
+Slide text:Advanced metastatic 
 Pdf matched content: ADDITIONAL INFORMATION LUMAKRAS received accelerated approval by the FDA in May 2021 for the treatment of patients with KRAS G12C-mutated locally advanced or metastatic non-small cell lung cancer (NSCLC), as determined by an FDA-approved test, following at least one prior systemic therapy.
 </a:t>
         </a:r>
       </a:p>
     </p188:txBody>
   </p188:cm>
-  <p188:cm id="{857A3191-07C7-4650-82A6-F9EF057EE079}" authorId="{07CD90FA-E915-4AD6-992C-830F90B9A2E9}" created="2023-10-09T18:52:11.5830000">
+  <p188:cm id="{2B40BF96-DAD5-4F21-9DA8-D641FCE4742B}" authorId="{0AFD991A-DE7F-4F83-AF8C-13D7C566DFAB}" created="2023-10-09T20:22:13.2800000">
     <pc:sldMkLst>
       <pc:docMk/>
       <pc:sldMk cId="2149721198" sldId="5228"/>
@@ -2084,13 +923,14 @@
           <a:rPr/>
           <a:t>Pdf name: Pipeline deck _Reference binder.pdf
 Pdf page number: 61
+Slide text: pG12C mutationharboring advanced nonsmall cell lung cancer 
 Pdf matched content: ADDITIONAL INFORMATION LUMAKRAS received accelerated approval by the FDA in May 2021 for the treatment of patients with KRAS G12C-mutated locally advanced or metastatic non-small cell lung cancer (NSCLC), as determined by an FDA-approved test, following at least one prior systemic therapy.
 </a:t>
         </a:r>
       </a:p>
     </p188:txBody>
   </p188:cm>
-  <p188:cm id="{91AB1E1A-062C-40E2-B585-D839EF6A5713}" authorId="{07CD90FA-E915-4AD6-992C-830F90B9A2E9}" created="2023-10-09T18:52:11.5830000">
+  <p188:cm id="{E3CC5279-F28C-4AD8-AB4D-060286D47597}" authorId="{0AFD991A-DE7F-4F83-AF8C-13D7C566DFAB}" created="2023-10-09T20:22:13.2800000">
     <pc:sldMkLst>
       <pc:docMk/>
       <pc:sldMk cId="2149721198" sldId="5228"/>
@@ -2104,13 +944,14 @@
           <a:rPr/>
           <a:t>Pdf name: Pipeline deck _Reference binder.pdf
 Pdf page number: 61
+Slide text:KRAS G12C inhibitor 
 Pdf matched content: Hematology/Oncology Other Tumors Small Molecule DESCRIPTION LUMAKRAS is a KRASG12C small molecule inhibitor under investigation for the treatment of advanced solid tumors other than non small cell lung cancer or advanced colorectal cancer.
 </a:t>
         </a:r>
       </a:p>
     </p188:txBody>
   </p188:cm>
-  <p188:cm id="{AA5F95E7-FE67-44F9-A581-C43100895D68}" authorId="{07CD90FA-E915-4AD6-992C-830F90B9A2E9}" created="2023-10-09T18:52:11.5830000">
+  <p188:cm id="{F4ACCF21-C175-4AA3-8D22-F3A68DDD94C2}" authorId="{0AFD991A-DE7F-4F83-AF8C-13D7C566DFAB}" created="2023-10-09T20:22:13.2810000">
     <pc:sldMkLst>
       <pc:docMk/>
       <pc:sldMk cId="2149721198" sldId="5228"/>
@@ -2124,13 +965,14 @@
           <a:rPr/>
           <a:t>Pdf name: Pipeline deck _Reference binder.pdf
 Pdf page number: 61
+Slide text:KRAS G12C inhibitor 
 Pdf matched content: Hematology/Oncology Other Tumors Small Molecule DESCRIPTION LUMAKRAS is a KRASG12C small molecule inhibitor under investigation for the treatment of advanced solid tumors other than non small cell lung cancer or advanced colorectal cancer.
 </a:t>
         </a:r>
       </a:p>
     </p188:txBody>
   </p188:cm>
-  <p188:cm id="{8A6FA3C3-41EE-4532-81F3-D9412C3F7F5C}" authorId="{07CD90FA-E915-4AD6-992C-830F90B9A2E9}" created="2023-10-09T18:52:11.5830000">
+  <p188:cm id="{266A451E-C5D0-4388-BCE3-9B9FA3A97E39}" authorId="{0AFD991A-DE7F-4F83-AF8C-13D7C566DFAB}" created="2023-10-09T20:22:13.2810000">
     <pc:sldMkLst>
       <pc:docMk/>
       <pc:sldMk cId="2149721198" sldId="5228"/>
@@ -2144,13 +986,14 @@
           <a:rPr/>
           <a:t>Pdf name: Pipeline deck _Reference binder.pdf
 Pdf page number: 61
+Slide text: pG12C mutationharboring advanced nonsmall cell lung cancer 
 Pdf matched content: ADDITIONAL INFORMATION LUMAKRAS received accelerated approval by the FDA in May 2021 for the treatment of patients with KRAS G12C-mutated locally advanced or metastatic non-small cell lung cancer (NSCLC), as determined by an FDA-approved test, following at least one prior systemic therapy.
 </a:t>
         </a:r>
       </a:p>
     </p188:txBody>
   </p188:cm>
-  <p188:cm id="{FC48B4EC-61C1-4896-A28C-29D558B13F9A}" authorId="{07CD90FA-E915-4AD6-992C-830F90B9A2E9}" created="2023-10-09T18:52:11.5830000">
+  <p188:cm id="{B7DC78E5-863A-4A35-A13A-74B21B396811}" authorId="{0AFD991A-DE7F-4F83-AF8C-13D7C566DFAB}" created="2023-10-09T20:22:13.2810000">
     <pc:sldMkLst>
       <pc:docMk/>
       <pc:sldMk cId="2149721198" sldId="5228"/>
@@ -2164,173 +1007,14 @@
           <a:rPr/>
           <a:t>Pdf name: Pipeline deck _Reference binder.pdf
 Pdf page number: 61
+Slide text: and other solid tumors 
 Pdf matched content: ADDITIONAL INFORMATION LUMAKRAS received accelerated approval by the FDA in May 2021 for the treatment of patients with KRAS G12C-mutated locally advanced or metastatic non-small cell lung cancer (NSCLC), as determined by an FDA-approved test, following at least one prior systemic therapy.
 </a:t>
         </a:r>
       </a:p>
     </p188:txBody>
   </p188:cm>
-  <p188:cm id="{0C6FC772-B0BD-4982-B6DC-BE597C7DE30C}" authorId="{07CD90FA-E915-4AD6-992C-830F90B9A2E9}" created="2023-10-09T18:52:11.5830000">
-    <pc:sldMkLst>
-      <pc:docMk/>
-      <pc:sldMk cId="2149721198" sldId="5228"/>
-    </pc:sldMkLst>
-    <p188:pos x="7162949" y="5953"/>
-    <p188:txBody>
-      <a:bodyPr/>
-      <a:lstStyle/>
-      <a:p>
-        <a:r>
-          <a:rPr/>
-          <a:t>Pdf name: Pipeline deck _Reference binder.pdf
-Pdf page number: 58
-Pdf matched content: Terms of Use (https://www.amgen.com/terms-of-use/)Privacy Statement (https://www.amgen.com/privacy-statement/) Amgen.com (https://www.amgen.com/)
-</a:t>
-        </a:r>
-      </a:p>
-    </p188:txBody>
-  </p188:cm>
-  <p188:cm id="{0BF85772-3AC6-4E9E-84A1-3E4199D6069D}" authorId="{07CD90FA-E915-4AD6-992C-830F90B9A2E9}" created="2023-10-09T18:52:11.5830000">
-    <pc:sldMkLst>
-      <pc:docMk/>
-      <pc:sldMk cId="2149721198" sldId="5228"/>
-    </pc:sldMkLst>
-    <p188:pos x="2202755" y="127873"/>
-    <p188:txBody>
-      <a:bodyPr/>
-      <a:lstStyle/>
-      <a:p>
-        <a:r>
-          <a:rPr/>
-          <a:t>Pdf name: Pipeline deck _Reference binder.pdf
-Pdf page number: 58
-Pdf matched content: Terms of Use (https://www.amgen.com/terms-of-use/)Privacy Statement (https://www.amgen.com/privacy-statement/) Amgen.com (https://www.amgen.com/)
-</a:t>
-        </a:r>
-      </a:p>
-    </p188:txBody>
-  </p188:cm>
-  <p188:cm id="{6A126FA9-358F-4C7B-BDEA-98E142E73C5E}" authorId="{07CD90FA-E915-4AD6-992C-830F90B9A2E9}" created="2023-10-09T18:52:11.5840000">
-    <pc:sldMkLst>
-      <pc:docMk/>
-      <pc:sldMk cId="2149721198" sldId="5228"/>
-    </pc:sldMkLst>
-    <p188:pos x="6900763" y="127873"/>
-    <p188:txBody>
-      <a:bodyPr/>
-      <a:lstStyle/>
-      <a:p>
-        <a:r>
-          <a:rPr/>
-          <a:t>Pdf name: Pipeline deck _Reference binder.pdf
-Pdf page number: 58
-Pdf matched content: Terms of Use (https://www.amgen.com/terms-of-use/)Privacy Statement (https://www.amgen.com/privacy-statement/) Amgen.com (https://www.amgen.com/)
-</a:t>
-        </a:r>
-      </a:p>
-    </p188:txBody>
-  </p188:cm>
-  <p188:cm id="{0D50A0DF-6D0A-45DD-8986-24B053C135FF}" authorId="{07CD90FA-E915-4AD6-992C-830F90B9A2E9}" created="2023-10-09T18:52:11.5840000">
-    <pc:sldMkLst>
-      <pc:docMk/>
-      <pc:sldMk cId="2149721198" sldId="5228"/>
-    </pc:sldMkLst>
-    <p188:pos x="8324056" y="127873"/>
-    <p188:txBody>
-      <a:bodyPr/>
-      <a:lstStyle/>
-      <a:p>
-        <a:r>
-          <a:rPr/>
-          <a:t>Pdf name: Pipeline deck _Reference binder.pdf
-Pdf page number: 53
-Pdf matched content: 1/16/23, 1:19 PM Amgen Medical Products | Prescribing Information | Amgen MedInfo US https://www.amgenmedinfo.com/s/us/explore-our-medical-products?language=en_US 3/8 Approved Labeling Enbrel® - Prescribing Information (http://pi.amgen.com/united_states/enbrel/derm/enbrel_pi.pdf) Enbrel® - Prescribing Information (http://pi.amgen.com/united_states/enbrel/derm/enbrel_pi.pdf) Enbrel® - Medication Guide (https://www.pi.amgen.com/~/media/amgen/repositorysites/pi-amgen-com/enbrel/enbre… Enbrel® - Patient Instructions for Use (https://www.pi.amgen.com/~/media/amgen/repositorysites/pi-amgen-com/en… EPOGEN (Epoetin alfa) Therapeutic Area(s) Nephrology Approved Labeling EPOGEN® - Prescribing Information (http://pi.amgen.com/united_states/epogen/epogen_pi_hcp_english.pdf) EPOGEN® - Patient Instructions for Use (https://www.pi.amgen.com/~/media/amgen/repositorysites/pi-amgen-com/… EPOGEN® - Medication Guide (https://www.pi.amgen.com/~/media/amgen/repositorysites/pi-amgen-com/epogen/e… EVENITY (romosozumab-aqqg) Therapeutic Area(s) Bone Health Approved Labeling EVENITY® - Prescribing Information (https://www.pi.amgen.com/united_states/evenity/evenity_pi_hcp_english.pdf) EVENITY® - Medication Guide (https://www.pi.amgen.com/~/media/amgen/repositorysites/pi-amgen-com/evenity/e… IMLYGIC (talimogene laherparepvec) Therapeutic Area(s) Hematology / Oncology Approved Labeling IMLYGIC® - Prescribing Information (http://pi.amgen.com/united_states/imlygic/imlygic_pi.pdf) IMLYGIC® - Medication Guide (https://www.pi.amgen.com/~/media/amgen/repositorysites/pi-amgen-com/imlygic/im… KANJINTI (trastuzumab-anns) ® ® ® ™
-</a:t>
-        </a:r>
-      </a:p>
-    </p188:txBody>
-  </p188:cm>
-  <p188:cm id="{769D541B-F0A9-49FA-90C5-9114B7E7A0B1}" authorId="{07CD90FA-E915-4AD6-992C-830F90B9A2E9}" created="2023-10-09T18:52:11.5840000">
-    <pc:sldMkLst>
-      <pc:docMk/>
-      <pc:sldMk cId="2149721198" sldId="5228"/>
-    </pc:sldMkLst>
-    <p188:pos x="9542462" y="249793"/>
-    <p188:txBody>
-      <a:bodyPr/>
-      <a:lstStyle/>
-      <a:p>
-        <a:r>
-          <a:rPr/>
-          <a:t>Pdf name: Pipeline deck _Reference binder.pdf
-Pdf page number: 58
-Pdf matched content: Terms of Use (https://www.amgen.com/terms-of-use/)Privacy Statement (https://www.amgen.com/privacy-statement/) Amgen.com (https://www.amgen.com/)
-</a:t>
-        </a:r>
-      </a:p>
-    </p188:txBody>
-  </p188:cm>
-  <p188:cm id="{509149D0-FF3D-481F-AFE1-266E8B19C883}" authorId="{07CD90FA-E915-4AD6-992C-830F90B9A2E9}" created="2023-10-09T18:52:11.5840000">
-    <pc:sldMkLst>
-      <pc:docMk/>
-      <pc:sldMk cId="2149721198" sldId="5228"/>
-    </pc:sldMkLst>
-    <p188:pos x="3536504" y="371713"/>
-    <p188:txBody>
-      <a:bodyPr/>
-      <a:lstStyle/>
-      <a:p>
-        <a:r>
-          <a:rPr/>
-          <a:t>Pdf name: Pipeline deck _Reference binder.pdf
-Pdf page number: 58
-Pdf matched content: Terms of Use (https://www.amgen.com/terms-of-use/)Privacy Statement (https://www.amgen.com/privacy-statement/) Amgen.com (https://www.amgen.com/)
-</a:t>
-        </a:r>
-      </a:p>
-    </p188:txBody>
-  </p188:cm>
-  <p188:cm id="{DC472C89-C1BE-4441-B129-252E6E52C0B8}" authorId="{07CD90FA-E915-4AD6-992C-830F90B9A2E9}" created="2023-10-09T18:52:11.5840000">
-    <pc:sldMkLst>
-      <pc:docMk/>
-      <pc:sldMk cId="2149721198" sldId="5228"/>
-    </pc:sldMkLst>
-    <p188:pos x="5445274" y="371713"/>
-    <p188:txBody>
-      <a:bodyPr/>
-      <a:lstStyle/>
-      <a:p>
-        <a:r>
-          <a:rPr/>
-          <a:t>Pdf name: Pipeline deck _Reference binder.pdf
-Pdf page number: 464
-Pdf matched content: 1/16/23, 4:44 PM FDA grants accelerated approval to sotorasib for KRAS G12C mutated NSCLC | FDA https://www.fda.gov/drugs/resources-information-approved-drugs/fda-grants-accelerated-approval-sotorasib-kras-g12c-mutated-nsclc 2/3 This indication is approved under accelerated approval based on overall response rate and duration of response.
-</a:t>
-        </a:r>
-      </a:p>
-    </p188:txBody>
-  </p188:cm>
-  <p188:cm id="{2D3F368F-D04F-49DD-853E-C572809FC4EF}" authorId="{07CD90FA-E915-4AD6-992C-830F90B9A2E9}" created="2023-10-09T18:52:11.5840000">
-    <pc:sldMkLst>
-      <pc:docMk/>
-      <pc:sldMk cId="2149721198" sldId="5228"/>
-    </pc:sldMkLst>
-    <p188:pos x="1116012" y="493633"/>
-    <p188:txBody>
-      <a:bodyPr/>
-      <a:lstStyle/>
-      <a:p>
-        <a:r>
-          <a:rPr/>
-          <a:t>Pdf name: Pipeline deck _Reference binder.pdf
-Pdf page number: 58
-Pdf matched content: Terms of Use (https://www.amgen.com/terms-of-use/)Privacy Statement (https://www.amgen.com/privacy-statement/) Amgen.com (https://www.amgen.com/)
-</a:t>
-        </a:r>
-      </a:p>
-    </p188:txBody>
-  </p188:cm>
-  <p188:cm id="{0F9FCBB6-57A8-4015-B2AD-D872BC8E3091}" authorId="{07CD90FA-E915-4AD6-992C-830F90B9A2E9}" created="2023-10-09T18:52:11.5840000">
+  <p188:cm id="{AA8D94EC-9AD2-4099-8A7E-F1901359EBDE}" authorId="{0AFD991A-DE7F-4F83-AF8C-13D7C566DFAB}" created="2023-10-09T20:22:13.2810000">
     <pc:sldMkLst>
       <pc:docMk/>
       <pc:sldMk cId="2149721198" sldId="5228"/>
@@ -2344,13 +1028,14 @@
           <a:rPr/>
           <a:t>Pdf name: Pipeline deck _Reference binder.pdf
 Pdf page number: 464
+Slide text:FDA fasttrack approval received after undergoing priority review under the breakthrough therapy and orphan drug designation
 Pdf matched content: The FDA approved this application approximately 10 weeks ahead of the FDA goal date. This application was granted priority review, fast-track, breakthrough therapy and orphan drug designation.
 </a:t>
         </a:r>
       </a:p>
     </p188:txBody>
   </p188:cm>
-  <p188:cm id="{64D9E2F4-B93D-44EA-8608-0A0A4B5F29DD}" authorId="{07CD90FA-E915-4AD6-992C-830F90B9A2E9}" created="2023-10-09T18:52:11.5840000">
+  <p188:cm id="{7ECEE30B-ABDA-480E-814D-5983B4F10E7A}" authorId="{0AFD991A-DE7F-4F83-AF8C-13D7C566DFAB}" created="2023-10-09T20:22:13.2810000">
     <pc:sldMkLst>
       <pc:docMk/>
       <pc:sldMk cId="2149721198" sldId="5228"/>
@@ -2364,13 +1049,14 @@
           <a:rPr/>
           <a:t>Pdf name: Pipeline deck _Reference binder.pdf
 Pdf page number: 463
+Slide text:Sotorasib was given conditional approval by the FDA as the first 
 Pdf matched content: 1/16/23, 4:44 PM FDA grants accelerated approval to sotorasib for KRAS G12C mutated NSCLC | FDA https://www.fda.gov/drugs/resources-information-approved-drugs/fda-grants-accelerated-approval-sotorasib-kras-g12c-mutated-nsclc 1/3 FDA grants accelerated approval to sotorasib for KRAS G12C mutated NSCLC On May 28, 2021, the Food and Drug Administration granted accelerated approval to sotorasib (Lumakras™, Amgen, Inc.), a RAS GTPase family inhibitor, for adult patients with KRAS G12C ‑mutated locally advanced or metastatic non-small cell lung cancer (NSCLC), as determined by an FDA ‑approved test, who have received at least one prior systemic therapy. FDA also approved the QIAGEN therascreen® KRAS RGQ PCR kit (tissue) and the Guardant360® CDx (plasma) as companion diagnostics for Lumakras.
 </a:t>
         </a:r>
       </a:p>
     </p188:txBody>
   </p188:cm>
-  <p188:cm id="{DD6426B0-01AB-4EEC-B5FD-A02F37A6440D}" authorId="{07CD90FA-E915-4AD6-992C-830F90B9A2E9}" created="2023-10-09T18:52:11.5840000">
+  <p188:cm id="{28C92657-08FE-47DF-86F5-41458C00DB80}" authorId="{0AFD991A-DE7F-4F83-AF8C-13D7C566DFAB}" created="2023-10-09T20:22:13.2810000">
     <pc:sldMkLst>
       <pc:docMk/>
       <pc:sldMk cId="2149721198" sldId="5228"/>
@@ -2384,13 +1070,14 @@
           <a:rPr/>
           <a:t>Pdf name: Pipeline deck _Reference binder.pdf
 Pdf page number: 61
+Slide text:G12Cmutated nonsmall cell lung cancer who had at least one prior systemic therapy phase 3 is the confirmatory trial
 Pdf matched content: ADDITIONAL INFORMATION LUMAKRAS received accelerated approval by the FDA in May 2021 for the treatment of patients with KRAS G12C-mutated locally advanced or metastatic non-small cell lung cancer (NSCLC), as determined by an FDA-approved test, following at least one prior systemic therapy.
 </a:t>
         </a:r>
       </a:p>
     </p188:txBody>
   </p188:cm>
-  <p188:cm id="{C7C33448-4C90-4A9D-802F-D0BB061DFD68}" authorId="{07CD90FA-E915-4AD6-992C-830F90B9A2E9}" created="2023-10-09T18:52:11.5840000">
+  <p188:cm id="{4CAB93D8-6CF4-4608-98D2-65A7C2CE9B9C}" authorId="{0AFD991A-DE7F-4F83-AF8C-13D7C566DFAB}" created="2023-10-09T20:22:13.2810000">
     <pc:sldMkLst>
       <pc:docMk/>
       <pc:sldMk cId="2149721198" sldId="5228"/>
@@ -2404,13 +1091,14 @@
           <a:rPr/>
           <a:t>Pdf name: Pipeline deck _Reference binder.pdf
 Pdf page number: 69
+Slide text:EGFR epidermal growth factor receptor FDA Food and Drug Administration 
 Pdf matched content: AMG 651 Hematology/Oncology Colorectal Cancer Bispecific T-Cell Engager DESCRIPTION AMG 651 (CX-904) is a T-cell engaging bispecific Probody® candidate against epidermal growth factor receptor (EGFR) and CD3. It is being investigated for the treatment of solid tumors.
 </a:t>
         </a:r>
       </a:p>
     </p188:txBody>
   </p188:cm>
-  <p188:cm id="{237E25E1-D171-4262-8C0E-C4764FC49017}" authorId="{07CD90FA-E915-4AD6-992C-830F90B9A2E9}" created="2023-10-09T18:52:11.5850000">
+  <p188:cm id="{5102C606-2E10-4A77-A7D8-7076D6CF47BF}" authorId="{0AFD991A-DE7F-4F83-AF8C-13D7C566DFAB}" created="2023-10-09T20:22:13.2810000">
     <pc:sldMkLst>
       <pc:docMk/>
       <pc:sldMk cId="2149721198" sldId="5228"/>
@@ -2424,6 +1112,7 @@
           <a:rPr/>
           <a:t>Pdf name: Pipeline deck _Reference binder.pdf
 Pdf page number: 61
+Slide text:Small Molecule  Other Treatment Modalities
 Pdf matched content: Hematology/Oncology Other Tumors Small Molecule DESCRIPTION LUMAKRAS is a KRASG12C small molecule inhibitor under investigation for the treatment of advanced solid tumors other than non small cell lung cancer or advanced colorectal cancer.
 </a:t>
         </a:r>
@@ -2453,12 +1142,12 @@
       </a:p>
     </p188:txBody>
   </p188:cm>
-  <p188:cm id="{F2707C79-1523-43FC-B069-50D475739004}" authorId="{07CD90FA-E915-4AD6-992C-830F90B9A2E9}" created="2023-10-09T18:52:11.5850000">
+  <p188:cm id="{A1766366-6BDF-4EF6-BD04-F178597174C4}" authorId="{0AFD991A-DE7F-4F83-AF8C-13D7C566DFAB}" created="2023-10-09T20:22:13.2810000">
     <pc:sldMkLst>
       <pc:docMk/>
       <pc:sldMk cId="3485802384" sldId="5220"/>
     </pc:sldMkLst>
-    <p188:pos x="7162949" y="691"/>
+    <p188:pos x="36512" y="121920"/>
     <p188:txBody>
       <a:bodyPr/>
       <a:lstStyle/>
@@ -2466,19 +1155,20 @@
         <a:r>
           <a:rPr/>
           <a:t>Pdf name: Pipeline deck _Reference binder.pdf
-Pdf page number: 58
-Pdf matched content: Terms of Use (https://www.amgen.com/terms-of-use/)Privacy Statement (https://www.amgen.com/privacy-statement/) Amgen.com (https://www.amgen.com/)
+Pdf page number: 59
+Slide text:FDA granted breakthrough therapy designation
+Pdf matched content: It is being investigated for the treatment of advanced Gastric and Gastroesophageal Junction (GEJ) Cancers. ADDITIONAL INFORMATION In April 2021, Amgen announced that the US Food and Drug Administration (FDA), granted Breakthrough Therapy Designation for &lt;b&gt;bemarituzumab&lt;/b&gt;.
 </a:t>
         </a:r>
       </a:p>
     </p188:txBody>
   </p188:cm>
-  <p188:cm id="{3E1C55B3-1C5D-4F44-9DD2-C411B0F230E5}" authorId="{07CD90FA-E915-4AD6-992C-830F90B9A2E9}" created="2023-10-09T18:52:11.5850000">
+  <p188:cm id="{C065BF85-4C12-4692-8A75-DC2BC5E66F59}" authorId="{0AFD991A-DE7F-4F83-AF8C-13D7C566DFAB}" created="2023-10-09T20:22:13.2810000">
     <pc:sldMkLst>
       <pc:docMk/>
       <pc:sldMk cId="3485802384" sldId="5220"/>
     </pc:sldMkLst>
-    <p188:pos x="0" y="116515"/>
+    <p188:pos x="269875" y="243840"/>
     <p188:txBody>
       <a:bodyPr/>
       <a:lstStyle/>
@@ -2486,19 +1176,20 @@
         <a:r>
           <a:rPr/>
           <a:t>Pdf name: Pipeline deck _Reference binder.pdf
-Pdf page number: 78
-Pdf matched content: In 52 global controlled and uncontrolled clinical trials of adalimumab in adult patients with RA, PsA, AS, CD, UC, Ps and other indications, the most frequently observed malignancies, other than lymphoma and NMSC, were breast, colon, prostate, lung, and melanoma.
+Pdf page number: 66
+Slide text: bispecific Tcell engager CD3 cluster of differentiation 3 DLL3 deltalike ligand 3 FDA Food and Drug Administration FGFR2b fibroblast growth factor receptor 2 HLE halflife extended MOA mechanism of action PCD primary completion date TPORA thrombopoietin receptor agonist
+Pdf matched content: It is being investigated for the treatment of small cell lung cancer. Hematology/Oncology Neuroendocrine Prostate Cancer BiTE® Molecule DESCRIPTION Tarlatamab (formerly AMG 757) is a half-life extended (HLE) anti- delta-like ligand 3 (DLL3) x anti-CD3 bispecific T cell engager (BiTE) molecule.
 </a:t>
         </a:r>
       </a:p>
     </p188:txBody>
   </p188:cm>
-  <p188:cm id="{7F1C3F1B-76D1-4FB3-8AB6-A3F454E475BD}" authorId="{07CD90FA-E915-4AD6-992C-830F90B9A2E9}" created="2023-10-09T18:52:11.5850000">
+  <p188:cm id="{0138F731-7CEF-4770-9C88-06D4B949D9D4}" authorId="{0AFD991A-DE7F-4F83-AF8C-13D7C566DFAB}" created="2023-10-09T20:22:13.2820000">
     <pc:sldMkLst>
       <pc:docMk/>
       <pc:sldMk cId="3485802384" sldId="5220"/>
     </pc:sldMkLst>
-    <p188:pos x="2146300" y="116515"/>
+    <p188:pos x="91440" y="-121920"/>
     <p188:txBody>
       <a:bodyPr/>
       <a:lstStyle/>
@@ -2506,19 +1197,20 @@
         <a:r>
           <a:rPr/>
           <a:t>Pdf name: Pipeline deck _Reference binder.pdf
-Pdf page number: 58
-Pdf matched content: Terms of Use (https://www.amgen.com/terms-of-use/)Privacy Statement (https://www.amgen.com/privacy-statement/) Amgen.com (https://www.amgen.com/)
+Pdf page number: 64
+Slide text:Investigational Indication 
+Pdf matched content: MOLECULE NAME THERAPEUTIC AREA INVESTIGATIONAL INDICATION MODALITY PHASE *Modalities in use across pipeline and marketed products. Modality refers to the structural template of a therapeutic agent.
 </a:t>
         </a:r>
       </a:p>
     </p188:txBody>
   </p188:cm>
-  <p188:cm id="{CE0D359F-087B-42D0-9DB2-51912CA74643}" authorId="{07CD90FA-E915-4AD6-992C-830F90B9A2E9}" created="2023-10-09T18:52:11.5850000">
+  <p188:cm id="{61C4E475-95CF-46D8-8542-6B0C5BFDBDDE}" authorId="{0AFD991A-DE7F-4F83-AF8C-13D7C566DFAB}" created="2023-10-09T20:22:13.2820000">
     <pc:sldMkLst>
       <pc:docMk/>
       <pc:sldMk cId="3485802384" sldId="5220"/>
     </pc:sldMkLst>
-    <p188:pos x="4450358" y="116515"/>
+    <p188:pos x="91440" y="-121920"/>
     <p188:txBody>
       <a:bodyPr/>
       <a:lstStyle/>
@@ -2526,19 +1218,20 @@
         <a:r>
           <a:rPr/>
           <a:t>Pdf name: Pipeline deck _Reference binder.pdf
-Pdf page number: 318
-Pdf matched content: Among 1245 adult PsO patients treated with Enbrel in controlled clinical trials, representing approximately 283.
+Pdf page number: 489
+Slide text:Advanced gastric cancergastroesophageal junction cancer 
+Pdf matched content: Select patients for therapy based on an FDA-approved companion diagnostic for a trastuzumab product [see Dosage and Administration (2.1)] 1.3 Metastatic Gastric Cancer KANJINTI is indicated, in combination with cisplatin and capecitabine or 5-fluorouracil, for the treatment of patients with HER2 overexpressing metastatic gastric or gastroesophageal junction adenocarcinoma who have not received prior treatment for metastatic disease.
 </a:t>
         </a:r>
       </a:p>
     </p188:txBody>
   </p188:cm>
-  <p188:cm id="{3C8EF6CF-DA4C-414E-B220-95D418EA754C}" authorId="{07CD90FA-E915-4AD6-992C-830F90B9A2E9}" created="2023-10-09T18:52:11.5850000">
+  <p188:cm id="{7C557D5A-1E8C-479F-B260-631B33746D2C}" authorId="{0AFD991A-DE7F-4F83-AF8C-13D7C566DFAB}" created="2023-10-09T20:22:13.2820000">
     <pc:sldMkLst>
       <pc:docMk/>
       <pc:sldMk cId="3485802384" sldId="5220"/>
     </pc:sldMkLst>
-    <p188:pos x="6596658" y="116515"/>
+    <p188:pos x="91440" y="-38100"/>
     <p188:txBody>
       <a:bodyPr/>
       <a:lstStyle/>
@@ -2546,19 +1239,20 @@
         <a:r>
           <a:rPr/>
           <a:t>Pdf name: Pipeline deck _Reference binder.pdf
-Pdf page number: 58
-Pdf matched content: Terms of Use (https://www.amgen.com/terms-of-use/)Privacy Statement (https://www.amgen.com/privacy-statement/) Amgen.com (https://www.amgen.com/)
+Pdf page number: 86
+Slide text:PCD August 18 2025
+Pdf matched content: In Study PCD-I, allergic reactions were observed in 5% of children which were all non-serious and were primarily localized reactions.
 </a:t>
         </a:r>
       </a:p>
     </p188:txBody>
   </p188:cm>
-  <p188:cm id="{4422E47D-5E68-4511-9B80-9E3A44BA4F65}" authorId="{07CD90FA-E915-4AD6-992C-830F90B9A2E9}" created="2023-10-09T18:52:11.5850000">
+  <p188:cm id="{2A02C79D-7B63-4322-B9C7-3B785857CDA9}" authorId="{0AFD991A-DE7F-4F83-AF8C-13D7C566DFAB}" created="2023-10-09T20:22:13.2820000">
     <pc:sldMkLst>
       <pc:docMk/>
       <pc:sldMk cId="3485802384" sldId="5220"/>
     </pc:sldMkLst>
-    <p188:pos x="0" y="232339"/>
+    <p188:pos x="91440" y="-121920"/>
     <p188:txBody>
       <a:bodyPr/>
       <a:lstStyle/>
@@ -2566,19 +1260,20 @@
         <a:r>
           <a:rPr/>
           <a:t>Pdf name: Pipeline deck _Reference binder.pdf
-Pdf page number: 318
-Pdf matched content: Whether treatment with Enbrel might influence the development and course of malignancies in adults is unknown. Melanoma and Non-Melanoma Skin Cancer (NMSC) Melanoma and non-melanoma skin cancer has been reported in patients treated with TNF antagonists including etanercept.
+Pdf page number: 61
+Slide text:Chemotherapyinduced thrombocytopenia RECITE PROCLAIM
+Pdf matched content: NPLATE® (romiplostim) Hematology/Oncology Chemotherapy-Induced Thrombocytopenia Peptibody DESCRIPTION Nplate is a thrombopoietin receptor agonist (TPO-RA). It is being investigated for the treatment of chemotherapy-induced thrombocytopenia (CIT).
 </a:t>
         </a:r>
       </a:p>
     </p188:txBody>
   </p188:cm>
-  <p188:cm id="{2FE7F728-1E53-4EB2-91EC-02A04602C332}" authorId="{07CD90FA-E915-4AD6-992C-830F90B9A2E9}" created="2023-10-09T18:52:11.5850000">
+  <p188:cm id="{DCFD7A63-6DEA-4B61-809E-781C0A817110}" authorId="{0AFD991A-DE7F-4F83-AF8C-13D7C566DFAB}" created="2023-10-09T20:22:13.2820000">
     <pc:sldMkLst>
       <pc:docMk/>
       <pc:sldMk cId="3485802384" sldId="5220"/>
     </pc:sldMkLst>
-    <p188:pos x="2146300" y="232339"/>
+    <p188:pos x="173037" y="-121920"/>
     <p188:txBody>
       <a:bodyPr/>
       <a:lstStyle/>
@@ -2586,19 +1281,20 @@
         <a:r>
           <a:rPr/>
           <a:t>Pdf name: Pipeline deck _Reference binder.pdf
-Pdf page number: 58
-Pdf matched content: Terms of Use (https://www.amgen.com/terms-of-use/)Privacy Statement (https://www.amgen.com/privacy-statement/) Amgen.com (https://www.amgen.com/)
+Pdf page number: 66
+Slide text:HLE antiDLL3 x antiCD3
+Pdf matched content: It is being investigated for the treatment of small cell lung cancer. Hematology/Oncology Neuroendocrine Prostate Cancer BiTE® Molecule DESCRIPTION Tarlatamab (formerly AMG 757) is a half-life extended (HLE) anti- delta-like ligand 3 (DLL3) x anti-CD3 bispecific T cell engager (BiTE) molecule.
 </a:t>
         </a:r>
       </a:p>
     </p188:txBody>
   </p188:cm>
-  <p188:cm id="{F886BC8B-2860-42E4-A75F-ED508BD46ACD}" authorId="{07CD90FA-E915-4AD6-992C-830F90B9A2E9}" created="2023-10-09T18:52:11.5850000">
+  <p188:cm id="{60EB0293-A2B7-4B24-8706-D3B528FFCA01}" authorId="{0AFD991A-DE7F-4F83-AF8C-13D7C566DFAB}" created="2023-10-09T20:22:13.2820000">
     <pc:sldMkLst>
       <pc:docMk/>
       <pc:sldMk cId="3485802384" sldId="5220"/>
     </pc:sldMkLst>
-    <p188:pos x="4450358" y="232339"/>
+    <p188:pos x="309562" y="-121920"/>
     <p188:txBody>
       <a:bodyPr/>
       <a:lstStyle/>
@@ -2606,19 +1302,20 @@
         <a:r>
           <a:rPr/>
           <a:t>Pdf name: Pipeline deck _Reference binder.pdf
-Pdf page number: 318
-Pdf matched content: Among 1245 adult PsO patients treated with Enbrel in controlled clinical trials, representing approximately 283.
+Pdf page number: 60
+Slide text:Proteasome inhibitor
+Pdf matched content: Hematology/Oncology Pediatric Acute Lymphoblastic Leukemia Small Molecule DESCRIPTION KYPROLIS is a small molecule proteasome inhibitor (PI). It is being investigated for the treatment of acute lymphoblastic leukemia (ALL) in pediatric patients.
 </a:t>
         </a:r>
       </a:p>
     </p188:txBody>
   </p188:cm>
-  <p188:cm id="{80E0F527-DA2A-4A8C-9C83-05BEAFB091C0}" authorId="{07CD90FA-E915-4AD6-992C-830F90B9A2E9}" created="2023-10-09T18:52:11.5850000">
+  <p188:cm id="{F7D426BF-6569-4589-A941-4D90DEF8DE54}" authorId="{0AFD991A-DE7F-4F83-AF8C-13D7C566DFAB}" created="2023-10-09T20:22:13.2820000">
     <pc:sldMkLst>
       <pc:docMk/>
       <pc:sldMk cId="3485802384" sldId="5220"/>
     </pc:sldMkLst>
-    <p188:pos x="6596658" y="232339"/>
+    <p188:pos x="91440" y="-38100"/>
     <p188:txBody>
       <a:bodyPr/>
       <a:lstStyle/>
@@ -2626,68 +1323,9 @@
         <a:r>
           <a:rPr/>
           <a:t>Pdf name: Pipeline deck _Reference binder.pdf
-Pdf page number: 58
-Pdf matched content: Terms of Use (https://www.amgen.com/terms-of-use/)Privacy Statement (https://www.amgen.com/privacy-statement/) Amgen.com (https://www.amgen.com/)
-</a:t>
-        </a:r>
-      </a:p>
-    </p188:txBody>
-  </p188:cm>
-  <p188:cm id="{474C04A6-891F-4A2C-B53B-0F4D3B2E6370}" authorId="{07CD90FA-E915-4AD6-992C-830F90B9A2E9}" created="2023-10-09T18:52:11.5850000">
-    <pc:sldMkLst>
-      <pc:docMk/>
-      <pc:sldMk cId="3485802384" sldId="5220"/>
-    </pc:sldMkLst>
-    <p188:pos x="8637439" y="232339"/>
-    <p188:txBody>
-      <a:bodyPr/>
-      <a:lstStyle/>
-      <a:p>
-        <a:r>
-          <a:rPr/>
-          <a:t>Pdf name: Pipeline deck _Reference binder.pdf
-Pdf page number: 54
-Pdf matched content: 1/16/23, 1:19 PM Amgen Medical Products | Prescribing Information | Amgen MedInfo US https://www.amgenmedinfo.com/s/us/explore-our-medical-products?language=en_US 4/8 Therapeutic Area(s) Hematology / Oncology Approved Labeling KANJINTI™ - Prescribing Information (https://www.pi.amgen.com/~/media/amgen/repositorysites/pi-amgen-com/ka… Kyprolis (carfilzomib) Therapeutic Area(s) Hematology / Oncology Approved Labeling Kyprolis® - Prescribing Information (http://pi.amgen.com/united_states/kyprolis/kyprolis_pi.pdf) LUMAKRAS (sotorasib) Therapeutic Area(s) Oncology Approved Labeling LUMAKRAS® - Prescribing Information (https://www.pi.amgen.com/~/media/amgen/repositorysites/pi-amgen-com/l… LUMAKRAS® - Patient Information (https://www.pi.amgen.com/~/media/amgen/repositorysites/pi-amgen-com/luma… MVASI (bevacizumab-awwb) Therapeutic Area(s) Hematology / Oncology Approved Labeling MVASI™ - Prescribing Information (https://www.pi.amgen.com/~/media/amgen/repositorysites/pi-amgen-com/mvasi… Neulasta (pegfilgrastim) Therapeutic Area(s) Hematology / Oncology ® ® ™ ®
-</a:t>
-        </a:r>
-      </a:p>
-    </p188:txBody>
-  </p188:cm>
-  <p188:cm id="{CA0F133F-F413-422F-8B1E-57FDD9384DDC}" authorId="{07CD90FA-E915-4AD6-992C-830F90B9A2E9}" created="2023-10-09T18:52:11.5850000">
-    <pc:sldMkLst>
-      <pc:docMk/>
-      <pc:sldMk cId="3485802384" sldId="5220"/>
-    </pc:sldMkLst>
-    <p188:pos x="3959721" y="348163"/>
-    <p188:txBody>
-      <a:bodyPr/>
-      <a:lstStyle/>
-      <a:p>
-        <a:r>
-          <a:rPr/>
-          <a:t>Pdf name: Pipeline deck _Reference binder.pdf
-Pdf page number: 318
-Pdf matched content: Whether treatment with Enbrel might influence the development and course of malignancies in adults is unknown. Melanoma and Non-Melanoma Skin Cancer (NMSC) Melanoma and non-melanoma skin cancer has been reported in patients treated with TNF antagonists including etanercept.
-</a:t>
-        </a:r>
-      </a:p>
-    </p188:txBody>
-  </p188:cm>
-  <p188:cm id="{4DA9CDFE-77D3-4387-9D6A-B1659ED9B65D}" authorId="{07CD90FA-E915-4AD6-992C-830F90B9A2E9}" created="2023-10-09T18:52:11.5850000">
-    <pc:sldMkLst>
-      <pc:docMk/>
-      <pc:sldMk cId="3485802384" sldId="5220"/>
-    </pc:sldMkLst>
-    <p188:pos x="6106021" y="348163"/>
-    <p188:txBody>
-      <a:bodyPr/>
-      <a:lstStyle/>
-      <a:p>
-        <a:r>
-          <a:rPr/>
-          <a:t>Pdf name: Pipeline deck _Reference binder.pdf
-Pdf page number: 58
-Pdf matched content: Terms of Use (https://www.amgen.com/terms-of-use/)Privacy Statement (https://www.amgen.com/privacy-statement/) Amgen.com (https://www.amgen.com/)
+Pdf page number: 269
+Slide text:Relapsedrefractory multiple myeloma ARROW2
+Pdf matched content: Complete MRD response was defined as the absence of detectable MRD confirmed in an assay with minimum sensitivity of 0.01%. 2. Relapse was defined as either hematological or extramedullary relapse, secondary leukemia, or death due to any cause; Includes time after transplantation; Kaplan-Meier estimate.
 </a:t>
         </a:r>
       </a:p>
@@ -2776,7 +1414,7 @@
           <a:p>
             <a:fld id="{B081616E-4838-48DA-8C2A-E0CE91811A72}" type="datetimeFigureOut">
               <a:rPr lang="en-US" smtClean="0"/>
-              <a:t>10/5/23</a:t>
+              <a:t>10/9/23</a:t>
             </a:fld>
             <a:endParaRPr lang="en-US"/>
           </a:p>
@@ -24098,891 +22736,6 @@
       </p:sp>
       <p:sp>
         <p:nvSpPr>
-          <p:cNvPr id="32" name="Rectangle 31">
-            <a:extLst>
-              <a:ext uri="{FF2B5EF4-FFF2-40B4-BE49-F238E27FC236}">
-                <a16:creationId xmlns:a16="http://schemas.microsoft.com/office/drawing/2014/main" id="{CFDEEDDF-534F-4E75-ACBC-6C9D0DFD3F08}"/>
-              </a:ext>
-            </a:extLst>
-          </p:cNvPr>
-          <p:cNvSpPr/>
-          <p:nvPr/>
-        </p:nvSpPr>
-        <p:spPr>
-          <a:xfrm>
-            <a:off x="353623" y="5175954"/>
-            <a:ext cx="10424160" cy="1447319"/>
-          </a:xfrm>
-          <a:prstGeom prst="rect">
-            <a:avLst/>
-          </a:prstGeom>
-        </p:spPr>
-        <p:txBody>
-          <a:bodyPr wrap="square" lIns="0" tIns="0" rIns="0" bIns="0" anchor="b">
-            <a:spAutoFit/>
-          </a:bodyPr>
-          <a:lstStyle/>
-          <a:p>
-            <a:pPr lvl="0">
-              <a:lnSpc>
-                <a:spcPct val="95000"/>
-              </a:lnSpc>
-            </a:pPr>
-            <a:r>
-              <a:rPr lang="en-US" sz="900" b="1">
-                <a:solidFill>
-                  <a:srgbClr val="000000"/>
-                </a:solidFill>
-              </a:rPr>
-              <a:t>References: 1. </a:t>
-            </a:r>
-            <a:r>
-              <a:rPr lang="en-US" sz="900">
-                <a:solidFill>
-                  <a:srgbClr val="000000"/>
-                </a:solidFill>
-              </a:rPr>
-              <a:t>Amgen pipeline. </a:t>
-            </a:r>
-            <a:r>
-              <a:rPr lang="en-US" sz="900">
-                <a:solidFill>
-                  <a:srgbClr val="000000"/>
-                </a:solidFill>
-                <a:hlinkClick r:id="rId4"/>
-              </a:rPr>
-              <a:t>https://www.amgenpipeline.com/-/media/themes/amgen/amgenpipeline-com/amgenpipeline-com/pdf/amgen-pipeline-chart.pdf</a:t>
-            </a:r>
-            <a:r>
-              <a:rPr lang="en-US" sz="900">
-                <a:solidFill>
-                  <a:srgbClr val="000000"/>
-                </a:solidFill>
-              </a:rPr>
-              <a:t>. Accessed January 16, 2023. </a:t>
-            </a:r>
-            <a:br>
-              <a:rPr lang="en-US" sz="900">
-                <a:solidFill>
-                  <a:srgbClr val="000000"/>
-                </a:solidFill>
-                <a:hlinkClick r:id="rId4"/>
-              </a:rPr>
-            </a:br>
-            <a:r>
-              <a:rPr lang="en-US" sz="900" b="1">
-                <a:solidFill>
-                  <a:srgbClr val="000000"/>
-                </a:solidFill>
-              </a:rPr>
-              <a:t>2.</a:t>
-            </a:r>
-            <a:r>
-              <a:rPr lang="en-US" sz="900">
-                <a:solidFill>
-                  <a:srgbClr val="000000"/>
-                </a:solidFill>
-              </a:rPr>
-              <a:t> EVENITY</a:t>
-            </a:r>
-            <a:r>
-              <a:rPr lang="en-US" sz="900" baseline="30000">
-                <a:solidFill>
-                  <a:srgbClr val="000000"/>
-                </a:solidFill>
-              </a:rPr>
-              <a:t> ®</a:t>
-            </a:r>
-            <a:r>
-              <a:rPr lang="en-US" sz="900">
-                <a:solidFill>
-                  <a:srgbClr val="000000"/>
-                </a:solidFill>
-              </a:rPr>
-              <a:t> (romosozumab-aqqg) prescribing information, Amgen. </a:t>
-            </a:r>
-            <a:r>
-              <a:rPr lang="en-US" sz="900" b="1">
-                <a:solidFill>
-                  <a:srgbClr val="000000"/>
-                </a:solidFill>
-              </a:rPr>
-              <a:t>3.</a:t>
-            </a:r>
-            <a:r>
-              <a:rPr lang="en-US" sz="900">
-                <a:solidFill>
-                  <a:srgbClr val="000000"/>
-                </a:solidFill>
-              </a:rPr>
-              <a:t> Prolia</a:t>
-            </a:r>
-            <a:r>
-              <a:rPr lang="en-US" sz="900" baseline="30000">
-                <a:solidFill>
-                  <a:srgbClr val="000000"/>
-                </a:solidFill>
-              </a:rPr>
-              <a:t>®</a:t>
-            </a:r>
-            <a:r>
-              <a:rPr lang="en-US" sz="900">
-                <a:solidFill>
-                  <a:srgbClr val="000000"/>
-                </a:solidFill>
-              </a:rPr>
-              <a:t> (denosumab) prescribing information, Amgen. </a:t>
-            </a:r>
-            <a:br>
-              <a:rPr lang="en-US" sz="900">
-                <a:solidFill>
-                  <a:srgbClr val="000000"/>
-                </a:solidFill>
-              </a:rPr>
-            </a:br>
-            <a:r>
-              <a:rPr lang="en-US" sz="900" b="1">
-                <a:solidFill>
-                  <a:srgbClr val="000000"/>
-                </a:solidFill>
-              </a:rPr>
-              <a:t>4.</a:t>
-            </a:r>
-            <a:r>
-              <a:rPr lang="en-US" sz="900">
-                <a:solidFill>
-                  <a:srgbClr val="000000"/>
-                </a:solidFill>
-              </a:rPr>
-              <a:t> </a:t>
-            </a:r>
-            <a:r>
-              <a:rPr lang="en-US" sz="900">
-                <a:effectLst/>
-              </a:rPr>
-              <a:t>Amgen approved products. </a:t>
-            </a:r>
-            <a:r>
-              <a:rPr lang="en-US" sz="900">
-                <a:effectLst/>
-                <a:hlinkClick r:id="rId5"/>
-              </a:rPr>
-              <a:t>https://www.amgenmedinfo.com/s/us/explore-our-medical-products?language=en_US</a:t>
-            </a:r>
-            <a:r>
-              <a:rPr lang="en-US" sz="900"/>
-              <a:t>. Accessed January 16, 2023. </a:t>
-            </a:r>
-            <a:r>
-              <a:rPr lang="en-US" sz="900" b="1">
-                <a:effectLst/>
-              </a:rPr>
-              <a:t>5. </a:t>
-            </a:r>
-            <a:r>
-              <a:rPr lang="en-US" sz="900">
-                <a:solidFill>
-                  <a:srgbClr val="000000"/>
-                </a:solidFill>
-              </a:rPr>
-              <a:t>Corlanor</a:t>
-            </a:r>
-            <a:r>
-              <a:rPr lang="en-US" sz="900" baseline="30000">
-                <a:solidFill>
-                  <a:srgbClr val="000000"/>
-                </a:solidFill>
-              </a:rPr>
-              <a:t>®</a:t>
-            </a:r>
-            <a:r>
-              <a:rPr lang="en-US" sz="900">
-                <a:solidFill>
-                  <a:srgbClr val="000000"/>
-                </a:solidFill>
-              </a:rPr>
-              <a:t> (ivabradine) prescribing information, Amgen. </a:t>
-            </a:r>
-            <a:br>
-              <a:rPr lang="en-US" sz="900">
-                <a:solidFill>
-                  <a:srgbClr val="000000"/>
-                </a:solidFill>
-              </a:rPr>
-            </a:br>
-            <a:r>
-              <a:rPr lang="en-US" sz="900" b="1">
-                <a:solidFill>
-                  <a:srgbClr val="000000"/>
-                </a:solidFill>
-              </a:rPr>
-              <a:t>6.</a:t>
-            </a:r>
-            <a:r>
-              <a:rPr lang="en-US" sz="900">
-                <a:solidFill>
-                  <a:srgbClr val="000000"/>
-                </a:solidFill>
-              </a:rPr>
-              <a:t> Repatha</a:t>
-            </a:r>
-            <a:r>
-              <a:rPr lang="en-US" sz="900" baseline="30000">
-                <a:solidFill>
-                  <a:srgbClr val="000000"/>
-                </a:solidFill>
-              </a:rPr>
-              <a:t>®</a:t>
-            </a:r>
-            <a:r>
-              <a:rPr lang="en-US" sz="900">
-                <a:solidFill>
-                  <a:srgbClr val="000000"/>
-                </a:solidFill>
-              </a:rPr>
-              <a:t> (evolocumab) prescribing information, Amgen. </a:t>
-            </a:r>
-            <a:r>
-              <a:rPr lang="en-US" sz="900" b="1">
-                <a:solidFill>
-                  <a:srgbClr val="000000"/>
-                </a:solidFill>
-              </a:rPr>
-              <a:t>7.</a:t>
-            </a:r>
-            <a:r>
-              <a:rPr lang="en-US" sz="900">
-                <a:solidFill>
-                  <a:srgbClr val="000000"/>
-                </a:solidFill>
-              </a:rPr>
-              <a:t> LUMAKRAS™ (sotorasib) prescribing information, Amgen. </a:t>
-            </a:r>
-            <a:r>
-              <a:rPr lang="en-US" sz="900" b="1">
-                <a:solidFill>
-                  <a:srgbClr val="000000"/>
-                </a:solidFill>
-              </a:rPr>
-              <a:t>8.</a:t>
-            </a:r>
-            <a:r>
-              <a:rPr lang="en-US" sz="900">
-                <a:solidFill>
-                  <a:srgbClr val="000000"/>
-                </a:solidFill>
-              </a:rPr>
-              <a:t> Aranesp</a:t>
-            </a:r>
-            <a:r>
-              <a:rPr lang="en-US" sz="900" baseline="30000">
-                <a:solidFill>
-                  <a:srgbClr val="000000"/>
-                </a:solidFill>
-              </a:rPr>
-              <a:t>®</a:t>
-            </a:r>
-            <a:r>
-              <a:rPr lang="en-US" sz="900">
-                <a:solidFill>
-                  <a:srgbClr val="000000"/>
-                </a:solidFill>
-              </a:rPr>
-              <a:t> (darbepoetin alfa) prescribing information, Amgen. </a:t>
-            </a:r>
-            <a:br>
-              <a:rPr lang="en-US" sz="900">
-                <a:solidFill>
-                  <a:srgbClr val="000000"/>
-                </a:solidFill>
-              </a:rPr>
-            </a:br>
-            <a:r>
-              <a:rPr lang="en-US" sz="900" b="1">
-                <a:solidFill>
-                  <a:srgbClr val="000000"/>
-                </a:solidFill>
-              </a:rPr>
-              <a:t>9.</a:t>
-            </a:r>
-            <a:r>
-              <a:rPr lang="en-US" sz="900">
-                <a:solidFill>
-                  <a:srgbClr val="000000"/>
-                </a:solidFill>
-              </a:rPr>
-              <a:t> BLINCYTO</a:t>
-            </a:r>
-            <a:r>
-              <a:rPr lang="en-US" sz="900" baseline="30000">
-                <a:solidFill>
-                  <a:srgbClr val="000000"/>
-                </a:solidFill>
-              </a:rPr>
-              <a:t>®</a:t>
-            </a:r>
-            <a:r>
-              <a:rPr lang="en-US" sz="900">
-                <a:solidFill>
-                  <a:srgbClr val="000000"/>
-                </a:solidFill>
-              </a:rPr>
-              <a:t> (blinatumomab) prescribing information, Amgen.</a:t>
-            </a:r>
-            <a:r>
-              <a:rPr lang="en-US" sz="900" b="1">
-                <a:solidFill>
-                  <a:srgbClr val="000000"/>
-                </a:solidFill>
-              </a:rPr>
-              <a:t> 10.</a:t>
-            </a:r>
-            <a:r>
-              <a:rPr lang="en-US" sz="900">
-                <a:solidFill>
-                  <a:srgbClr val="000000"/>
-                </a:solidFill>
-              </a:rPr>
-              <a:t> EPOGEN</a:t>
-            </a:r>
-            <a:r>
-              <a:rPr lang="en-US" sz="900" baseline="30000">
-                <a:solidFill>
-                  <a:srgbClr val="000000"/>
-                </a:solidFill>
-              </a:rPr>
-              <a:t>®</a:t>
-            </a:r>
-            <a:r>
-              <a:rPr lang="en-US" sz="900">
-                <a:solidFill>
-                  <a:srgbClr val="000000"/>
-                </a:solidFill>
-              </a:rPr>
-              <a:t> (epoetin alfa) prescribing information, Amgen. </a:t>
-            </a:r>
-            <a:r>
-              <a:rPr lang="en-US" sz="900" b="1">
-                <a:solidFill>
-                  <a:srgbClr val="000000"/>
-                </a:solidFill>
-              </a:rPr>
-              <a:t>11.</a:t>
-            </a:r>
-            <a:r>
-              <a:rPr lang="en-US" sz="900">
-                <a:solidFill>
-                  <a:srgbClr val="000000"/>
-                </a:solidFill>
-              </a:rPr>
-              <a:t> IMLYGIC</a:t>
-            </a:r>
-            <a:r>
-              <a:rPr lang="en-US" sz="900" baseline="30000">
-                <a:solidFill>
-                  <a:srgbClr val="000000"/>
-                </a:solidFill>
-              </a:rPr>
-              <a:t>®</a:t>
-            </a:r>
-            <a:r>
-              <a:rPr lang="en-US" sz="900">
-                <a:solidFill>
-                  <a:srgbClr val="000000"/>
-                </a:solidFill>
-              </a:rPr>
-              <a:t> (talimogene laherparepvec) prescribing information, BioVex, Inc., a subsidiary of Amgen Inc. </a:t>
-            </a:r>
-            <a:r>
-              <a:rPr lang="en-US" sz="900" b="1">
-                <a:solidFill>
-                  <a:srgbClr val="000000"/>
-                </a:solidFill>
-              </a:rPr>
-              <a:t>12.</a:t>
-            </a:r>
-            <a:r>
-              <a:rPr lang="en-US" sz="900">
-                <a:solidFill>
-                  <a:srgbClr val="000000"/>
-                </a:solidFill>
-              </a:rPr>
-              <a:t> KANJINTI™ (trastuzumab-anns) prescribing information, Amgen. </a:t>
-            </a:r>
-            <a:r>
-              <a:rPr lang="en-US" sz="900" b="1">
-                <a:solidFill>
-                  <a:srgbClr val="000000"/>
-                </a:solidFill>
-              </a:rPr>
-              <a:t>13.</a:t>
-            </a:r>
-            <a:r>
-              <a:rPr lang="en-US" sz="900">
-                <a:solidFill>
-                  <a:srgbClr val="000000"/>
-                </a:solidFill>
-              </a:rPr>
-              <a:t> KYPROLIS</a:t>
-            </a:r>
-            <a:r>
-              <a:rPr lang="en-US" sz="900" baseline="30000">
-                <a:solidFill>
-                  <a:srgbClr val="000000"/>
-                </a:solidFill>
-              </a:rPr>
-              <a:t>®</a:t>
-            </a:r>
-            <a:r>
-              <a:rPr lang="en-US" sz="900">
-                <a:solidFill>
-                  <a:srgbClr val="000000"/>
-                </a:solidFill>
-              </a:rPr>
-              <a:t> (carfilzomib) prescribing information, Onyx Pharmaceuticals Inc., an Amgen Inc. subsidiary. </a:t>
-            </a:r>
-            <a:r>
-              <a:rPr lang="en-US" sz="900" b="1">
-                <a:solidFill>
-                  <a:srgbClr val="000000"/>
-                </a:solidFill>
-              </a:rPr>
-              <a:t>14.</a:t>
-            </a:r>
-            <a:r>
-              <a:rPr lang="en-US" sz="900">
-                <a:solidFill>
-                  <a:srgbClr val="000000"/>
-                </a:solidFill>
-              </a:rPr>
-              <a:t> MVASI</a:t>
-            </a:r>
-            <a:r>
-              <a:rPr lang="en-US" sz="900" baseline="30000">
-                <a:solidFill>
-                  <a:srgbClr val="000000"/>
-                </a:solidFill>
-              </a:rPr>
-              <a:t>®</a:t>
-            </a:r>
-            <a:r>
-              <a:rPr lang="en-US" sz="900">
-                <a:solidFill>
-                  <a:srgbClr val="000000"/>
-                </a:solidFill>
-              </a:rPr>
-              <a:t> (bevacizumab-awwb) prescribing information, Amgen. </a:t>
-            </a:r>
-            <a:r>
-              <a:rPr lang="en-US" sz="900" b="1">
-                <a:solidFill>
-                  <a:srgbClr val="000000"/>
-                </a:solidFill>
-              </a:rPr>
-              <a:t>15.</a:t>
-            </a:r>
-            <a:r>
-              <a:rPr lang="en-US" sz="900">
-                <a:solidFill>
-                  <a:srgbClr val="000000"/>
-                </a:solidFill>
-              </a:rPr>
-              <a:t> Neulasta</a:t>
-            </a:r>
-            <a:r>
-              <a:rPr lang="en-US" sz="900" baseline="30000">
-                <a:solidFill>
-                  <a:srgbClr val="000000"/>
-                </a:solidFill>
-              </a:rPr>
-              <a:t>®</a:t>
-            </a:r>
-            <a:r>
-              <a:rPr lang="en-US" sz="900">
-                <a:solidFill>
-                  <a:srgbClr val="000000"/>
-                </a:solidFill>
-              </a:rPr>
-              <a:t> (pegfilgrastim) prescribing information, Amgen. </a:t>
-            </a:r>
-            <a:r>
-              <a:rPr lang="en-US" sz="900" b="1">
-                <a:solidFill>
-                  <a:srgbClr val="000000"/>
-                </a:solidFill>
-              </a:rPr>
-              <a:t>16.</a:t>
-            </a:r>
-            <a:r>
-              <a:rPr lang="en-US" sz="900">
-                <a:solidFill>
-                  <a:srgbClr val="000000"/>
-                </a:solidFill>
-              </a:rPr>
-              <a:t> NEUPOGEN</a:t>
-            </a:r>
-            <a:r>
-              <a:rPr lang="en-US" sz="900" baseline="30000">
-                <a:solidFill>
-                  <a:srgbClr val="000000"/>
-                </a:solidFill>
-              </a:rPr>
-              <a:t>®</a:t>
-            </a:r>
-            <a:r>
-              <a:rPr lang="en-US" sz="900">
-                <a:solidFill>
-                  <a:srgbClr val="000000"/>
-                </a:solidFill>
-              </a:rPr>
-              <a:t> (filgrastim) prescribing information, Amgen. </a:t>
-            </a:r>
-            <a:r>
-              <a:rPr lang="en-US" sz="900" b="1">
-                <a:solidFill>
-                  <a:srgbClr val="000000"/>
-                </a:solidFill>
-              </a:rPr>
-              <a:t>17.</a:t>
-            </a:r>
-            <a:r>
-              <a:rPr lang="en-US" sz="900">
-                <a:solidFill>
-                  <a:srgbClr val="000000"/>
-                </a:solidFill>
-              </a:rPr>
-              <a:t> Nplate</a:t>
-            </a:r>
-            <a:r>
-              <a:rPr lang="en-US" sz="900" baseline="30000">
-                <a:solidFill>
-                  <a:srgbClr val="000000"/>
-                </a:solidFill>
-              </a:rPr>
-              <a:t>®</a:t>
-            </a:r>
-            <a:r>
-              <a:rPr lang="en-US" sz="900">
-                <a:solidFill>
-                  <a:srgbClr val="000000"/>
-                </a:solidFill>
-              </a:rPr>
-              <a:t> (romiplostim) prescribing information, Amgen. </a:t>
-            </a:r>
-            <a:r>
-              <a:rPr lang="en-US" sz="900" b="1">
-                <a:solidFill>
-                  <a:srgbClr val="000000"/>
-                </a:solidFill>
-              </a:rPr>
-              <a:t>18.</a:t>
-            </a:r>
-            <a:r>
-              <a:rPr lang="en-US" sz="900">
-                <a:solidFill>
-                  <a:srgbClr val="000000"/>
-                </a:solidFill>
-              </a:rPr>
-              <a:t> Vectibix</a:t>
-            </a:r>
-            <a:r>
-              <a:rPr lang="en-US" sz="900" baseline="30000">
-                <a:solidFill>
-                  <a:srgbClr val="000000"/>
-                </a:solidFill>
-              </a:rPr>
-              <a:t>®</a:t>
-            </a:r>
-            <a:r>
-              <a:rPr lang="en-US" sz="900">
-                <a:solidFill>
-                  <a:srgbClr val="000000"/>
-                </a:solidFill>
-              </a:rPr>
-              <a:t> (panitumumab) prescribing information, Amgen. </a:t>
-            </a:r>
-            <a:r>
-              <a:rPr lang="en-US" sz="900" b="1">
-                <a:solidFill>
-                  <a:srgbClr val="000000"/>
-                </a:solidFill>
-              </a:rPr>
-              <a:t>19.</a:t>
-            </a:r>
-            <a:r>
-              <a:rPr lang="en-US" sz="900">
-                <a:solidFill>
-                  <a:srgbClr val="000000"/>
-                </a:solidFill>
-              </a:rPr>
-              <a:t> XGEVA</a:t>
-            </a:r>
-            <a:r>
-              <a:rPr lang="en-US" sz="900" baseline="30000">
-                <a:solidFill>
-                  <a:srgbClr val="000000"/>
-                </a:solidFill>
-              </a:rPr>
-              <a:t>®</a:t>
-            </a:r>
-            <a:r>
-              <a:rPr lang="en-US" sz="900">
-                <a:solidFill>
-                  <a:srgbClr val="000000"/>
-                </a:solidFill>
-              </a:rPr>
-              <a:t> (denosumab) prescribing information, Amgen. </a:t>
-            </a:r>
-            <a:r>
-              <a:rPr lang="en-US" sz="900" b="1">
-                <a:solidFill>
-                  <a:srgbClr val="000000"/>
-                </a:solidFill>
-              </a:rPr>
-              <a:t>20.</a:t>
-            </a:r>
-            <a:r>
-              <a:rPr lang="en-US" sz="900">
-                <a:solidFill>
-                  <a:srgbClr val="000000"/>
-                </a:solidFill>
-              </a:rPr>
-              <a:t> RIABNI™ (rituximab-arrx) prescribing information, Amgen. </a:t>
-            </a:r>
-            <a:r>
-              <a:rPr lang="en-US" sz="900" b="1">
-                <a:solidFill>
-                  <a:srgbClr val="000000"/>
-                </a:solidFill>
-              </a:rPr>
-              <a:t>21.</a:t>
-            </a:r>
-            <a:r>
-              <a:rPr lang="en-US" sz="900">
-                <a:solidFill>
-                  <a:srgbClr val="000000"/>
-                </a:solidFill>
-              </a:rPr>
-              <a:t> Amjevita™ (adalimumab-atto) prescribing information, Amgen. </a:t>
-            </a:r>
-            <a:r>
-              <a:rPr lang="en-US" sz="900" b="1">
-                <a:solidFill>
-                  <a:srgbClr val="000000"/>
-                </a:solidFill>
-              </a:rPr>
-              <a:t>22.</a:t>
-            </a:r>
-            <a:r>
-              <a:rPr lang="en-US" sz="900">
-                <a:solidFill>
-                  <a:srgbClr val="000000"/>
-                </a:solidFill>
-              </a:rPr>
-              <a:t> AVSOLA™ (infliximab-axxq) prescribing information, Amgen. </a:t>
-            </a:r>
-            <a:r>
-              <a:rPr lang="en-US" sz="900" b="1">
-                <a:solidFill>
-                  <a:srgbClr val="000000"/>
-                </a:solidFill>
-              </a:rPr>
-              <a:t>23.</a:t>
-            </a:r>
-            <a:r>
-              <a:rPr lang="en-US" sz="900">
-                <a:solidFill>
-                  <a:srgbClr val="000000"/>
-                </a:solidFill>
-              </a:rPr>
-              <a:t> Enbrel</a:t>
-            </a:r>
-            <a:r>
-              <a:rPr lang="en-US" sz="900" baseline="30000">
-                <a:solidFill>
-                  <a:srgbClr val="000000"/>
-                </a:solidFill>
-              </a:rPr>
-              <a:t>®</a:t>
-            </a:r>
-            <a:r>
-              <a:rPr lang="en-US" sz="900">
-                <a:solidFill>
-                  <a:srgbClr val="000000"/>
-                </a:solidFill>
-              </a:rPr>
-              <a:t> (etanercept) prescribing information, Amgen. </a:t>
-            </a:r>
-            <a:r>
-              <a:rPr lang="en-US" sz="900" b="1">
-                <a:solidFill>
-                  <a:srgbClr val="000000"/>
-                </a:solidFill>
-              </a:rPr>
-              <a:t>24.</a:t>
-            </a:r>
-            <a:r>
-              <a:rPr lang="en-US" sz="900">
-                <a:solidFill>
-                  <a:srgbClr val="000000"/>
-                </a:solidFill>
-              </a:rPr>
-              <a:t> OTEZLA</a:t>
-            </a:r>
-            <a:r>
-              <a:rPr lang="en-US" sz="900" baseline="30000">
-                <a:solidFill>
-                  <a:srgbClr val="000000"/>
-                </a:solidFill>
-              </a:rPr>
-              <a:t>®</a:t>
-            </a:r>
-            <a:r>
-              <a:rPr lang="en-US" sz="900">
-                <a:solidFill>
-                  <a:srgbClr val="000000"/>
-                </a:solidFill>
-              </a:rPr>
-              <a:t> (apremilast) prescribing information, Amgen. </a:t>
-            </a:r>
-            <a:r>
-              <a:rPr lang="en-US" sz="900" b="1">
-                <a:solidFill>
-                  <a:srgbClr val="000000"/>
-                </a:solidFill>
-              </a:rPr>
-              <a:t>25.</a:t>
-            </a:r>
-            <a:r>
-              <a:rPr lang="en-US" sz="900">
-                <a:solidFill>
-                  <a:srgbClr val="000000"/>
-                </a:solidFill>
-              </a:rPr>
-              <a:t> TEZSPIRE</a:t>
-            </a:r>
-            <a:r>
-              <a:rPr lang="en-US" sz="900" baseline="30000">
-                <a:solidFill>
-                  <a:srgbClr val="000000"/>
-                </a:solidFill>
-              </a:rPr>
-              <a:t>®</a:t>
-            </a:r>
-            <a:r>
-              <a:rPr lang="en-US" sz="900">
-                <a:solidFill>
-                  <a:srgbClr val="000000"/>
-                </a:solidFill>
-              </a:rPr>
-              <a:t> (tezepelumab-ekko) prescribing information, Amgen. </a:t>
-            </a:r>
-            <a:r>
-              <a:rPr lang="en-US" sz="900" b="1">
-                <a:solidFill>
-                  <a:srgbClr val="000000"/>
-                </a:solidFill>
-              </a:rPr>
-              <a:t>26.</a:t>
-            </a:r>
-            <a:r>
-              <a:rPr lang="en-US" sz="900">
-                <a:solidFill>
-                  <a:srgbClr val="000000"/>
-                </a:solidFill>
-              </a:rPr>
-              <a:t> Parsabiv</a:t>
-            </a:r>
-            <a:r>
-              <a:rPr lang="en-US" sz="900" baseline="30000">
-                <a:solidFill>
-                  <a:srgbClr val="000000"/>
-                </a:solidFill>
-              </a:rPr>
-              <a:t>®</a:t>
-            </a:r>
-            <a:r>
-              <a:rPr lang="en-US" sz="900">
-                <a:solidFill>
-                  <a:srgbClr val="000000"/>
-                </a:solidFill>
-              </a:rPr>
-              <a:t> (etelcalcetide) prescribing information, Amgen. </a:t>
-            </a:r>
-            <a:r>
-              <a:rPr lang="en-US" sz="900" b="1">
-                <a:solidFill>
-                  <a:srgbClr val="000000"/>
-                </a:solidFill>
-              </a:rPr>
-              <a:t>27.</a:t>
-            </a:r>
-            <a:r>
-              <a:rPr lang="en-US" sz="900">
-                <a:solidFill>
-                  <a:srgbClr val="000000"/>
-                </a:solidFill>
-              </a:rPr>
-              <a:t> Sensipar</a:t>
-            </a:r>
-            <a:r>
-              <a:rPr lang="en-US" sz="900" baseline="30000">
-                <a:solidFill>
-                  <a:srgbClr val="000000"/>
-                </a:solidFill>
-              </a:rPr>
-              <a:t>®</a:t>
-            </a:r>
-            <a:r>
-              <a:rPr lang="en-US" sz="900">
-                <a:solidFill>
-                  <a:srgbClr val="000000"/>
-                </a:solidFill>
-              </a:rPr>
-              <a:t> (cinacalcet) prescribing information, Amgen. </a:t>
-            </a:r>
-            <a:r>
-              <a:rPr lang="en-US" sz="900" b="1">
-                <a:solidFill>
-                  <a:srgbClr val="000000"/>
-                </a:solidFill>
-              </a:rPr>
-              <a:t>28.</a:t>
-            </a:r>
-            <a:r>
-              <a:rPr lang="en-US" sz="900">
-                <a:solidFill>
-                  <a:srgbClr val="000000"/>
-                </a:solidFill>
-              </a:rPr>
-              <a:t> Aimovig</a:t>
-            </a:r>
-            <a:r>
-              <a:rPr lang="en-US" sz="900" baseline="30000">
-                <a:solidFill>
-                  <a:srgbClr val="000000"/>
-                </a:solidFill>
-              </a:rPr>
-              <a:t>®</a:t>
-            </a:r>
-            <a:r>
-              <a:rPr lang="en-US" sz="900">
-                <a:solidFill>
-                  <a:srgbClr val="000000"/>
-                </a:solidFill>
-              </a:rPr>
-              <a:t> (erenumab-aooe) prescribing information, Amgen.</a:t>
-            </a:r>
-            <a:endParaRPr lang="en-US" sz="900">
-              <a:solidFill>
-                <a:srgbClr val="FF0000"/>
-              </a:solidFill>
-            </a:endParaRPr>
-          </a:p>
-        </p:txBody>
-      </p:sp>
-      <p:sp>
-        <p:nvSpPr>
           <p:cNvPr id="34" name="Graphic 32">
             <a:extLst>
               <a:ext uri="{FF2B5EF4-FFF2-40B4-BE49-F238E27FC236}">
@@ -31006,7 +28759,7 @@
       <p:sp>
         <p:nvSpPr>
           <p:cNvPr id="23" name="Rectangle 22">
-            <a:hlinkClick r:id="rId6" action="ppaction://hlinksldjump"/>
+            <a:hlinkClick r:id="rId4" action="ppaction://hlinksldjump"/>
             <a:extLst>
               <a:ext uri="{FF2B5EF4-FFF2-40B4-BE49-F238E27FC236}">
                 <a16:creationId xmlns:a16="http://schemas.microsoft.com/office/drawing/2014/main" id="{9AF2598B-5A30-4182-BD72-0078CBA316D6}"/>
@@ -31205,260 +28958,6 @@
       </p:sp>
       <p:sp>
         <p:nvSpPr>
-          <p:cNvPr id="32" name="Rectangle 31">
-            <a:extLst>
-              <a:ext uri="{FF2B5EF4-FFF2-40B4-BE49-F238E27FC236}">
-                <a16:creationId xmlns:a16="http://schemas.microsoft.com/office/drawing/2014/main" id="{CDD6DA15-7E98-4C1F-9A33-BBD9A5CA2AE6}"/>
-              </a:ext>
-            </a:extLst>
-          </p:cNvPr>
-          <p:cNvSpPr/>
-          <p:nvPr/>
-        </p:nvSpPr>
-        <p:spPr>
-          <a:xfrm>
-            <a:off x="356616" y="6093672"/>
-            <a:ext cx="10515600" cy="526298"/>
-          </a:xfrm>
-          <a:prstGeom prst="rect">
-            <a:avLst/>
-          </a:prstGeom>
-        </p:spPr>
-        <p:txBody>
-          <a:bodyPr wrap="square" lIns="0" tIns="0" rIns="0" bIns="0" anchor="b">
-            <a:spAutoFit/>
-          </a:bodyPr>
-          <a:lstStyle/>
-          <a:p>
-            <a:pPr lvl="0">
-              <a:lnSpc>
-                <a:spcPct val="95000"/>
-              </a:lnSpc>
-            </a:pPr>
-            <a:r>
-              <a:rPr lang="en-US" sz="900" b="1">
-                <a:solidFill>
-                  <a:srgbClr val="000000"/>
-                </a:solidFill>
-              </a:rPr>
-              <a:t>References: 1. </a:t>
-            </a:r>
-            <a:r>
-              <a:rPr lang="en-US" sz="900">
-                <a:solidFill>
-                  <a:srgbClr val="000000"/>
-                </a:solidFill>
-              </a:rPr>
-              <a:t>Amgen pipeline. </a:t>
-            </a:r>
-            <a:r>
-              <a:rPr lang="en-US" sz="900">
-                <a:solidFill>
-                  <a:srgbClr val="000000"/>
-                </a:solidFill>
-                <a:hlinkClick r:id="rId4"/>
-              </a:rPr>
-              <a:t>https://www.amgenpipeline.com/-/media/themes/amgen/amgenpipeline-com/amgenpipeline-com/pdf/amgen-pipeline-chart.pdf</a:t>
-            </a:r>
-            <a:r>
-              <a:rPr lang="en-US" sz="900">
-                <a:solidFill>
-                  <a:srgbClr val="000000"/>
-                </a:solidFill>
-              </a:rPr>
-              <a:t>. Accessed January 16, 2023. </a:t>
-            </a:r>
-          </a:p>
-          <a:p>
-            <a:pPr lvl="0">
-              <a:lnSpc>
-                <a:spcPct val="95000"/>
-              </a:lnSpc>
-            </a:pPr>
-            <a:r>
-              <a:rPr lang="en-US" sz="900" b="1">
-                <a:solidFill>
-                  <a:srgbClr val="000000"/>
-                </a:solidFill>
-              </a:rPr>
-              <a:t>2.</a:t>
-            </a:r>
-            <a:r>
-              <a:rPr lang="en-US" sz="900">
-                <a:solidFill>
-                  <a:srgbClr val="000000"/>
-                </a:solidFill>
-              </a:rPr>
-              <a:t> ClinicalTrials.gov. </a:t>
-            </a:r>
-            <a:r>
-              <a:rPr lang="en-US" sz="900">
-                <a:solidFill>
-                  <a:srgbClr val="000000"/>
-                </a:solidFill>
-                <a:hlinkClick r:id="rId5"/>
-              </a:rPr>
-              <a:t>https://clinicaltrials.gov/ct2/show/NCT03701763</a:t>
-            </a:r>
-            <a:r>
-              <a:rPr lang="en-US" sz="900">
-                <a:solidFill>
-                  <a:srgbClr val="000000"/>
-                </a:solidFill>
-              </a:rPr>
-              <a:t>. Accessed January 16, 2023. </a:t>
-            </a:r>
-            <a:r>
-              <a:rPr lang="en-US" sz="900" b="1">
-                <a:solidFill>
-                  <a:srgbClr val="000000"/>
-                </a:solidFill>
-              </a:rPr>
-              <a:t>3.</a:t>
-            </a:r>
-            <a:r>
-              <a:rPr lang="en-US" sz="900">
-                <a:solidFill>
-                  <a:srgbClr val="000000"/>
-                </a:solidFill>
-              </a:rPr>
-              <a:t> ClinicalTrials.gov. </a:t>
-            </a:r>
-            <a:r>
-              <a:rPr lang="en-US" sz="900">
-                <a:solidFill>
-                  <a:srgbClr val="000000"/>
-                </a:solidFill>
-                <a:hlinkClick r:id="rId6"/>
-              </a:rPr>
-              <a:t>https://clinicaltrials.gov/ct2/show/NCT03777436</a:t>
-            </a:r>
-            <a:r>
-              <a:rPr lang="en-US" sz="900">
-                <a:solidFill>
-                  <a:srgbClr val="000000"/>
-                </a:solidFill>
-              </a:rPr>
-              <a:t>. Accessed January 16, 2023.</a:t>
-            </a:r>
-          </a:p>
-          <a:p>
-            <a:pPr lvl="0">
-              <a:lnSpc>
-                <a:spcPct val="95000"/>
-              </a:lnSpc>
-            </a:pPr>
-            <a:r>
-              <a:rPr lang="en-US" sz="900" b="1">
-                <a:solidFill>
-                  <a:srgbClr val="000000"/>
-                </a:solidFill>
-              </a:rPr>
-              <a:t>4.</a:t>
-            </a:r>
-            <a:r>
-              <a:rPr lang="en-US" sz="900">
-                <a:solidFill>
-                  <a:srgbClr val="000000"/>
-                </a:solidFill>
-              </a:rPr>
-              <a:t> ClinicalTrials.gov. </a:t>
-            </a:r>
-            <a:r>
-              <a:rPr lang="en-US" sz="900">
-                <a:solidFill>
-                  <a:srgbClr val="000000"/>
-                </a:solidFill>
-                <a:hlinkClick r:id="rId7"/>
-              </a:rPr>
-              <a:t>https://clinicaltrials.gov/ct2/show/NCT04851964</a:t>
-            </a:r>
-            <a:r>
-              <a:rPr lang="en-US" sz="900">
-                <a:solidFill>
-                  <a:srgbClr val="000000"/>
-                </a:solidFill>
-              </a:rPr>
-              <a:t>. Accessed January 16, 2023. </a:t>
-            </a:r>
-            <a:r>
-              <a:rPr lang="en-US" sz="900" b="1">
-                <a:solidFill>
-                  <a:srgbClr val="000000"/>
-                </a:solidFill>
-              </a:rPr>
-              <a:t>5.</a:t>
-            </a:r>
-            <a:r>
-              <a:rPr lang="en-US" sz="900">
-                <a:solidFill>
-                  <a:srgbClr val="000000"/>
-                </a:solidFill>
-              </a:rPr>
-              <a:t> ClinicalTrials.gov. </a:t>
-            </a:r>
-            <a:r>
-              <a:rPr lang="en-US" sz="900">
-                <a:solidFill>
-                  <a:srgbClr val="000000"/>
-                </a:solidFill>
-                <a:hlinkClick r:id="rId8"/>
-              </a:rPr>
-              <a:t>https://clinicaltrials.gov/ct2/show/NCT05398445</a:t>
-            </a:r>
-            <a:r>
-              <a:rPr lang="en-US" sz="900">
-                <a:solidFill>
-                  <a:srgbClr val="000000"/>
-                </a:solidFill>
-              </a:rPr>
-              <a:t>. Accessed January 16, 2023.</a:t>
-            </a:r>
-          </a:p>
-          <a:p>
-            <a:pPr lvl="0">
-              <a:lnSpc>
-                <a:spcPct val="95000"/>
-              </a:lnSpc>
-            </a:pPr>
-            <a:r>
-              <a:rPr lang="en-US" sz="900" b="1">
-                <a:solidFill>
-                  <a:srgbClr val="000000"/>
-                </a:solidFill>
-              </a:rPr>
-              <a:t>6.</a:t>
-            </a:r>
-            <a:r>
-              <a:rPr lang="en-US" sz="900">
-                <a:solidFill>
-                  <a:srgbClr val="000000"/>
-                </a:solidFill>
-              </a:rPr>
-              <a:t> Amgen News Release. </a:t>
-            </a:r>
-            <a:r>
-              <a:rPr lang="en-US" sz="900">
-                <a:solidFill>
-                  <a:srgbClr val="000000"/>
-                </a:solidFill>
-                <a:hlinkClick r:id="rId9"/>
-              </a:rPr>
-              <a:t>https://www.amgen.com/newsroom/press-releases/2021/12/fda-approves-tezspire-tezepelumabekko-in-the-us-for-severe-asthma</a:t>
-            </a:r>
-            <a:r>
-              <a:rPr lang="en-US" sz="900">
-                <a:solidFill>
-                  <a:srgbClr val="000000"/>
-                </a:solidFill>
-              </a:rPr>
-              <a:t>. Accessed January 16, 2023.</a:t>
-            </a:r>
-          </a:p>
-        </p:txBody>
-      </p:sp>
-      <p:sp>
-        <p:nvSpPr>
           <p:cNvPr id="33" name="Rectangle 32">
             <a:extLst>
               <a:ext uri="{FF2B5EF4-FFF2-40B4-BE49-F238E27FC236}">
@@ -33911,7 +31410,7 @@
             <p:nvPr/>
           </p:nvPicPr>
           <p:blipFill>
-            <a:blip r:embed="rId10"/>
+            <a:blip r:embed="rId4"/>
             <a:stretch>
               <a:fillRect/>
             </a:stretch>
@@ -34039,7 +31538,7 @@
             <p:nvPr/>
           </p:nvPicPr>
           <p:blipFill>
-            <a:blip r:embed="rId11"/>
+            <a:blip r:embed="rId5"/>
             <a:stretch>
               <a:fillRect/>
             </a:stretch>
@@ -34717,7 +32216,7 @@
       <p:sp>
         <p:nvSpPr>
           <p:cNvPr id="10" name="Rectangle 9">
-            <a:hlinkClick r:id="rId12" action="ppaction://hlinksldjump"/>
+            <a:hlinkClick r:id="rId6" action="ppaction://hlinksldjump"/>
             <a:extLst>
               <a:ext uri="{FF2B5EF4-FFF2-40B4-BE49-F238E27FC236}">
                 <a16:creationId xmlns:a16="http://schemas.microsoft.com/office/drawing/2014/main" id="{4611A018-39E7-CA5D-6811-CC540294FAEA}"/>
@@ -34950,288 +32449,6 @@
       </p:sp>
       <p:sp>
         <p:nvSpPr>
-          <p:cNvPr id="32" name="Rectangle 31">
-            <a:extLst>
-              <a:ext uri="{FF2B5EF4-FFF2-40B4-BE49-F238E27FC236}">
-                <a16:creationId xmlns:a16="http://schemas.microsoft.com/office/drawing/2014/main" id="{CDD6DA15-7E98-4C1F-9A33-BBD9A5CA2AE6}"/>
-              </a:ext>
-            </a:extLst>
-          </p:cNvPr>
-          <p:cNvSpPr/>
-          <p:nvPr/>
-        </p:nvSpPr>
-        <p:spPr>
-          <a:xfrm>
-            <a:off x="356615" y="5841405"/>
-            <a:ext cx="9581712" cy="789447"/>
-          </a:xfrm>
-          <a:prstGeom prst="rect">
-            <a:avLst/>
-          </a:prstGeom>
-        </p:spPr>
-        <p:txBody>
-          <a:bodyPr wrap="square" lIns="0" tIns="0" rIns="0" bIns="0" anchor="b">
-            <a:spAutoFit/>
-          </a:bodyPr>
-          <a:lstStyle/>
-          <a:p>
-            <a:pPr>
-              <a:lnSpc>
-                <a:spcPct val="95000"/>
-              </a:lnSpc>
-            </a:pPr>
-            <a:r>
-              <a:rPr lang="en-US" sz="900" b="1">
-                <a:solidFill>
-                  <a:srgbClr val="000000"/>
-                </a:solidFill>
-              </a:rPr>
-              <a:t>References: 1. </a:t>
-            </a:r>
-            <a:r>
-              <a:rPr lang="en-US" sz="900">
-                <a:solidFill>
-                  <a:srgbClr val="000000"/>
-                </a:solidFill>
-              </a:rPr>
-              <a:t>Amgen pipeline. </a:t>
-            </a:r>
-            <a:r>
-              <a:rPr lang="en-US" sz="900">
-                <a:solidFill>
-                  <a:srgbClr val="000000"/>
-                </a:solidFill>
-                <a:hlinkClick r:id="rId4"/>
-              </a:rPr>
-              <a:t>https://www.amgenpipeline.com/-/media/themes/amgen/amgenpipeline-com/amgenpipeline-com/pdf/amgen-pipeline-chart.pdf</a:t>
-            </a:r>
-            <a:r>
-              <a:rPr lang="en-US" sz="900">
-                <a:solidFill>
-                  <a:srgbClr val="000000"/>
-                </a:solidFill>
-              </a:rPr>
-              <a:t>. Accessed January 16, 2023.  </a:t>
-            </a:r>
-            <a:r>
-              <a:rPr lang="en-US" sz="900" b="1">
-                <a:solidFill>
-                  <a:srgbClr val="000000"/>
-                </a:solidFill>
-              </a:rPr>
-              <a:t>2.</a:t>
-            </a:r>
-            <a:r>
-              <a:rPr lang="en-US" sz="900">
-                <a:solidFill>
-                  <a:srgbClr val="000000"/>
-                </a:solidFill>
-              </a:rPr>
-              <a:t> Amgen News Release. </a:t>
-            </a:r>
-            <a:r>
-              <a:rPr lang="en-US" sz="900">
-                <a:solidFill>
-                  <a:srgbClr val="000000"/>
-                </a:solidFill>
-                <a:hlinkClick r:id="rId5"/>
-              </a:rPr>
-              <a:t>https://www.prnewswire.com/news-releases/amgen-and-abbvie-agree-to-settlement-allowing-commercialization-of-amgevita-300527303.html</a:t>
-            </a:r>
-            <a:r>
-              <a:rPr lang="en-US" sz="900">
-                <a:solidFill>
-                  <a:srgbClr val="000000"/>
-                </a:solidFill>
-              </a:rPr>
-              <a:t>. Accessed January 16, 2023. </a:t>
-            </a:r>
-            <a:r>
-              <a:rPr lang="en-US" sz="900" b="1">
-                <a:solidFill>
-                  <a:srgbClr val="000000"/>
-                </a:solidFill>
-              </a:rPr>
-              <a:t>3.</a:t>
-            </a:r>
-            <a:r>
-              <a:rPr lang="en-US" sz="900">
-                <a:solidFill>
-                  <a:srgbClr val="000000"/>
-                </a:solidFill>
-              </a:rPr>
-              <a:t> Amjevita™ (adalimumab-atto) prescribing information, Amgen. </a:t>
-            </a:r>
-            <a:r>
-              <a:rPr lang="en-US" sz="900" b="1">
-                <a:solidFill>
-                  <a:srgbClr val="000000"/>
-                </a:solidFill>
-              </a:rPr>
-              <a:t>4.</a:t>
-            </a:r>
-            <a:r>
-              <a:rPr lang="en-US" sz="900">
-                <a:solidFill>
-                  <a:srgbClr val="000000"/>
-                </a:solidFill>
-              </a:rPr>
-              <a:t> ClinicalTrials.gov. </a:t>
-            </a:r>
-            <a:r>
-              <a:rPr lang="en-US" sz="900">
-                <a:solidFill>
-                  <a:srgbClr val="000000"/>
-                </a:solidFill>
-                <a:hlinkClick r:id="rId6"/>
-              </a:rPr>
-              <a:t>https://clinicaltrials.gov/ct2/show/NCT05073315</a:t>
-            </a:r>
-            <a:r>
-              <a:rPr lang="en-US" sz="900">
-                <a:solidFill>
-                  <a:srgbClr val="000000"/>
-                </a:solidFill>
-              </a:rPr>
-              <a:t>. Accessed January 16, 2023. </a:t>
-            </a:r>
-            <a:r>
-              <a:rPr lang="en-US" sz="900" b="1">
-                <a:solidFill>
-                  <a:srgbClr val="000000"/>
-                </a:solidFill>
-              </a:rPr>
-              <a:t>5.</a:t>
-            </a:r>
-            <a:r>
-              <a:rPr lang="en-US" sz="900">
-                <a:solidFill>
-                  <a:srgbClr val="000000"/>
-                </a:solidFill>
-              </a:rPr>
-              <a:t> ClinicalTrials.gov. </a:t>
-            </a:r>
-            <a:r>
-              <a:rPr lang="en-US" sz="900">
-                <a:solidFill>
-                  <a:srgbClr val="000000"/>
-                </a:solidFill>
-                <a:hlinkClick r:id="rId7"/>
-              </a:rPr>
-              <a:t>https://clinicaltrials.gov/ct2/show/NCT04607980</a:t>
-            </a:r>
-            <a:r>
-              <a:rPr lang="en-US" sz="900">
-                <a:solidFill>
-                  <a:srgbClr val="000000"/>
-                </a:solidFill>
-              </a:rPr>
-              <a:t>. Accessed January 16, 2023. </a:t>
-            </a:r>
-            <a:r>
-              <a:rPr lang="en-US" sz="900" b="1">
-                <a:solidFill>
-                  <a:srgbClr val="000000"/>
-                </a:solidFill>
-              </a:rPr>
-              <a:t>6.</a:t>
-            </a:r>
-            <a:r>
-              <a:rPr lang="en-US" sz="900">
-                <a:solidFill>
-                  <a:srgbClr val="000000"/>
-                </a:solidFill>
-              </a:rPr>
-              <a:t> ClinicalTrials.gov. </a:t>
-            </a:r>
-            <a:r>
-              <a:rPr lang="en-US" sz="900">
-                <a:solidFill>
-                  <a:srgbClr val="000000"/>
-                </a:solidFill>
-                <a:hlinkClick r:id="rId8"/>
-              </a:rPr>
-              <a:t>https://clinicaltrials.gov/ct2/show/NCT04761627</a:t>
-            </a:r>
-            <a:r>
-              <a:rPr lang="en-US" sz="900">
-                <a:solidFill>
-                  <a:srgbClr val="000000"/>
-                </a:solidFill>
-              </a:rPr>
-              <a:t>. Accessed January 16, 2023. </a:t>
-            </a:r>
-            <a:r>
-              <a:rPr lang="en-US" sz="900" b="1">
-                <a:solidFill>
-                  <a:srgbClr val="000000"/>
-                </a:solidFill>
-              </a:rPr>
-              <a:t>7. </a:t>
-            </a:r>
-            <a:r>
-              <a:rPr lang="en-US" sz="900">
-                <a:solidFill>
-                  <a:srgbClr val="000000"/>
-                </a:solidFill>
-              </a:rPr>
-              <a:t>ClinicalTrials.gov. </a:t>
-            </a:r>
-            <a:r>
-              <a:rPr lang="en-US" sz="900">
-                <a:solidFill>
-                  <a:srgbClr val="000000"/>
-                </a:solidFill>
-                <a:hlinkClick r:id="rId9"/>
-              </a:rPr>
-              <a:t>https://clinicaltrials.gov/ct2/show/NCT03818607</a:t>
-            </a:r>
-            <a:r>
-              <a:rPr lang="en-US" sz="900">
-                <a:solidFill>
-                  <a:srgbClr val="000000"/>
-                </a:solidFill>
-              </a:rPr>
-              <a:t>. Accessed January 16, 2023. </a:t>
-            </a:r>
-            <a:r>
-              <a:rPr lang="en-US" sz="900" b="1">
-                <a:solidFill>
-                  <a:srgbClr val="000000"/>
-                </a:solidFill>
-              </a:rPr>
-              <a:t>8.</a:t>
-            </a:r>
-            <a:r>
-              <a:rPr lang="en-US" sz="900">
-                <a:solidFill>
-                  <a:srgbClr val="000000"/>
-                </a:solidFill>
-              </a:rPr>
-              <a:t> ClinicalTrials.gov. https:// </a:t>
-            </a:r>
-            <a:r>
-              <a:rPr lang="en-US" sz="900">
-                <a:solidFill>
-                  <a:srgbClr val="000000"/>
-                </a:solidFill>
-                <a:hlinkClick r:id="rId10"/>
-              </a:rPr>
-              <a:t>https://clinicaltrials.gov/ct2/show/NCT04270747</a:t>
-            </a:r>
-            <a:r>
-              <a:rPr lang="en-US" sz="900">
-                <a:solidFill>
-                  <a:srgbClr val="000000"/>
-                </a:solidFill>
-              </a:rPr>
-              <a:t>. Accessed January 16, 2023. </a:t>
-            </a:r>
-          </a:p>
-        </p:txBody>
-      </p:sp>
-      <p:sp>
-        <p:nvSpPr>
           <p:cNvPr id="33" name="Rectangle 32">
             <a:extLst>
               <a:ext uri="{FF2B5EF4-FFF2-40B4-BE49-F238E27FC236}">
@@ -38267,7 +35484,7 @@
             <p:nvPr/>
           </p:nvPicPr>
           <p:blipFill>
-            <a:blip r:embed="rId11"/>
+            <a:blip r:embed="rId4"/>
             <a:stretch>
               <a:fillRect/>
             </a:stretch>
@@ -38881,7 +36098,7 @@
       <p:sp>
         <p:nvSpPr>
           <p:cNvPr id="10" name="Rectangle 9">
-            <a:hlinkClick r:id="rId12" action="ppaction://hlinksldjump"/>
+            <a:hlinkClick r:id="rId5" action="ppaction://hlinksldjump"/>
             <a:extLst>
               <a:ext uri="{FF2B5EF4-FFF2-40B4-BE49-F238E27FC236}">
                 <a16:creationId xmlns:a16="http://schemas.microsoft.com/office/drawing/2014/main" id="{4611A018-39E7-CA5D-6811-CC540294FAEA}"/>
@@ -39130,7 +36347,7 @@
             <p:nvPr/>
           </p:nvPicPr>
           <p:blipFill>
-            <a:blip r:embed="rId13"/>
+            <a:blip r:embed="rId6"/>
             <a:stretch>
               <a:fillRect/>
             </a:stretch>
@@ -42641,302 +39858,6 @@
           </a:graphicData>
         </a:graphic>
       </p:graphicFrame>
-      <p:sp>
-        <p:nvSpPr>
-          <p:cNvPr id="25" name="Rectangle 24">
-            <a:extLst>
-              <a:ext uri="{FF2B5EF4-FFF2-40B4-BE49-F238E27FC236}">
-                <a16:creationId xmlns:a16="http://schemas.microsoft.com/office/drawing/2014/main" id="{0B5D4812-E60E-471A-9571-8C3F41C09EAC}"/>
-              </a:ext>
-            </a:extLst>
-          </p:cNvPr>
-          <p:cNvSpPr/>
-          <p:nvPr/>
-        </p:nvSpPr>
-        <p:spPr>
-          <a:xfrm>
-            <a:off x="356615" y="6005965"/>
-            <a:ext cx="10515600" cy="615553"/>
-          </a:xfrm>
-          <a:prstGeom prst="rect">
-            <a:avLst/>
-          </a:prstGeom>
-        </p:spPr>
-        <p:txBody>
-          <a:bodyPr wrap="square" lIns="0" tIns="0" rIns="0" bIns="0" anchor="b">
-            <a:spAutoFit/>
-          </a:bodyPr>
-          <a:lstStyle/>
-          <a:p>
-            <a:pPr marL="0" marR="0">
-              <a:spcBef>
-                <a:spcPct val="0"/>
-              </a:spcBef>
-              <a:spcAft>
-                <a:spcPct val="0"/>
-              </a:spcAft>
-            </a:pPr>
-            <a:r>
-              <a:rPr lang="en-US" sz="800" b="1">
-                <a:effectLst/>
-                <a:ea typeface="Calibri" panose="020f0502020204030204" pitchFamily="34" charset="0"/>
-                <a:cs typeface="Times New Roman" panose="02020603050405020304" pitchFamily="18" charset="0"/>
-              </a:rPr>
-              <a:t>References: 1. </a:t>
-            </a:r>
-            <a:r>
-              <a:rPr lang="en-US" sz="800">
-                <a:effectLst/>
-                <a:ea typeface="Calibri" panose="020f0502020204030204" pitchFamily="34" charset="0"/>
-                <a:cs typeface="Times New Roman" panose="02020603050405020304" pitchFamily="18" charset="0"/>
-              </a:rPr>
-              <a:t>Amgen pipeline. </a:t>
-            </a:r>
-            <a:r>
-              <a:rPr lang="en-US" sz="800" u="sng">
-                <a:solidFill>
-                  <a:srgbClr val="0563C1"/>
-                </a:solidFill>
-                <a:effectLst/>
-                <a:ea typeface="Calibri" panose="020f0502020204030204" pitchFamily="34" charset="0"/>
-                <a:cs typeface="Times New Roman" panose="02020603050405020304" pitchFamily="18" charset="0"/>
-                <a:hlinkClick r:id="rId4"/>
-              </a:rPr>
-              <a:t>https://www.amgenpipeline.com/-/media/themes/amgen/amgenpipeline-com/amgenpipeline-com/pdf/amgen-pipeline-chart.pdf</a:t>
-            </a:r>
-            <a:r>
-              <a:rPr lang="en-US" sz="800">
-                <a:effectLst/>
-                <a:ea typeface="Calibri" panose="020f0502020204030204" pitchFamily="34" charset="0"/>
-                <a:cs typeface="Times New Roman" panose="02020603050405020304" pitchFamily="18" charset="0"/>
-              </a:rPr>
-              <a:t>. Accessed January 16, 2023. </a:t>
-            </a:r>
-            <a:r>
-              <a:rPr lang="en-US" sz="800" b="1">
-                <a:effectLst/>
-                <a:ea typeface="Calibri" panose="020f0502020204030204" pitchFamily="34" charset="0"/>
-                <a:cs typeface="Times New Roman" panose="02020603050405020304" pitchFamily="18" charset="0"/>
-              </a:rPr>
-              <a:t>2.</a:t>
-            </a:r>
-            <a:r>
-              <a:rPr lang="en-US" sz="800">
-                <a:effectLst/>
-                <a:ea typeface="Calibri" panose="020f0502020204030204" pitchFamily="34" charset="0"/>
-                <a:cs typeface="Times New Roman" panose="02020603050405020304" pitchFamily="18" charset="0"/>
-              </a:rPr>
-              <a:t> </a:t>
-            </a:r>
-            <a:r>
-              <a:rPr lang="en-US" sz="800">
-                <a:solidFill>
-                  <a:srgbClr val="000000"/>
-                </a:solidFill>
-              </a:rPr>
-              <a:t>ClinicalTrials.gov. </a:t>
-            </a:r>
-            <a:r>
-              <a:rPr lang="en-GB" sz="800">
-                <a:hlinkClick r:id="rId5"/>
-              </a:rPr>
-              <a:t>https://clinicaltrials.gov/ct2/show/NCT04303780</a:t>
-            </a:r>
-            <a:r>
-              <a:rPr lang="en-GB" sz="800"/>
-              <a:t>. </a:t>
-            </a:r>
-            <a:r>
-              <a:rPr lang="en-US" sz="800">
-                <a:solidFill>
-                  <a:srgbClr val="000000"/>
-                </a:solidFill>
-              </a:rPr>
-              <a:t>Accessed January 16, 2023. </a:t>
-            </a:r>
-            <a:r>
-              <a:rPr lang="en-US" sz="800" b="1">
-                <a:solidFill>
-                  <a:srgbClr val="000000"/>
-                </a:solidFill>
-              </a:rPr>
-              <a:t>3. </a:t>
-            </a:r>
-            <a:r>
-              <a:rPr lang="en-US" sz="800">
-                <a:solidFill>
-                  <a:srgbClr val="000000"/>
-                </a:solidFill>
-              </a:rPr>
-              <a:t>ClinicalTrials.gov. </a:t>
-            </a:r>
-            <a:r>
-              <a:rPr lang="en-GB" sz="800">
-                <a:hlinkClick r:id="rId6"/>
-              </a:rPr>
-              <a:t>https://www.clinicaltrials.gov/ct2/show/NCT04185883</a:t>
-            </a:r>
-            <a:r>
-              <a:rPr lang="en-GB" sz="800"/>
-              <a:t>. </a:t>
-            </a:r>
-            <a:r>
-              <a:rPr lang="en-US" sz="800">
-                <a:solidFill>
-                  <a:srgbClr val="000000"/>
-                </a:solidFill>
-              </a:rPr>
-              <a:t>Accessed January 16, 2023. </a:t>
-            </a:r>
-            <a:r>
-              <a:rPr lang="en-US" sz="800" b="1">
-                <a:solidFill>
-                  <a:srgbClr val="000000"/>
-                </a:solidFill>
-              </a:rPr>
-              <a:t>4. </a:t>
-            </a:r>
-            <a:r>
-              <a:rPr lang="en-US" sz="800">
-                <a:effectLst/>
-                <a:ea typeface="Calibri" panose="020f0502020204030204" pitchFamily="34" charset="0"/>
-                <a:cs typeface="Times New Roman" panose="02020603050405020304" pitchFamily="18" charset="0"/>
-              </a:rPr>
-              <a:t>Amgen Press Release. </a:t>
-            </a:r>
-            <a:r>
-              <a:rPr lang="en-US" sz="800">
-                <a:effectLst/>
-                <a:ea typeface="Calibri" panose="020f0502020204030204" pitchFamily="34" charset="0"/>
-                <a:cs typeface="Times New Roman" panose="02020603050405020304" pitchFamily="18" charset="0"/>
-                <a:hlinkClick r:id="rId7"/>
-              </a:rPr>
-              <a:t>https://www.amgen.com/newsroom/press-releases/2021/09/lumakras-sotorasib-combined-with-vectibix-panitumumab-showed-encouraging-efficacy-and-safety-in-patients-with-kras-g12cmutated-colorectal-cancer</a:t>
-            </a:r>
-            <a:r>
-              <a:rPr lang="en-US" sz="800">
-                <a:effectLst/>
-                <a:ea typeface="Calibri" panose="020f0502020204030204" pitchFamily="34" charset="0"/>
-                <a:cs typeface="Times New Roman" panose="02020603050405020304" pitchFamily="18" charset="0"/>
-              </a:rPr>
-              <a:t>. Accessed January 16, 2023. </a:t>
-            </a:r>
-            <a:r>
-              <a:rPr lang="en-US" sz="800" b="1">
-                <a:ea typeface="Calibri" panose="020f0502020204030204" pitchFamily="34" charset="0"/>
-                <a:cs typeface="Times New Roman" panose="02020603050405020304" pitchFamily="18" charset="0"/>
-              </a:rPr>
-              <a:t>5.</a:t>
-            </a:r>
-            <a:r>
-              <a:rPr lang="en-US" sz="800">
-                <a:effectLst/>
-                <a:ea typeface="Calibri" panose="020f0502020204030204" pitchFamily="34" charset="0"/>
-                <a:cs typeface="Times New Roman" panose="02020603050405020304" pitchFamily="18" charset="0"/>
-              </a:rPr>
-              <a:t> ClinicalTrials.gov. </a:t>
-            </a:r>
-            <a:r>
-              <a:rPr lang="en-US" sz="800" u="sng">
-                <a:solidFill>
-                  <a:srgbClr val="0563C1"/>
-                </a:solidFill>
-                <a:effectLst/>
-                <a:ea typeface="Calibri" panose="020f0502020204030204" pitchFamily="34" charset="0"/>
-                <a:cs typeface="Times New Roman" panose="02020603050405020304" pitchFamily="18" charset="0"/>
-                <a:hlinkClick r:id="rId8"/>
-              </a:rPr>
-              <a:t>https://clinicaltrials.gov/ct2/show/NCT05198934</a:t>
-            </a:r>
-            <a:r>
-              <a:rPr lang="en-US" sz="800">
-                <a:effectLst/>
-                <a:ea typeface="Calibri" panose="020f0502020204030204" pitchFamily="34" charset="0"/>
-                <a:cs typeface="Times New Roman" panose="02020603050405020304" pitchFamily="18" charset="0"/>
-              </a:rPr>
-              <a:t>. Accessed January 16, 2023. </a:t>
-            </a:r>
-            <a:r>
-              <a:rPr lang="en-US" sz="800" b="1">
-                <a:effectLst/>
-                <a:ea typeface="Calibri" panose="020f0502020204030204" pitchFamily="34" charset="0"/>
-                <a:cs typeface="Times New Roman" panose="02020603050405020304" pitchFamily="18" charset="0"/>
-              </a:rPr>
-              <a:t>6. </a:t>
-            </a:r>
-            <a:r>
-              <a:rPr lang="en-US" sz="800">
-                <a:solidFill>
-                  <a:srgbClr val="000000"/>
-                </a:solidFill>
-              </a:rPr>
-              <a:t>US FDA. </a:t>
-            </a:r>
-            <a:r>
-              <a:rPr lang="en-US" sz="800">
-                <a:solidFill>
-                  <a:srgbClr val="000000"/>
-                </a:solidFill>
-                <a:hlinkClick r:id="rId9"/>
-              </a:rPr>
-              <a:t>https://www.fda.gov/drugs/resources-information-approved-drugs/fda-grants-accelerated-approval-sotorasib-kras-g12c-mutated-nsclc</a:t>
-            </a:r>
-            <a:r>
-              <a:rPr lang="en-US" sz="800">
-                <a:solidFill>
-                  <a:srgbClr val="000000"/>
-                </a:solidFill>
-              </a:rPr>
-              <a:t>. Accessed January 16, 2023. </a:t>
-            </a:r>
-            <a:r>
-              <a:rPr lang="en-US" sz="800" b="1">
-                <a:solidFill>
-                  <a:srgbClr val="000000"/>
-                </a:solidFill>
-              </a:rPr>
-              <a:t>7. </a:t>
-            </a:r>
-            <a:r>
-              <a:rPr lang="en-US" sz="800">
-                <a:solidFill>
-                  <a:srgbClr val="000000"/>
-                </a:solidFill>
-              </a:rPr>
-              <a:t>Zhang SS, et al. </a:t>
-            </a:r>
-            <a:r>
-              <a:rPr lang="en-US" sz="800" i="1">
-                <a:solidFill>
-                  <a:srgbClr val="000000"/>
-                </a:solidFill>
-              </a:rPr>
-              <a:t>Lung Cancer (Auckl). </a:t>
-            </a:r>
-            <a:r>
-              <a:rPr lang="en-US" sz="800">
-                <a:solidFill>
-                  <a:srgbClr val="000000"/>
-                </a:solidFill>
-              </a:rPr>
-              <a:t>2021;12:115-122.</a:t>
-            </a:r>
-            <a:r>
-              <a:rPr lang="en-US" sz="800" b="1">
-                <a:solidFill>
-                  <a:srgbClr val="000000"/>
-                </a:solidFill>
-              </a:rPr>
-              <a:t> </a:t>
-            </a:r>
-            <a:endParaRPr lang="en-US" sz="800">
-              <a:effectLst/>
-              <a:ea typeface="Calibri" panose="020f0502020204030204" pitchFamily="34" charset="0"/>
-              <a:cs typeface="Times New Roman" panose="02020603050405020304" pitchFamily="18" charset="0"/>
-            </a:endParaRPr>
-          </a:p>
-        </p:txBody>
-      </p:sp>
       <p:sp>
         <p:nvSpPr>
           <p:cNvPr id="26" name="Rectangle 25">
@@ -43394,7 +40315,7 @@
             <p:nvPr/>
           </p:nvPicPr>
           <p:blipFill>
-            <a:blip r:embed="rId10"/>
+            <a:blip r:embed="rId4"/>
             <a:stretch>
               <a:fillRect/>
             </a:stretch>
@@ -43522,7 +40443,7 @@
             <p:nvPr/>
           </p:nvPicPr>
           <p:blipFill>
-            <a:blip r:embed="rId10"/>
+            <a:blip r:embed="rId4"/>
             <a:stretch>
               <a:fillRect/>
             </a:stretch>
@@ -43552,7 +40473,7 @@
             <p:nvPr/>
           </p:nvPicPr>
           <p:blipFill>
-            <a:blip r:embed="rId11"/>
+            <a:blip r:embed="rId5"/>
             <a:stretch>
               <a:fillRect/>
             </a:stretch>
@@ -44247,7 +41168,7 @@
       <p:sp>
         <p:nvSpPr>
           <p:cNvPr id="13" name="Rectangle 12">
-            <a:hlinkClick r:id="rId12" action="ppaction://hlinksldjump"/>
+            <a:hlinkClick r:id="rId6" action="ppaction://hlinksldjump"/>
             <a:extLst>
               <a:ext uri="{FF2B5EF4-FFF2-40B4-BE49-F238E27FC236}">
                 <a16:creationId xmlns:a16="http://schemas.microsoft.com/office/drawing/2014/main" id="{D5A8B470-B891-15F7-E765-D1AA73A6307D}"/>
@@ -44445,354 +41366,6 @@
           <a:ext cx="0" cy="0"/>
         </a:xfrm>
       </p:grpSpPr>
-      <p:sp>
-        <p:nvSpPr>
-          <p:cNvPr id="24" name="Rectangle 23">
-            <a:extLst>
-              <a:ext uri="{FF2B5EF4-FFF2-40B4-BE49-F238E27FC236}">
-                <a16:creationId xmlns:a16="http://schemas.microsoft.com/office/drawing/2014/main" id="{0FA2F8FE-3443-44C1-8FCE-B926CD284A3D}"/>
-              </a:ext>
-            </a:extLst>
-          </p:cNvPr>
-          <p:cNvSpPr/>
-          <p:nvPr/>
-        </p:nvSpPr>
-        <p:spPr>
-          <a:xfrm>
-            <a:off x="356616" y="5916168"/>
-            <a:ext cx="10292911" cy="701731"/>
-          </a:xfrm>
-          <a:prstGeom prst="rect">
-            <a:avLst/>
-          </a:prstGeom>
-        </p:spPr>
-        <p:txBody>
-          <a:bodyPr wrap="square" lIns="0" tIns="0" rIns="0" bIns="0" anchor="b">
-            <a:spAutoFit/>
-          </a:bodyPr>
-          <a:lstStyle/>
-          <a:p>
-            <a:pPr>
-              <a:lnSpc>
-                <a:spcPct val="95000"/>
-              </a:lnSpc>
-            </a:pPr>
-            <a:r>
-              <a:rPr lang="en-US" sz="800" b="1">
-                <a:solidFill>
-                  <a:srgbClr val="000000"/>
-                </a:solidFill>
-              </a:rPr>
-              <a:t>References: 1. </a:t>
-            </a:r>
-            <a:r>
-              <a:rPr lang="en-US" sz="800">
-                <a:solidFill>
-                  <a:srgbClr val="000000"/>
-                </a:solidFill>
-              </a:rPr>
-              <a:t>Amgen pipeline. </a:t>
-            </a:r>
-            <a:r>
-              <a:rPr lang="en-US" sz="800">
-                <a:solidFill>
-                  <a:srgbClr val="000000"/>
-                </a:solidFill>
-                <a:hlinkClick r:id="rId4"/>
-              </a:rPr>
-              <a:t>https://www.amgenpipeline.com/-/media/themes/amgen/amgenpipeline-com/amgenpipeline-com/pdf/amgen-pipeline-chart.pdf</a:t>
-            </a:r>
-            <a:r>
-              <a:rPr lang="en-US" sz="800">
-                <a:solidFill>
-                  <a:srgbClr val="000000"/>
-                </a:solidFill>
-              </a:rPr>
-              <a:t>. Accessed January 16, 2023. </a:t>
-            </a:r>
-            <a:r>
-              <a:rPr lang="en-US" sz="800" b="1">
-                <a:solidFill>
-                  <a:srgbClr val="000000"/>
-                </a:solidFill>
-              </a:rPr>
-              <a:t>2. </a:t>
-            </a:r>
-            <a:r>
-              <a:rPr lang="en-US" sz="800">
-                <a:solidFill>
-                  <a:srgbClr val="000000"/>
-                </a:solidFill>
-              </a:rPr>
-              <a:t>ClinicalTrials.gov. </a:t>
-            </a:r>
-            <a:r>
-              <a:rPr lang="en-US" sz="800">
-                <a:solidFill>
-                  <a:srgbClr val="000000"/>
-                </a:solidFill>
-                <a:hlinkClick r:id="rId5"/>
-              </a:rPr>
-              <a:t>https://clinicaltrials.gov/ct2/show/NCT05052801</a:t>
-            </a:r>
-            <a:r>
-              <a:rPr lang="en-US" sz="800">
-                <a:solidFill>
-                  <a:srgbClr val="000000"/>
-                </a:solidFill>
-              </a:rPr>
-              <a:t>. Accessed January 16, 2023. </a:t>
-            </a:r>
-            <a:r>
-              <a:rPr lang="en-US" sz="800" b="1">
-                <a:solidFill>
-                  <a:srgbClr val="000000"/>
-                </a:solidFill>
-              </a:rPr>
-              <a:t>3. </a:t>
-            </a:r>
-            <a:r>
-              <a:rPr lang="en-US" sz="800">
-                <a:solidFill>
-                  <a:srgbClr val="000000"/>
-                </a:solidFill>
-              </a:rPr>
-              <a:t>ClinicalTrials.gov. </a:t>
-            </a:r>
-            <a:r>
-              <a:rPr lang="en-US" sz="800">
-                <a:solidFill>
-                  <a:srgbClr val="000000"/>
-                </a:solidFill>
-                <a:hlinkClick r:id="rId6"/>
-              </a:rPr>
-              <a:t>https://clinicaltrials.gov/ct2/show/NCT03362177</a:t>
-            </a:r>
-            <a:r>
-              <a:rPr lang="en-US" sz="800">
-                <a:solidFill>
-                  <a:srgbClr val="000000"/>
-                </a:solidFill>
-              </a:rPr>
-              <a:t>. Accessed January 16, 2023. </a:t>
-            </a:r>
-            <a:r>
-              <a:rPr lang="en-US" sz="800" b="1">
-                <a:solidFill>
-                  <a:srgbClr val="000000"/>
-                </a:solidFill>
-              </a:rPr>
-              <a:t>4. </a:t>
-            </a:r>
-            <a:r>
-              <a:rPr lang="en-US" sz="800">
-                <a:solidFill>
-                  <a:srgbClr val="000000"/>
-                </a:solidFill>
-              </a:rPr>
-              <a:t>ClinicalTrials.gov. </a:t>
-            </a:r>
-            <a:r>
-              <a:rPr lang="en-US" sz="800">
-                <a:solidFill>
-                  <a:srgbClr val="000000"/>
-                </a:solidFill>
-                <a:hlinkClick r:id="rId7"/>
-              </a:rPr>
-              <a:t>https://clinicaltrials.gov/ct2/show/NCT03937154</a:t>
-            </a:r>
-            <a:r>
-              <a:rPr lang="en-US" sz="800">
-                <a:solidFill>
-                  <a:srgbClr val="000000"/>
-                </a:solidFill>
-              </a:rPr>
-              <a:t>. Accessed January 16, 2023. </a:t>
-            </a:r>
-            <a:r>
-              <a:rPr lang="en-US" sz="800" b="1">
-                <a:solidFill>
-                  <a:srgbClr val="000000"/>
-                </a:solidFill>
-              </a:rPr>
-              <a:t>5. </a:t>
-            </a:r>
-            <a:r>
-              <a:rPr lang="en-US" sz="800">
-                <a:solidFill>
-                  <a:srgbClr val="000000"/>
-                </a:solidFill>
-              </a:rPr>
-              <a:t>ClinicalTrials.gov. </a:t>
-            </a:r>
-            <a:r>
-              <a:rPr lang="en-US" sz="800">
-                <a:solidFill>
-                  <a:srgbClr val="000000"/>
-                </a:solidFill>
-                <a:hlinkClick r:id="rId8"/>
-              </a:rPr>
-              <a:t>https://clinicaltrials.gov/ct2/show/NCT05060016</a:t>
-            </a:r>
-            <a:r>
-              <a:rPr lang="en-US" sz="800">
-                <a:solidFill>
-                  <a:srgbClr val="000000"/>
-                </a:solidFill>
-              </a:rPr>
-              <a:t>. Accessed January 16, 2023. </a:t>
-            </a:r>
-            <a:r>
-              <a:rPr lang="en-US" sz="800" b="1">
-                <a:solidFill>
-                  <a:srgbClr val="000000"/>
-                </a:solidFill>
-              </a:rPr>
-              <a:t>6</a:t>
-            </a:r>
-            <a:r>
-              <a:rPr kumimoji="0" lang="en-GB" altLang="en-US" sz="800" b="1" i="0" u="none" strike="noStrike" kern="1200" cap="none" spc="0" normalizeH="0" baseline="0" noProof="0">
-                <a:ln>
-                  <a:noFill/>
-                </a:ln>
-                <a:effectLst/>
-                <a:uLnTx/>
-                <a:uFillTx/>
-              </a:rPr>
-              <a:t>. </a:t>
-            </a:r>
-            <a:r>
-              <a:rPr kumimoji="0" lang="en-GB" altLang="en-US" sz="800" b="0" i="0" u="none" strike="noStrike" kern="1200" cap="none" spc="0" normalizeH="0" baseline="0" noProof="0">
-                <a:ln>
-                  <a:noFill/>
-                </a:ln>
-                <a:effectLst/>
-                <a:uLnTx/>
-                <a:uFillTx/>
-              </a:rPr>
-              <a:t>KYPROLIS</a:t>
-            </a:r>
-            <a:r>
-              <a:rPr kumimoji="0" lang="en-GB" altLang="en-US" sz="800" b="0" i="0" u="none" strike="noStrike" kern="1200" cap="none" spc="0" normalizeH="0" baseline="30000" noProof="0">
-                <a:ln>
-                  <a:noFill/>
-                </a:ln>
-                <a:effectLst/>
-                <a:uLnTx/>
-                <a:uFillTx/>
-              </a:rPr>
-              <a:t>®</a:t>
-            </a:r>
-            <a:r>
-              <a:rPr kumimoji="0" lang="en-GB" altLang="en-US" sz="800" b="0" i="0" u="none" strike="noStrike" kern="1200" cap="none" spc="0" normalizeH="0" baseline="0" noProof="0">
-                <a:ln>
-                  <a:noFill/>
-                </a:ln>
-                <a:effectLst/>
-                <a:uLnTx/>
-                <a:uFillTx/>
-              </a:rPr>
-              <a:t> (carfilzomib) prescribing information, Onyx Pharmaceuticals Inc., an Amgen Inc. subsidiary. </a:t>
-            </a:r>
-            <a:r>
-              <a:rPr kumimoji="0" lang="en-GB" altLang="en-US" sz="800" b="1" i="0" u="none" strike="noStrike" kern="1200" cap="none" spc="0" normalizeH="0" baseline="0" noProof="0">
-                <a:ln>
-                  <a:noFill/>
-                </a:ln>
-                <a:effectLst/>
-                <a:uLnTx/>
-                <a:uFillTx/>
-              </a:rPr>
-              <a:t>7.</a:t>
-            </a:r>
-            <a:r>
-              <a:rPr kumimoji="0" lang="en-GB" altLang="en-US" sz="800" b="0" i="0" u="none" strike="noStrike" kern="1200" cap="none" spc="0" normalizeH="0" baseline="0" noProof="0">
-                <a:ln>
-                  <a:noFill/>
-                </a:ln>
-                <a:effectLst/>
-                <a:uLnTx/>
-                <a:uFillTx/>
-              </a:rPr>
-              <a:t> </a:t>
-            </a:r>
-            <a:r>
-              <a:rPr lang="en-US" sz="800"/>
-              <a:t>ClinicalTrials.gov. </a:t>
-            </a:r>
-            <a:r>
-              <a:rPr lang="en-US" sz="800">
-                <a:hlinkClick r:id="rId9"/>
-              </a:rPr>
-              <a:t>https://clinicaltrials.gov/ct2/show/NCT03859427</a:t>
-            </a:r>
-            <a:r>
-              <a:rPr lang="en-US" sz="800"/>
-              <a:t>. Accessed January 16, 2023. </a:t>
-            </a:r>
-            <a:r>
-              <a:rPr lang="en-US" sz="800" b="1"/>
-              <a:t>8. </a:t>
-            </a:r>
-            <a:r>
-              <a:rPr lang="en-US" sz="800"/>
-              <a:t>ClinicalTrials.gov. </a:t>
-            </a:r>
-            <a:r>
-              <a:rPr lang="en-US" sz="800">
-                <a:hlinkClick r:id="rId10"/>
-              </a:rPr>
-              <a:t>https://clinicaltrials.gov/ct2/show/NCT02303821</a:t>
-            </a:r>
-            <a:r>
-              <a:rPr lang="en-US" sz="800"/>
-              <a:t>. Accessed January 16, 2023. </a:t>
-            </a:r>
-            <a:r>
-              <a:rPr lang="en-US" sz="800" b="1"/>
-              <a:t>9</a:t>
-            </a:r>
-            <a:r>
-              <a:rPr lang="en-US" sz="800" b="1">
-                <a:solidFill>
-                  <a:srgbClr val="000000"/>
-                </a:solidFill>
-              </a:rPr>
-              <a:t>. </a:t>
-            </a:r>
-            <a:r>
-              <a:rPr lang="en-US" sz="800">
-                <a:solidFill>
-                  <a:srgbClr val="000000"/>
-                </a:solidFill>
-              </a:rPr>
-              <a:t>Amgen Press Releases. </a:t>
-            </a:r>
-            <a:r>
-              <a:rPr lang="en-US" sz="800">
-                <a:solidFill>
-                  <a:srgbClr val="000000"/>
-                </a:solidFill>
-                <a:hlinkClick r:id="rId11"/>
-              </a:rPr>
-              <a:t>https://www.amgen.com/newsroom/press-releases/2021/04/amgens-investigational-targeted-treatment-bemarituzumab-granted-breakthrough-therapy-designation</a:t>
-            </a:r>
-            <a:r>
-              <a:rPr lang="en-US" sz="800">
-                <a:solidFill>
-                  <a:srgbClr val="000000"/>
-                </a:solidFill>
-              </a:rPr>
-              <a:t>. Accessed January 17, 2023.</a:t>
-            </a:r>
-            <a:endParaRPr lang="en-US" sz="700">
-              <a:solidFill>
-                <a:srgbClr val="FF0000"/>
-              </a:solidFill>
-            </a:endParaRPr>
-          </a:p>
-        </p:txBody>
-      </p:sp>
       <p:sp>
         <p:nvSpPr>
           <p:cNvPr id="25" name="Rectangle 24">
@@ -49065,7 +45638,7 @@
       <p:sp>
         <p:nvSpPr>
           <p:cNvPr id="17" name="Rectangle 16">
-            <a:hlinkClick r:id="rId12" action="ppaction://hlinksldjump"/>
+            <a:hlinkClick r:id="rId4" action="ppaction://hlinksldjump"/>
             <a:extLst>
               <a:ext uri="{FF2B5EF4-FFF2-40B4-BE49-F238E27FC236}">
                 <a16:creationId xmlns:a16="http://schemas.microsoft.com/office/drawing/2014/main" id="{14E72449-2181-E7DC-53AF-B767773B58EC}"/>
@@ -49242,7 +45815,7 @@
             <p:nvPr/>
           </p:nvPicPr>
           <p:blipFill>
-            <a:blip r:embed="rId13"/>
+            <a:blip r:embed="rId5"/>
             <a:stretch>
               <a:fillRect/>
             </a:stretch>
@@ -49370,7 +45943,7 @@
             <p:nvPr/>
           </p:nvPicPr>
           <p:blipFill>
-            <a:blip r:embed="rId14"/>
+            <a:blip r:embed="rId6"/>
             <a:stretch>
               <a:fillRect/>
             </a:stretch>
@@ -49498,7 +46071,7 @@
             <p:nvPr/>
           </p:nvPicPr>
           <p:blipFill>
-            <a:blip r:embed="rId15">
+            <a:blip r:embed="rId7">
               <a:extLst>
                 <a:ext uri="{28A0092B-C50C-407E-A947-70E740481C1C}">
                   <a14:useLocalDpi xmlns:a14="http://schemas.microsoft.com/office/drawing/2010/main" val="0"/>
@@ -49700,7 +46273,7 @@
             <p:nvPr/>
           </p:nvPicPr>
           <p:blipFill>
-            <a:blip r:embed="rId16">
+            <a:blip r:embed="rId8">
               <a:extLst>
                 <a:ext uri="{28A0092B-C50C-407E-A947-70E740481C1C}">
                   <a14:useLocalDpi xmlns:a14="http://schemas.microsoft.com/office/drawing/2010/main" val="0"/>
@@ -51123,14 +47696,6 @@
 </file>
 
 <file path=customXml/item1.xml><?xml version="1.0" encoding="utf-8"?>
-<sisl xmlns:xsd="http://www.w3.org/2001/XMLSchema" xmlns:xsi="http://www.w3.org/2001/XMLSchema-instance" xmlns="http://www.boldonjames.com/2008/01/sie/internal/label" sislVersion="0" policy="82ad3a63-90ad-4a46-a3cb-757f4658e205" origin="userSelected">
-  <element uid="ba0343df-3220-4244-9388-1298e2abc028" value=""/>
-  <element uid="03e9b10b-a1f9-4a88-9630-476473f62285" value=""/>
-  <element uid="7349a702-6462-4442-88eb-c64cd513835c" value=""/>
-</sisl>
-</file>
-
-<file path=customXml/item2.xml><?xml version="1.0" encoding="utf-8"?>
 <ct:contentTypeSchema xmlns:ct="http://schemas.microsoft.com/office/2006/metadata/contentType" xmlns:ma="http://schemas.microsoft.com/office/2006/metadata/properties/metaAttributes" ct:_="" ma:_="" ma:contentTypeName="Document" ma:contentTypeID="0x010100E3C9566B50B885448CB499AF14DBE5DF" ma:contentTypeVersion="20" ma:contentTypeDescription="Create a new document." ma:contentTypeScope="" ma:versionID="95f2b4b4cd29e24f4c2eb8310a12c7a2">
   <xsd:schema xmlns:xsd="http://www.w3.org/2001/XMLSchema" xmlns:xs="http://www.w3.org/2001/XMLSchema" xmlns:p="http://schemas.microsoft.com/office/2006/metadata/properties" xmlns:ns2="1be193a2-6d07-415a-a335-24655a8cdaad" xmlns:ns3="71d6995e-2094-4cd5-8632-a7cdafa31eea" xmlns:ns4="9adffe0e-3a45-4ba0-ae43-c831ec5d87b2" targetNamespace="http://schemas.microsoft.com/office/2006/metadata/properties" ma:root="true" ma:fieldsID="5f7030a95bf2f77c9508cb840730724d" ns2:_="" ns3:_="" ns4:_="">
     <xsd:import namespace="1be193a2-6d07-415a-a335-24655a8cdaad"/>
@@ -51419,16 +47984,15 @@
 </ct:contentTypeSchema>
 </file>
 
-<file path=customXml/item3.xml><?xml version="1.0" encoding="utf-8"?>
-<?mso-contentType ?>
-<FormTemplates xmlns="http://schemas.microsoft.com/sharepoint/v3/contenttype/forms">
-  <Display>DocumentLibraryForm</Display>
-  <Edit>DocumentLibraryForm</Edit>
-  <New>DocumentLibraryForm</New>
-</FormTemplates>
+<file path=customXml/item2.xml><?xml version="1.0" encoding="utf-8"?>
+<sisl xmlns:xsd="http://www.w3.org/2001/XMLSchema" xmlns:xsi="http://www.w3.org/2001/XMLSchema-instance" xmlns="http://www.boldonjames.com/2008/01/sie/internal/label" sislVersion="0" policy="82ad3a63-90ad-4a46-a3cb-757f4658e205" origin="userSelected">
+  <element uid="ba0343df-3220-4244-9388-1298e2abc028" value=""/>
+  <element uid="03e9b10b-a1f9-4a88-9630-476473f62285" value=""/>
+  <element uid="7349a702-6462-4442-88eb-c64cd513835c" value=""/>
+</sisl>
 </file>
 
-<file path=customXml/item4.xml><?xml version="1.0" encoding="utf-8"?>
+<file path=customXml/item3.xml><?xml version="1.0" encoding="utf-8"?>
 <p:properties xmlns:p="http://schemas.microsoft.com/office/2006/metadata/properties" xmlns:xsi="http://www.w3.org/2001/XMLSchema-instance" xmlns:pc="http://schemas.microsoft.com/office/infopath/2007/PartnerControls">
   <documentManagement>
     <TaskName xmlns="1be193a2-6d07-415a-a335-24655a8cdaad">AMG01-DEK-223054 Draft 2 Review-Write 5</TaskName>
@@ -51443,16 +48007,16 @@
 </p:properties>
 </file>
 
-<file path=customXml/itemProps1.xml><?xml version="1.0" encoding="utf-8"?>
-<ds:datastoreItem xmlns:ds="http://schemas.openxmlformats.org/officeDocument/2006/customXml" ds:itemID="{7B038094-20DF-4618-B968-D69BDB4119FF}">
-  <ds:schemaRefs>
-    <ds:schemaRef ds:uri="http://www.w3.org/2001/XMLSchema"/>
-    <ds:schemaRef ds:uri="http://www.boldonjames.com/2008/01/sie/internal/label"/>
-  </ds:schemaRefs>
-</ds:datastoreItem>
+<file path=customXml/item4.xml><?xml version="1.0" encoding="utf-8"?>
+<?mso-contentType ?>
+<FormTemplates xmlns="http://schemas.microsoft.com/sharepoint/v3/contenttype/forms">
+  <Display>DocumentLibraryForm</Display>
+  <Edit>DocumentLibraryForm</Edit>
+  <New>DocumentLibraryForm</New>
+</FormTemplates>
 </file>
 
-<file path=customXml/itemProps2.xml><?xml version="1.0" encoding="utf-8"?>
+<file path=customXml/itemProps1.xml><?xml version="1.0" encoding="utf-8"?>
 <ds:datastoreItem xmlns:ds="http://schemas.openxmlformats.org/officeDocument/2006/customXml" ds:itemID="{5F66287A-C42F-4F10-9EE0-3D6A6C5D8F4C}">
   <ds:schemaRefs>
     <ds:schemaRef ds:uri="http://schemas.microsoft.com/office/2006/metadata/contentType"/>
@@ -51472,15 +48036,16 @@
 </ds:datastoreItem>
 </file>
 
-<file path=customXml/itemProps3.xml><?xml version="1.0" encoding="utf-8"?>
-<ds:datastoreItem xmlns:ds="http://schemas.openxmlformats.org/officeDocument/2006/customXml" ds:itemID="{32D5D7BF-EFF9-4851-967E-AB114BC65259}">
+<file path=customXml/itemProps2.xml><?xml version="1.0" encoding="utf-8"?>
+<ds:datastoreItem xmlns:ds="http://schemas.openxmlformats.org/officeDocument/2006/customXml" ds:itemID="{7B038094-20DF-4618-B968-D69BDB4119FF}">
   <ds:schemaRefs>
-    <ds:schemaRef ds:uri="http://schemas.microsoft.com/sharepoint/v3/contenttype/forms"/>
+    <ds:schemaRef ds:uri="http://www.w3.org/2001/XMLSchema"/>
+    <ds:schemaRef ds:uri="http://www.boldonjames.com/2008/01/sie/internal/label"/>
   </ds:schemaRefs>
 </ds:datastoreItem>
 </file>
 
-<file path=customXml/itemProps4.xml><?xml version="1.0" encoding="utf-8"?>
+<file path=customXml/itemProps3.xml><?xml version="1.0" encoding="utf-8"?>
 <ds:datastoreItem xmlns:ds="http://schemas.openxmlformats.org/officeDocument/2006/customXml" ds:itemID="{CCDEC46A-120E-44B3-B801-EDD74812EAF3}">
   <ds:schemaRefs>
     <ds:schemaRef ds:uri="http://purl.org/dc/terms/"/>
@@ -51496,4 +48061,12 @@
     <ds:schemaRef ds:uri="1be193a2-6d07-415a-a335-24655a8cdaad"/>
   </ds:schemaRefs>
 </ds:datastoreItem>
+</file>
+
+<file path=customXml/itemProps4.xml><?xml version="1.0" encoding="utf-8"?>
+<ds:datastoreItem xmlns:ds="http://schemas.openxmlformats.org/officeDocument/2006/customXml" ds:itemID="{32D5D7BF-EFF9-4851-967E-AB114BC65259}">
+  <ds:schemaRefs>
+    <ds:schemaRef ds:uri="http://schemas.microsoft.com/sharepoint/v3/contenttype/forms"/>
+  </ds:schemaRefs>
+</ds:datastoreItem>
 </file>
</xml_diff>